<commit_message>
Did the final touches on the class diagram and the presentation
</commit_message>
<xml_diff>
--- a/njangi.pptx
+++ b/njangi.pptx
@@ -5,23 +5,28 @@
     <p:sldMasterId id="2147483648" r:id="rId4"/>
   </p:sldMasterIdLst>
   <p:notesMasterIdLst>
-    <p:notesMasterId r:id="rId19"/>
+    <p:notesMasterId r:id="rId24"/>
   </p:notesMasterIdLst>
   <p:sldIdLst>
     <p:sldId id="256" r:id="rId5"/>
     <p:sldId id="271" r:id="rId6"/>
     <p:sldId id="257" r:id="rId7"/>
     <p:sldId id="258" r:id="rId8"/>
-    <p:sldId id="259" r:id="rId9"/>
-    <p:sldId id="280" r:id="rId10"/>
-    <p:sldId id="281" r:id="rId11"/>
-    <p:sldId id="260" r:id="rId12"/>
-    <p:sldId id="270" r:id="rId13"/>
-    <p:sldId id="283" r:id="rId14"/>
-    <p:sldId id="282" r:id="rId15"/>
-    <p:sldId id="276" r:id="rId16"/>
-    <p:sldId id="277" r:id="rId17"/>
-    <p:sldId id="275" r:id="rId18"/>
+    <p:sldId id="284" r:id="rId9"/>
+    <p:sldId id="287" r:id="rId10"/>
+    <p:sldId id="259" r:id="rId11"/>
+    <p:sldId id="285" r:id="rId12"/>
+    <p:sldId id="286" r:id="rId13"/>
+    <p:sldId id="288" r:id="rId14"/>
+    <p:sldId id="280" r:id="rId15"/>
+    <p:sldId id="281" r:id="rId16"/>
+    <p:sldId id="260" r:id="rId17"/>
+    <p:sldId id="270" r:id="rId18"/>
+    <p:sldId id="283" r:id="rId19"/>
+    <p:sldId id="282" r:id="rId20"/>
+    <p:sldId id="276" r:id="rId21"/>
+    <p:sldId id="277" r:id="rId22"/>
+    <p:sldId id="275" r:id="rId23"/>
   </p:sldIdLst>
   <p:sldSz cx="12192000" cy="6858000"/>
   <p:notesSz cx="6858000" cy="9144000"/>
@@ -18294,7 +18299,7 @@
           <p:cNvPr id="2" name="Title 1">
             <a:extLst>
               <a:ext uri="{FF2B5EF4-FFF2-40B4-BE49-F238E27FC236}">
-                <a16:creationId xmlns:a16="http://schemas.microsoft.com/office/drawing/2014/main" id="{CB687F20-DD1F-4C4B-527B-09DA3870586B}"/>
+                <a16:creationId xmlns:a16="http://schemas.microsoft.com/office/drawing/2014/main" id="{8460295B-54B9-4937-90E3-BAB9CE69E30B}"/>
               </a:ext>
             </a:extLst>
           </p:cNvPr>
@@ -18312,23 +18317,20 @@
           <a:p>
             <a:pPr algn="ctr"/>
             <a:r>
-              <a:rPr lang="en-US" sz="5400" dirty="0">
+              <a:rPr lang="en-US" sz="6000" dirty="0">
                 <a:latin typeface="Baskerville Old Face" panose="02020602080505020303" pitchFamily="18" charset="0"/>
               </a:rPr>
-              <a:t>Existing System</a:t>
+              <a:t>Objective 5</a:t>
             </a:r>
-            <a:endParaRPr lang="en-CM" sz="5400" dirty="0">
-              <a:latin typeface="Baskerville Old Face" panose="02020602080505020303" pitchFamily="18" charset="0"/>
-            </a:endParaRPr>
           </a:p>
         </p:txBody>
       </p:sp>
       <p:sp>
         <p:nvSpPr>
-          <p:cNvPr id="3" name="Content Placeholder 2">
+          <p:cNvPr id="4" name="Text Placeholder 3">
             <a:extLst>
               <a:ext uri="{FF2B5EF4-FFF2-40B4-BE49-F238E27FC236}">
-                <a16:creationId xmlns:a16="http://schemas.microsoft.com/office/drawing/2014/main" id="{FE7CCBD0-A821-C487-F64F-26C075565DCE}"/>
+                <a16:creationId xmlns:a16="http://schemas.microsoft.com/office/drawing/2014/main" id="{D51A6D85-3837-435F-A342-5A3F98172B12}"/>
               </a:ext>
             </a:extLst>
           </p:cNvPr>
@@ -18341,1151 +18343,8 @@
         </p:nvSpPr>
         <p:spPr/>
         <p:txBody>
-          <a:bodyPr/>
-          <a:lstStyle/>
-          <a:p>
-            <a:pPr marL="457200" indent="-457200">
-              <a:lnSpc>
-                <a:spcPct val="150000"/>
-              </a:lnSpc>
-              <a:buFont typeface="Arial" panose="020B0604020202020204" pitchFamily="34" charset="0"/>
-              <a:buChar char="•"/>
-            </a:pPr>
-            <a:r>
-              <a:rPr lang="en-US" sz="3200" dirty="0">
-                <a:latin typeface="Baskerville Old Face" panose="02020602080505020303" pitchFamily="18" charset="0"/>
-              </a:rPr>
-              <a:t>Manual system</a:t>
-            </a:r>
-          </a:p>
-          <a:p>
-            <a:pPr marL="457200" indent="-457200">
-              <a:lnSpc>
-                <a:spcPct val="150000"/>
-              </a:lnSpc>
-              <a:buFont typeface="Arial" panose="020B0604020202020204" pitchFamily="34" charset="0"/>
-              <a:buChar char="•"/>
-            </a:pPr>
-            <a:r>
-              <a:rPr lang="en-US" sz="3200" dirty="0">
-                <a:latin typeface="Baskerville Old Face" panose="02020602080505020303" pitchFamily="18" charset="0"/>
-              </a:rPr>
-              <a:t>No existing system in Cameroon</a:t>
-            </a:r>
-          </a:p>
-          <a:p>
-            <a:endParaRPr lang="en-CM" dirty="0"/>
-          </a:p>
-        </p:txBody>
-      </p:sp>
-      <p:sp>
-        <p:nvSpPr>
-          <p:cNvPr id="4" name="Footer Placeholder 3">
-            <a:extLst>
-              <a:ext uri="{FF2B5EF4-FFF2-40B4-BE49-F238E27FC236}">
-                <a16:creationId xmlns:a16="http://schemas.microsoft.com/office/drawing/2014/main" id="{C065695A-1892-92AD-11D7-69A3389A81C2}"/>
-              </a:ext>
-            </a:extLst>
-          </p:cNvPr>
-          <p:cNvSpPr>
-            <a:spLocks noGrp="1"/>
-          </p:cNvSpPr>
-          <p:nvPr>
-            <p:ph type="ftr" sz="quarter" idx="3"/>
-          </p:nvPr>
-        </p:nvSpPr>
-        <p:spPr/>
-        <p:txBody>
-          <a:bodyPr/>
-          <a:lstStyle/>
-          <a:p>
-            <a:r>
-              <a:rPr lang="en-US" dirty="0"/>
-              <a:t>Njangi-Hub</a:t>
-            </a:r>
-          </a:p>
-        </p:txBody>
-      </p:sp>
-      <p:sp>
-        <p:nvSpPr>
-          <p:cNvPr id="5" name="Slide Number Placeholder 4">
-            <a:extLst>
-              <a:ext uri="{FF2B5EF4-FFF2-40B4-BE49-F238E27FC236}">
-                <a16:creationId xmlns:a16="http://schemas.microsoft.com/office/drawing/2014/main" id="{6F1122C5-CB19-7CC4-CF98-72A0118707E2}"/>
-              </a:ext>
-            </a:extLst>
-          </p:cNvPr>
-          <p:cNvSpPr>
-            <a:spLocks noGrp="1"/>
-          </p:cNvSpPr>
-          <p:nvPr>
-            <p:ph type="sldNum" sz="quarter" idx="4"/>
-          </p:nvPr>
-        </p:nvSpPr>
-        <p:spPr/>
-        <p:txBody>
-          <a:bodyPr/>
-          <a:lstStyle/>
-          <a:p>
-            <a:fld id="{294A09A9-5501-47C1-A89A-A340965A2BE2}" type="slidenum">
-              <a:rPr lang="en-US" smtClean="0"/>
-              <a:pPr/>
-              <a:t>10</a:t>
-            </a:fld>
-            <a:endParaRPr lang="en-US" dirty="0"/>
-          </a:p>
-        </p:txBody>
-      </p:sp>
-    </p:spTree>
-    <p:extLst>
-      <p:ext uri="{BB962C8B-B14F-4D97-AF65-F5344CB8AC3E}">
-        <p14:creationId xmlns:p14="http://schemas.microsoft.com/office/powerpoint/2010/main" val="3424418183"/>
-      </p:ext>
-    </p:extLst>
-  </p:cSld>
-  <p:clrMapOvr>
-    <a:masterClrMapping/>
-  </p:clrMapOvr>
-</p:sld>
-</file>
-
-<file path=ppt/slides/slide11.xml><?xml version="1.0" encoding="utf-8"?>
-<p:sld xmlns:a="http://schemas.openxmlformats.org/drawingml/2006/main" xmlns:r="http://schemas.openxmlformats.org/officeDocument/2006/relationships" xmlns:p="http://schemas.openxmlformats.org/presentationml/2006/main">
-  <p:cSld>
-    <p:spTree>
-      <p:nvGrpSpPr>
-        <p:cNvPr id="1" name=""/>
-        <p:cNvGrpSpPr/>
-        <p:nvPr/>
-      </p:nvGrpSpPr>
-      <p:grpSpPr>
-        <a:xfrm>
-          <a:off x="0" y="0"/>
-          <a:ext cx="0" cy="0"/>
-          <a:chOff x="0" y="0"/>
-          <a:chExt cx="0" cy="0"/>
-        </a:xfrm>
-      </p:grpSpPr>
-      <p:sp>
-        <p:nvSpPr>
-          <p:cNvPr id="2" name="Title 1">
-            <a:extLst>
-              <a:ext uri="{FF2B5EF4-FFF2-40B4-BE49-F238E27FC236}">
-                <a16:creationId xmlns:a16="http://schemas.microsoft.com/office/drawing/2014/main" id="{9C613D61-4322-6317-A7AC-95FFCCEC96C0}"/>
-              </a:ext>
-            </a:extLst>
-          </p:cNvPr>
-          <p:cNvSpPr>
-            <a:spLocks noGrp="1"/>
-          </p:cNvSpPr>
-          <p:nvPr>
-            <p:ph type="ctrTitle"/>
-          </p:nvPr>
-        </p:nvSpPr>
-        <p:spPr>
-          <a:xfrm>
-            <a:off x="1048225" y="1602739"/>
-            <a:ext cx="6245912" cy="2387600"/>
-          </a:xfrm>
-        </p:spPr>
-        <p:txBody>
-          <a:bodyPr/>
-          <a:lstStyle/>
-          <a:p>
-            <a:pPr>
-              <a:lnSpc>
-                <a:spcPct val="150000"/>
-              </a:lnSpc>
-            </a:pPr>
-            <a:r>
-              <a:rPr lang="en-US" dirty="0">
-                <a:latin typeface="Baskerville Old Face" panose="02020602080505020303" pitchFamily="18" charset="0"/>
-              </a:rPr>
-              <a:t>Diagrams…</a:t>
-            </a:r>
-            <a:endParaRPr lang="en-CM" dirty="0">
-              <a:latin typeface="Baskerville Old Face" panose="02020602080505020303" pitchFamily="18" charset="0"/>
-            </a:endParaRPr>
-          </a:p>
-        </p:txBody>
-      </p:sp>
-    </p:spTree>
-    <p:extLst>
-      <p:ext uri="{BB962C8B-B14F-4D97-AF65-F5344CB8AC3E}">
-        <p14:creationId xmlns:p14="http://schemas.microsoft.com/office/powerpoint/2010/main" val="3370994497"/>
-      </p:ext>
-    </p:extLst>
-  </p:cSld>
-  <p:clrMapOvr>
-    <a:masterClrMapping/>
-  </p:clrMapOvr>
-</p:sld>
-</file>
-
-<file path=ppt/slides/slide12.xml><?xml version="1.0" encoding="utf-8"?>
-<p:sld xmlns:a="http://schemas.openxmlformats.org/drawingml/2006/main" xmlns:r="http://schemas.openxmlformats.org/officeDocument/2006/relationships" xmlns:p="http://schemas.openxmlformats.org/presentationml/2006/main">
-  <p:cSld>
-    <p:spTree>
-      <p:nvGrpSpPr>
-        <p:cNvPr id="1" name=""/>
-        <p:cNvGrpSpPr/>
-        <p:nvPr/>
-      </p:nvGrpSpPr>
-      <p:grpSpPr>
-        <a:xfrm>
-          <a:off x="0" y="0"/>
-          <a:ext cx="0" cy="0"/>
-          <a:chOff x="0" y="0"/>
-          <a:chExt cx="0" cy="0"/>
-        </a:xfrm>
-      </p:grpSpPr>
-      <p:sp>
-        <p:nvSpPr>
-          <p:cNvPr id="2" name="Title 1">
-            <a:extLst>
-              <a:ext uri="{FF2B5EF4-FFF2-40B4-BE49-F238E27FC236}">
-                <a16:creationId xmlns:a16="http://schemas.microsoft.com/office/drawing/2014/main" id="{45AEDAD5-1401-046B-A790-C095D98C531B}"/>
-              </a:ext>
-            </a:extLst>
-          </p:cNvPr>
-          <p:cNvSpPr>
-            <a:spLocks noGrp="1"/>
-          </p:cNvSpPr>
-          <p:nvPr>
-            <p:ph type="title"/>
-          </p:nvPr>
-        </p:nvSpPr>
-        <p:spPr/>
-        <p:txBody>
-          <a:bodyPr/>
-          <a:lstStyle/>
-          <a:p>
-            <a:pPr algn="ctr"/>
-            <a:r>
-              <a:rPr lang="en-US" dirty="0">
-                <a:latin typeface="Baskerville Old Face" panose="02020602080505020303" pitchFamily="18" charset="0"/>
-              </a:rPr>
-              <a:t>Use case: User’s Module</a:t>
-            </a:r>
-            <a:endParaRPr lang="en-CM" dirty="0">
-              <a:latin typeface="Baskerville Old Face" panose="02020602080505020303" pitchFamily="18" charset="0"/>
-            </a:endParaRPr>
-          </a:p>
-        </p:txBody>
-      </p:sp>
-      <p:pic>
-        <p:nvPicPr>
-          <p:cNvPr id="7" name="Content Placeholder 6">
-            <a:extLst>
-              <a:ext uri="{FF2B5EF4-FFF2-40B4-BE49-F238E27FC236}">
-                <a16:creationId xmlns:a16="http://schemas.microsoft.com/office/drawing/2014/main" id="{1CCD097E-AE9A-153C-A72B-00A90D5E4860}"/>
-              </a:ext>
-            </a:extLst>
-          </p:cNvPr>
-          <p:cNvPicPr>
-            <a:picLocks noGrp="1" noChangeAspect="1"/>
-          </p:cNvPicPr>
-          <p:nvPr>
-            <p:ph idx="1"/>
-          </p:nvPr>
-        </p:nvPicPr>
-        <p:blipFill>
-          <a:blip r:embed="rId2"/>
-          <a:stretch>
-            <a:fillRect/>
-          </a:stretch>
-        </p:blipFill>
-        <p:spPr>
-          <a:xfrm>
-            <a:off x="2755900" y="2017713"/>
-            <a:ext cx="6034635" cy="3367087"/>
-          </a:xfrm>
-        </p:spPr>
-      </p:pic>
-      <p:sp>
-        <p:nvSpPr>
-          <p:cNvPr id="4" name="Footer Placeholder 3">
-            <a:extLst>
-              <a:ext uri="{FF2B5EF4-FFF2-40B4-BE49-F238E27FC236}">
-                <a16:creationId xmlns:a16="http://schemas.microsoft.com/office/drawing/2014/main" id="{9E6D0BFE-3CB0-BD1B-9E94-89E4AFB9BFA8}"/>
-              </a:ext>
-            </a:extLst>
-          </p:cNvPr>
-          <p:cNvSpPr>
-            <a:spLocks noGrp="1"/>
-          </p:cNvSpPr>
-          <p:nvPr>
-            <p:ph type="ftr" sz="quarter" idx="3"/>
-          </p:nvPr>
-        </p:nvSpPr>
-        <p:spPr/>
-        <p:txBody>
-          <a:bodyPr/>
-          <a:lstStyle/>
-          <a:p>
-            <a:r>
-              <a:rPr lang="en-US" dirty="0"/>
-              <a:t>Njangi-Hub</a:t>
-            </a:r>
-          </a:p>
-        </p:txBody>
-      </p:sp>
-      <p:sp>
-        <p:nvSpPr>
-          <p:cNvPr id="5" name="Slide Number Placeholder 4">
-            <a:extLst>
-              <a:ext uri="{FF2B5EF4-FFF2-40B4-BE49-F238E27FC236}">
-                <a16:creationId xmlns:a16="http://schemas.microsoft.com/office/drawing/2014/main" id="{55473CC1-4CB4-CAD6-B1F0-6BE8449D086F}"/>
-              </a:ext>
-            </a:extLst>
-          </p:cNvPr>
-          <p:cNvSpPr>
-            <a:spLocks noGrp="1"/>
-          </p:cNvSpPr>
-          <p:nvPr>
-            <p:ph type="sldNum" sz="quarter" idx="4"/>
-          </p:nvPr>
-        </p:nvSpPr>
-        <p:spPr/>
-        <p:txBody>
-          <a:bodyPr/>
-          <a:lstStyle/>
-          <a:p>
-            <a:fld id="{294A09A9-5501-47C1-A89A-A340965A2BE2}" type="slidenum">
-              <a:rPr lang="en-US" smtClean="0"/>
-              <a:pPr/>
-              <a:t>12</a:t>
-            </a:fld>
-            <a:endParaRPr lang="en-US" dirty="0"/>
-          </a:p>
-        </p:txBody>
-      </p:sp>
-    </p:spTree>
-    <p:extLst>
-      <p:ext uri="{BB962C8B-B14F-4D97-AF65-F5344CB8AC3E}">
-        <p14:creationId xmlns:p14="http://schemas.microsoft.com/office/powerpoint/2010/main" val="2010260770"/>
-      </p:ext>
-    </p:extLst>
-  </p:cSld>
-  <p:clrMapOvr>
-    <a:masterClrMapping/>
-  </p:clrMapOvr>
-</p:sld>
-</file>
-
-<file path=ppt/slides/slide13.xml><?xml version="1.0" encoding="utf-8"?>
-<p:sld xmlns:a="http://schemas.openxmlformats.org/drawingml/2006/main" xmlns:r="http://schemas.openxmlformats.org/officeDocument/2006/relationships" xmlns:p="http://schemas.openxmlformats.org/presentationml/2006/main">
-  <p:cSld>
-    <p:spTree>
-      <p:nvGrpSpPr>
-        <p:cNvPr id="1" name=""/>
-        <p:cNvGrpSpPr/>
-        <p:nvPr/>
-      </p:nvGrpSpPr>
-      <p:grpSpPr>
-        <a:xfrm>
-          <a:off x="0" y="0"/>
-          <a:ext cx="0" cy="0"/>
-          <a:chOff x="0" y="0"/>
-          <a:chExt cx="0" cy="0"/>
-        </a:xfrm>
-      </p:grpSpPr>
-      <p:sp>
-        <p:nvSpPr>
-          <p:cNvPr id="2" name="Title 1">
-            <a:extLst>
-              <a:ext uri="{FF2B5EF4-FFF2-40B4-BE49-F238E27FC236}">
-                <a16:creationId xmlns:a16="http://schemas.microsoft.com/office/drawing/2014/main" id="{45AEDAD5-1401-046B-A790-C095D98C531B}"/>
-              </a:ext>
-            </a:extLst>
-          </p:cNvPr>
-          <p:cNvSpPr>
-            <a:spLocks noGrp="1"/>
-          </p:cNvSpPr>
-          <p:nvPr>
-            <p:ph type="title"/>
-          </p:nvPr>
-        </p:nvSpPr>
-        <p:spPr/>
-        <p:txBody>
-          <a:bodyPr/>
-          <a:lstStyle/>
-          <a:p>
-            <a:pPr algn="ctr"/>
-            <a:r>
-              <a:rPr lang="en-US" sz="5400" dirty="0">
-                <a:latin typeface="Baskerville Old Face" panose="02020602080505020303" pitchFamily="18" charset="0"/>
-              </a:rPr>
-              <a:t>Use case: Njangi head’s Module</a:t>
-            </a:r>
-            <a:endParaRPr lang="en-CM" sz="5400" dirty="0">
-              <a:latin typeface="Baskerville Old Face" panose="02020602080505020303" pitchFamily="18" charset="0"/>
-            </a:endParaRPr>
-          </a:p>
-        </p:txBody>
-      </p:sp>
-      <p:pic>
-        <p:nvPicPr>
-          <p:cNvPr id="7" name="Content Placeholder 6">
-            <a:extLst>
-              <a:ext uri="{FF2B5EF4-FFF2-40B4-BE49-F238E27FC236}">
-                <a16:creationId xmlns:a16="http://schemas.microsoft.com/office/drawing/2014/main" id="{BD991CF0-5E2B-4FF1-162C-0BFC843BACFC}"/>
-              </a:ext>
-            </a:extLst>
-          </p:cNvPr>
-          <p:cNvPicPr>
-            <a:picLocks noGrp="1" noChangeAspect="1"/>
-          </p:cNvPicPr>
-          <p:nvPr>
-            <p:ph idx="1"/>
-          </p:nvPr>
-        </p:nvPicPr>
-        <p:blipFill>
-          <a:blip r:embed="rId2"/>
-          <a:stretch>
-            <a:fillRect/>
-          </a:stretch>
-        </p:blipFill>
-        <p:spPr>
-          <a:xfrm>
-            <a:off x="3454400" y="2017713"/>
-            <a:ext cx="4313816" cy="3367087"/>
-          </a:xfrm>
-        </p:spPr>
-      </p:pic>
-      <p:sp>
-        <p:nvSpPr>
-          <p:cNvPr id="4" name="Footer Placeholder 3">
-            <a:extLst>
-              <a:ext uri="{FF2B5EF4-FFF2-40B4-BE49-F238E27FC236}">
-                <a16:creationId xmlns:a16="http://schemas.microsoft.com/office/drawing/2014/main" id="{9E6D0BFE-3CB0-BD1B-9E94-89E4AFB9BFA8}"/>
-              </a:ext>
-            </a:extLst>
-          </p:cNvPr>
-          <p:cNvSpPr>
-            <a:spLocks noGrp="1"/>
-          </p:cNvSpPr>
-          <p:nvPr>
-            <p:ph type="ftr" sz="quarter" idx="3"/>
-          </p:nvPr>
-        </p:nvSpPr>
-        <p:spPr/>
-        <p:txBody>
-          <a:bodyPr/>
-          <a:lstStyle/>
-          <a:p>
-            <a:r>
-              <a:rPr lang="en-US" dirty="0"/>
-              <a:t>Njangi-Hub</a:t>
-            </a:r>
-          </a:p>
-        </p:txBody>
-      </p:sp>
-      <p:sp>
-        <p:nvSpPr>
-          <p:cNvPr id="5" name="Slide Number Placeholder 4">
-            <a:extLst>
-              <a:ext uri="{FF2B5EF4-FFF2-40B4-BE49-F238E27FC236}">
-                <a16:creationId xmlns:a16="http://schemas.microsoft.com/office/drawing/2014/main" id="{55473CC1-4CB4-CAD6-B1F0-6BE8449D086F}"/>
-              </a:ext>
-            </a:extLst>
-          </p:cNvPr>
-          <p:cNvSpPr>
-            <a:spLocks noGrp="1"/>
-          </p:cNvSpPr>
-          <p:nvPr>
-            <p:ph type="sldNum" sz="quarter" idx="4"/>
-          </p:nvPr>
-        </p:nvSpPr>
-        <p:spPr/>
-        <p:txBody>
-          <a:bodyPr/>
-          <a:lstStyle/>
-          <a:p>
-            <a:fld id="{294A09A9-5501-47C1-A89A-A340965A2BE2}" type="slidenum">
-              <a:rPr lang="en-US" smtClean="0"/>
-              <a:pPr/>
-              <a:t>13</a:t>
-            </a:fld>
-            <a:endParaRPr lang="en-US" dirty="0"/>
-          </a:p>
-        </p:txBody>
-      </p:sp>
-    </p:spTree>
-    <p:extLst>
-      <p:ext uri="{BB962C8B-B14F-4D97-AF65-F5344CB8AC3E}">
-        <p14:creationId xmlns:p14="http://schemas.microsoft.com/office/powerpoint/2010/main" val="1674946439"/>
-      </p:ext>
-    </p:extLst>
-  </p:cSld>
-  <p:clrMapOvr>
-    <a:masterClrMapping/>
-  </p:clrMapOvr>
-</p:sld>
-</file>
-
-<file path=ppt/slides/slide14.xml><?xml version="1.0" encoding="utf-8"?>
-<p:sld xmlns:a="http://schemas.openxmlformats.org/drawingml/2006/main" xmlns:r="http://schemas.openxmlformats.org/officeDocument/2006/relationships" xmlns:p="http://schemas.openxmlformats.org/presentationml/2006/main">
-  <p:cSld>
-    <p:spTree>
-      <p:nvGrpSpPr>
-        <p:cNvPr id="1" name=""/>
-        <p:cNvGrpSpPr/>
-        <p:nvPr/>
-      </p:nvGrpSpPr>
-      <p:grpSpPr>
-        <a:xfrm>
-          <a:off x="0" y="0"/>
-          <a:ext cx="0" cy="0"/>
-          <a:chOff x="0" y="0"/>
-          <a:chExt cx="0" cy="0"/>
-        </a:xfrm>
-      </p:grpSpPr>
-      <p:sp>
-        <p:nvSpPr>
-          <p:cNvPr id="2" name="Title 1">
-            <a:extLst>
-              <a:ext uri="{FF2B5EF4-FFF2-40B4-BE49-F238E27FC236}">
-                <a16:creationId xmlns:a16="http://schemas.microsoft.com/office/drawing/2014/main" id="{69FAE308-3076-43DB-B834-DA0B0AE19AF9}"/>
-              </a:ext>
-            </a:extLst>
-          </p:cNvPr>
-          <p:cNvSpPr>
-            <a:spLocks noGrp="1"/>
-          </p:cNvSpPr>
-          <p:nvPr>
-            <p:ph type="ctrTitle"/>
-          </p:nvPr>
-        </p:nvSpPr>
-        <p:spPr>
-          <a:xfrm>
-            <a:off x="926194" y="2734200"/>
-            <a:ext cx="6245912" cy="1389600"/>
-          </a:xfrm>
-        </p:spPr>
-        <p:txBody>
-          <a:bodyPr/>
-          <a:lstStyle/>
-          <a:p>
-            <a:r>
-              <a:rPr lang="en-US" sz="6600" dirty="0">
-                <a:latin typeface="Baskerville Old Face" panose="02020602080505020303" pitchFamily="18" charset="0"/>
-              </a:rPr>
-              <a:t>Thank you</a:t>
-            </a:r>
-          </a:p>
-        </p:txBody>
-      </p:sp>
-    </p:spTree>
-    <p:extLst>
-      <p:ext uri="{BB962C8B-B14F-4D97-AF65-F5344CB8AC3E}">
-        <p14:creationId xmlns:p14="http://schemas.microsoft.com/office/powerpoint/2010/main" val="926184573"/>
-      </p:ext>
-    </p:extLst>
-  </p:cSld>
-  <p:clrMapOvr>
-    <a:masterClrMapping/>
-  </p:clrMapOvr>
-</p:sld>
-</file>
-
-<file path=ppt/slides/slide2.xml><?xml version="1.0" encoding="utf-8"?>
-<p:sld xmlns:a="http://schemas.openxmlformats.org/drawingml/2006/main" xmlns:r="http://schemas.openxmlformats.org/officeDocument/2006/relationships" xmlns:p="http://schemas.openxmlformats.org/presentationml/2006/main">
-  <p:cSld>
-    <p:spTree>
-      <p:nvGrpSpPr>
-        <p:cNvPr id="1" name=""/>
-        <p:cNvGrpSpPr/>
-        <p:nvPr/>
-      </p:nvGrpSpPr>
-      <p:grpSpPr>
-        <a:xfrm>
-          <a:off x="0" y="0"/>
-          <a:ext cx="0" cy="0"/>
-          <a:chOff x="0" y="0"/>
-          <a:chExt cx="0" cy="0"/>
-        </a:xfrm>
-      </p:grpSpPr>
-      <p:sp>
-        <p:nvSpPr>
-          <p:cNvPr id="2" name="Title 1">
-            <a:extLst>
-              <a:ext uri="{FF2B5EF4-FFF2-40B4-BE49-F238E27FC236}">
-                <a16:creationId xmlns:a16="http://schemas.microsoft.com/office/drawing/2014/main" id="{27A6F7BB-30A8-4980-AD4A-2FB0B53FA6C9}"/>
-              </a:ext>
-            </a:extLst>
-          </p:cNvPr>
-          <p:cNvSpPr>
-            <a:spLocks noGrp="1"/>
-          </p:cNvSpPr>
-          <p:nvPr>
-            <p:ph type="title"/>
-          </p:nvPr>
-        </p:nvSpPr>
-        <p:spPr>
-          <a:xfrm>
-            <a:off x="750430" y="381000"/>
-            <a:ext cx="8401624" cy="1325563"/>
-          </a:xfrm>
-        </p:spPr>
-        <p:txBody>
-          <a:bodyPr/>
-          <a:lstStyle/>
-          <a:p>
-            <a:pPr algn="ctr"/>
-            <a:r>
-              <a:rPr lang="en-US" sz="5400" dirty="0">
-                <a:latin typeface="Baskerville Old Face" panose="02020602080505020303" pitchFamily="18" charset="0"/>
-              </a:rPr>
-              <a:t>Meet our team</a:t>
-            </a:r>
-          </a:p>
-        </p:txBody>
-      </p:sp>
-      <p:sp>
-        <p:nvSpPr>
-          <p:cNvPr id="34" name="Text Placeholder 33">
-            <a:extLst>
-              <a:ext uri="{FF2B5EF4-FFF2-40B4-BE49-F238E27FC236}">
-                <a16:creationId xmlns:a16="http://schemas.microsoft.com/office/drawing/2014/main" id="{C1C92E27-D550-F44E-8491-927F819E72B8}"/>
-              </a:ext>
-            </a:extLst>
-          </p:cNvPr>
-          <p:cNvSpPr>
-            <a:spLocks noGrp="1"/>
-          </p:cNvSpPr>
-          <p:nvPr>
-            <p:ph type="body" sz="quarter" idx="17"/>
-          </p:nvPr>
-        </p:nvSpPr>
-        <p:spPr>
-          <a:xfrm>
-            <a:off x="2123351" y="2426400"/>
-            <a:ext cx="2281237" cy="347662"/>
-          </a:xfrm>
-        </p:spPr>
-        <p:txBody>
-          <a:bodyPr/>
-          <a:lstStyle/>
-          <a:p>
-            <a:r>
-              <a:rPr lang="en-US" sz="2000" dirty="0">
-                <a:latin typeface="Baskerville Old Face" panose="02020602080505020303" pitchFamily="18" charset="0"/>
-              </a:rPr>
-              <a:t>Kanyi Vanessa</a:t>
-            </a:r>
-          </a:p>
-        </p:txBody>
-      </p:sp>
-      <p:sp>
-        <p:nvSpPr>
-          <p:cNvPr id="35" name="Text Placeholder 34">
-            <a:extLst>
-              <a:ext uri="{FF2B5EF4-FFF2-40B4-BE49-F238E27FC236}">
-                <a16:creationId xmlns:a16="http://schemas.microsoft.com/office/drawing/2014/main" id="{7D722C50-45F7-D84B-B216-568F72D66349}"/>
-              </a:ext>
-            </a:extLst>
-          </p:cNvPr>
-          <p:cNvSpPr>
-            <a:spLocks noGrp="1"/>
-          </p:cNvSpPr>
-          <p:nvPr>
-            <p:ph type="body" sz="quarter" idx="18"/>
-          </p:nvPr>
-        </p:nvSpPr>
-        <p:spPr>
-          <a:xfrm>
-            <a:off x="2123350" y="2811646"/>
-            <a:ext cx="2281237" cy="347662"/>
-          </a:xfrm>
-        </p:spPr>
-        <p:txBody>
-          <a:bodyPr/>
-          <a:lstStyle/>
-          <a:p>
-            <a:r>
-              <a:rPr lang="en-US" sz="1600" dirty="0">
-                <a:latin typeface="Baskerville Old Face" panose="02020602080505020303" pitchFamily="18" charset="0"/>
-              </a:rPr>
-              <a:t>Analyst</a:t>
-            </a:r>
-          </a:p>
-        </p:txBody>
-      </p:sp>
-      <p:sp>
-        <p:nvSpPr>
-          <p:cNvPr id="36" name="Text Placeholder 35">
-            <a:extLst>
-              <a:ext uri="{FF2B5EF4-FFF2-40B4-BE49-F238E27FC236}">
-                <a16:creationId xmlns:a16="http://schemas.microsoft.com/office/drawing/2014/main" id="{176187A9-3EBE-F64D-AE99-021BB3767F90}"/>
-              </a:ext>
-            </a:extLst>
-          </p:cNvPr>
-          <p:cNvSpPr>
-            <a:spLocks noGrp="1"/>
-          </p:cNvSpPr>
-          <p:nvPr>
-            <p:ph type="body" sz="quarter" idx="19"/>
-          </p:nvPr>
-        </p:nvSpPr>
-        <p:spPr>
-          <a:xfrm>
-            <a:off x="6870817" y="2422565"/>
-            <a:ext cx="2281237" cy="347662"/>
-          </a:xfrm>
-        </p:spPr>
-        <p:txBody>
-          <a:bodyPr/>
-          <a:lstStyle/>
-          <a:p>
-            <a:r>
-              <a:rPr lang="en-US" sz="2000" dirty="0">
-                <a:latin typeface="Baskerville Old Face" panose="02020602080505020303" pitchFamily="18" charset="0"/>
-              </a:rPr>
-              <a:t>Kwa Adella</a:t>
-            </a:r>
-          </a:p>
-        </p:txBody>
-      </p:sp>
-      <p:sp>
-        <p:nvSpPr>
-          <p:cNvPr id="37" name="Text Placeholder 36">
-            <a:extLst>
-              <a:ext uri="{FF2B5EF4-FFF2-40B4-BE49-F238E27FC236}">
-                <a16:creationId xmlns:a16="http://schemas.microsoft.com/office/drawing/2014/main" id="{7990731F-95DE-4F44-8EA0-E275CEAFD8A2}"/>
-              </a:ext>
-            </a:extLst>
-          </p:cNvPr>
-          <p:cNvSpPr>
-            <a:spLocks noGrp="1"/>
-          </p:cNvSpPr>
-          <p:nvPr>
-            <p:ph type="body" sz="quarter" idx="20"/>
-          </p:nvPr>
-        </p:nvSpPr>
-        <p:spPr>
-          <a:xfrm>
-            <a:off x="6870816" y="2807811"/>
-            <a:ext cx="2281237" cy="347662"/>
-          </a:xfrm>
-        </p:spPr>
-        <p:txBody>
-          <a:bodyPr/>
-          <a:lstStyle/>
-          <a:p>
-            <a:r>
-              <a:rPr lang="en-US" sz="1600" dirty="0">
-                <a:latin typeface="Baskerville Old Face" panose="02020602080505020303" pitchFamily="18" charset="0"/>
-              </a:rPr>
-              <a:t>Designer and Analyst</a:t>
-            </a:r>
-          </a:p>
-        </p:txBody>
-      </p:sp>
-      <p:sp>
-        <p:nvSpPr>
-          <p:cNvPr id="38" name="Text Placeholder 37">
-            <a:extLst>
-              <a:ext uri="{FF2B5EF4-FFF2-40B4-BE49-F238E27FC236}">
-                <a16:creationId xmlns:a16="http://schemas.microsoft.com/office/drawing/2014/main" id="{5B19EE51-628F-CA4E-94B0-57E9ACA1446A}"/>
-              </a:ext>
-            </a:extLst>
-          </p:cNvPr>
-          <p:cNvSpPr>
-            <a:spLocks noGrp="1"/>
-          </p:cNvSpPr>
-          <p:nvPr>
-            <p:ph type="body" sz="quarter" idx="21"/>
-          </p:nvPr>
-        </p:nvSpPr>
-        <p:spPr>
-          <a:xfrm>
-            <a:off x="2123351" y="4498793"/>
-            <a:ext cx="2281237" cy="347662"/>
-          </a:xfrm>
-        </p:spPr>
-        <p:txBody>
-          <a:bodyPr/>
-          <a:lstStyle/>
-          <a:p>
-            <a:r>
-              <a:rPr lang="en-US" sz="2000" dirty="0">
-                <a:latin typeface="Baskerville Old Face" panose="02020602080505020303" pitchFamily="18" charset="0"/>
-              </a:rPr>
-              <a:t>Neba Nadine</a:t>
-            </a:r>
-          </a:p>
-        </p:txBody>
-      </p:sp>
-      <p:sp>
-        <p:nvSpPr>
-          <p:cNvPr id="39" name="Text Placeholder 38">
-            <a:extLst>
-              <a:ext uri="{FF2B5EF4-FFF2-40B4-BE49-F238E27FC236}">
-                <a16:creationId xmlns:a16="http://schemas.microsoft.com/office/drawing/2014/main" id="{2A6ACC78-74DF-604E-BD14-4BBE7B4EEF5B}"/>
-              </a:ext>
-            </a:extLst>
-          </p:cNvPr>
-          <p:cNvSpPr>
-            <a:spLocks noGrp="1"/>
-          </p:cNvSpPr>
-          <p:nvPr>
-            <p:ph type="body" sz="quarter" idx="22"/>
-          </p:nvPr>
-        </p:nvSpPr>
-        <p:spPr>
-          <a:xfrm>
-            <a:off x="2123350" y="4884039"/>
-            <a:ext cx="2281237" cy="347662"/>
-          </a:xfrm>
-        </p:spPr>
-        <p:txBody>
-          <a:bodyPr/>
-          <a:lstStyle/>
-          <a:p>
-            <a:r>
-              <a:rPr lang="en-US" sz="1600" dirty="0">
-                <a:latin typeface="Baskerville Old Face" panose="02020602080505020303" pitchFamily="18" charset="0"/>
-              </a:rPr>
-              <a:t>Analyst</a:t>
-            </a:r>
-          </a:p>
-        </p:txBody>
-      </p:sp>
-      <p:sp>
-        <p:nvSpPr>
-          <p:cNvPr id="40" name="Text Placeholder 39">
-            <a:extLst>
-              <a:ext uri="{FF2B5EF4-FFF2-40B4-BE49-F238E27FC236}">
-                <a16:creationId xmlns:a16="http://schemas.microsoft.com/office/drawing/2014/main" id="{9DC429C0-1DEB-1F4F-AE66-C503B31B7B48}"/>
-              </a:ext>
-            </a:extLst>
-          </p:cNvPr>
-          <p:cNvSpPr>
-            <a:spLocks noGrp="1"/>
-          </p:cNvSpPr>
-          <p:nvPr>
-            <p:ph type="body" sz="quarter" idx="23"/>
-          </p:nvPr>
-        </p:nvSpPr>
-        <p:spPr>
-          <a:xfrm>
-            <a:off x="6870817" y="4498793"/>
-            <a:ext cx="2281237" cy="347662"/>
-          </a:xfrm>
-        </p:spPr>
-        <p:txBody>
-          <a:bodyPr/>
-          <a:lstStyle/>
-          <a:p>
-            <a:r>
-              <a:rPr lang="en-US" sz="2000" dirty="0">
-                <a:latin typeface="Baskerville Old Face" panose="02020602080505020303" pitchFamily="18" charset="0"/>
-              </a:rPr>
-              <a:t>Emmanuel </a:t>
-            </a:r>
-            <a:r>
-              <a:rPr lang="en-US" sz="2000" dirty="0" err="1">
-                <a:latin typeface="Baskerville Old Face" panose="02020602080505020303" pitchFamily="18" charset="0"/>
-              </a:rPr>
-              <a:t>Takor</a:t>
-            </a:r>
-            <a:endParaRPr lang="en-US" sz="2000" dirty="0">
-              <a:latin typeface="Baskerville Old Face" panose="02020602080505020303" pitchFamily="18" charset="0"/>
-            </a:endParaRPr>
-          </a:p>
-        </p:txBody>
-      </p:sp>
-      <p:sp>
-        <p:nvSpPr>
-          <p:cNvPr id="41" name="Text Placeholder 40">
-            <a:extLst>
-              <a:ext uri="{FF2B5EF4-FFF2-40B4-BE49-F238E27FC236}">
-                <a16:creationId xmlns:a16="http://schemas.microsoft.com/office/drawing/2014/main" id="{31C0CCD4-2502-A14F-B520-7B57524EDF8E}"/>
-              </a:ext>
-            </a:extLst>
-          </p:cNvPr>
-          <p:cNvSpPr>
-            <a:spLocks noGrp="1"/>
-          </p:cNvSpPr>
-          <p:nvPr>
-            <p:ph type="body" sz="quarter" idx="24"/>
-          </p:nvPr>
-        </p:nvSpPr>
-        <p:spPr>
-          <a:xfrm>
-            <a:off x="6870816" y="4884039"/>
-            <a:ext cx="2281237" cy="347662"/>
-          </a:xfrm>
-        </p:spPr>
-        <p:txBody>
-          <a:bodyPr/>
-          <a:lstStyle/>
-          <a:p>
-            <a:r>
-              <a:rPr lang="en-US" sz="1600" dirty="0">
-                <a:latin typeface="Baskerville Old Face" panose="02020602080505020303" pitchFamily="18" charset="0"/>
-              </a:rPr>
-              <a:t>Analyst</a:t>
-            </a:r>
-          </a:p>
-        </p:txBody>
-      </p:sp>
-      <p:sp>
-        <p:nvSpPr>
-          <p:cNvPr id="4" name="Footer Placeholder 3">
-            <a:extLst>
-              <a:ext uri="{FF2B5EF4-FFF2-40B4-BE49-F238E27FC236}">
-                <a16:creationId xmlns:a16="http://schemas.microsoft.com/office/drawing/2014/main" id="{BCF90246-DFB2-A340-AADC-E85D28C31B3E}"/>
-              </a:ext>
-            </a:extLst>
-          </p:cNvPr>
-          <p:cNvSpPr>
-            <a:spLocks noGrp="1"/>
-          </p:cNvSpPr>
-          <p:nvPr>
-            <p:ph type="ftr" sz="quarter" idx="11"/>
-          </p:nvPr>
-        </p:nvSpPr>
-        <p:spPr>
-          <a:xfrm>
-            <a:off x="2871106" y="6356350"/>
-            <a:ext cx="4114800" cy="365125"/>
-          </a:xfrm>
-        </p:spPr>
-        <p:txBody>
-          <a:bodyPr/>
-          <a:lstStyle/>
-          <a:p>
-            <a:r>
-              <a:rPr lang="en-US" dirty="0">
-                <a:latin typeface="Baskerville Old Face" panose="02020602080505020303" pitchFamily="18" charset="0"/>
-              </a:rPr>
-              <a:t>Njangi-Hub</a:t>
-            </a:r>
-          </a:p>
-        </p:txBody>
-      </p:sp>
-      <p:sp>
-        <p:nvSpPr>
-          <p:cNvPr id="5" name="Slide Number Placeholder 4">
-            <a:extLst>
-              <a:ext uri="{FF2B5EF4-FFF2-40B4-BE49-F238E27FC236}">
-                <a16:creationId xmlns:a16="http://schemas.microsoft.com/office/drawing/2014/main" id="{987CCF58-9B83-4A4F-8CA9-3D9C9BB7A287}"/>
-              </a:ext>
-            </a:extLst>
-          </p:cNvPr>
-          <p:cNvSpPr>
-            <a:spLocks noGrp="1"/>
-          </p:cNvSpPr>
-          <p:nvPr>
-            <p:ph type="sldNum" sz="quarter" idx="12"/>
-          </p:nvPr>
-        </p:nvSpPr>
-        <p:spPr>
-          <a:xfrm>
-            <a:off x="8332334" y="6356350"/>
-            <a:ext cx="1167495" cy="365125"/>
-          </a:xfrm>
-        </p:spPr>
-        <p:txBody>
-          <a:bodyPr/>
-          <a:lstStyle/>
-          <a:p>
-            <a:fld id="{294A09A9-5501-47C1-A89A-A340965A2BE2}" type="slidenum">
-              <a:rPr lang="en-US" smtClean="0">
-                <a:latin typeface="Baskerville Old Face" panose="02020602080505020303" pitchFamily="18" charset="0"/>
-              </a:rPr>
-              <a:pPr/>
-              <a:t>2</a:t>
-            </a:fld>
-            <a:endParaRPr lang="en-US" dirty="0">
-              <a:latin typeface="Baskerville Old Face" panose="02020602080505020303" pitchFamily="18" charset="0"/>
-            </a:endParaRPr>
-          </a:p>
-        </p:txBody>
-      </p:sp>
-      <p:pic>
-        <p:nvPicPr>
-          <p:cNvPr id="11" name="Picture Placeholder 10" descr="A person in a red shirt&#10;&#10;Description automatically generated">
-            <a:extLst>
-              <a:ext uri="{FF2B5EF4-FFF2-40B4-BE49-F238E27FC236}">
-                <a16:creationId xmlns:a16="http://schemas.microsoft.com/office/drawing/2014/main" id="{E954443B-AADA-A9E2-4709-D135348DE969}"/>
-              </a:ext>
-            </a:extLst>
-          </p:cNvPr>
-          <p:cNvPicPr>
-            <a:picLocks noGrp="1" noChangeAspect="1"/>
-          </p:cNvPicPr>
-          <p:nvPr>
-            <p:ph type="pic" sz="quarter" idx="14"/>
-          </p:nvPr>
-        </p:nvPicPr>
-        <p:blipFill>
-          <a:blip r:embed="rId2"/>
-          <a:srcRect t="8490" b="8490"/>
-          <a:stretch>
-            <a:fillRect/>
-          </a:stretch>
-        </p:blipFill>
-        <p:spPr/>
-      </p:pic>
-      <p:sp>
-        <p:nvSpPr>
-          <p:cNvPr id="10" name="Picture Placeholder 9">
-            <a:extLst>
-              <a:ext uri="{FF2B5EF4-FFF2-40B4-BE49-F238E27FC236}">
-                <a16:creationId xmlns:a16="http://schemas.microsoft.com/office/drawing/2014/main" id="{CDF671B8-21A7-DA30-C726-B662C6901CFD}"/>
-              </a:ext>
-            </a:extLst>
-          </p:cNvPr>
-          <p:cNvSpPr>
-            <a:spLocks noGrp="1"/>
-          </p:cNvSpPr>
-          <p:nvPr>
-            <p:ph type="pic" sz="quarter" idx="16"/>
-          </p:nvPr>
-        </p:nvSpPr>
-        <p:spPr/>
-      </p:sp>
-      <p:sp>
-        <p:nvSpPr>
-          <p:cNvPr id="12" name="Picture Placeholder 11">
-            <a:extLst>
-              <a:ext uri="{FF2B5EF4-FFF2-40B4-BE49-F238E27FC236}">
-                <a16:creationId xmlns:a16="http://schemas.microsoft.com/office/drawing/2014/main" id="{C3D9F597-AAE8-0C45-EEF4-CA2462F4B8F0}"/>
-              </a:ext>
-            </a:extLst>
-          </p:cNvPr>
-          <p:cNvSpPr>
-            <a:spLocks noGrp="1"/>
-          </p:cNvSpPr>
-          <p:nvPr>
-            <p:ph type="pic" sz="quarter" idx="15"/>
-          </p:nvPr>
-        </p:nvSpPr>
-        <p:spPr/>
-      </p:sp>
-      <p:pic>
-        <p:nvPicPr>
-          <p:cNvPr id="28" name="Picture Placeholder 27">
-            <a:extLst>
-              <a:ext uri="{FF2B5EF4-FFF2-40B4-BE49-F238E27FC236}">
-                <a16:creationId xmlns:a16="http://schemas.microsoft.com/office/drawing/2014/main" id="{A3722873-4092-4733-C4DA-EC8002AC9913}"/>
-              </a:ext>
-            </a:extLst>
-          </p:cNvPr>
-          <p:cNvPicPr>
-            <a:picLocks noGrp="1" noChangeAspect="1"/>
-          </p:cNvPicPr>
-          <p:nvPr>
-            <p:ph type="pic" sz="quarter" idx="13"/>
-          </p:nvPr>
-        </p:nvPicPr>
-        <p:blipFill>
-          <a:blip r:embed="rId3"/>
-          <a:srcRect t="5166" b="5166"/>
-          <a:stretch>
-            <a:fillRect/>
-          </a:stretch>
-        </p:blipFill>
-        <p:spPr/>
-      </p:pic>
-    </p:spTree>
-    <p:extLst>
-      <p:ext uri="{BB962C8B-B14F-4D97-AF65-F5344CB8AC3E}">
-        <p14:creationId xmlns:p14="http://schemas.microsoft.com/office/powerpoint/2010/main" val="3335690284"/>
-      </p:ext>
-    </p:extLst>
-  </p:cSld>
-  <p:clrMapOvr>
-    <a:masterClrMapping/>
-  </p:clrMapOvr>
-</p:sld>
-</file>
-
-<file path=ppt/slides/slide3.xml><?xml version="1.0" encoding="utf-8"?>
-<p:sld xmlns:a="http://schemas.openxmlformats.org/drawingml/2006/main" xmlns:r="http://schemas.openxmlformats.org/officeDocument/2006/relationships" xmlns:p="http://schemas.openxmlformats.org/presentationml/2006/main">
-  <p:cSld>
-    <p:spTree>
-      <p:nvGrpSpPr>
-        <p:cNvPr id="1" name=""/>
-        <p:cNvGrpSpPr/>
-        <p:nvPr/>
-      </p:nvGrpSpPr>
-      <p:grpSpPr>
-        <a:xfrm>
-          <a:off x="0" y="0"/>
-          <a:ext cx="0" cy="0"/>
-          <a:chOff x="0" y="0"/>
-          <a:chExt cx="0" cy="0"/>
-        </a:xfrm>
-      </p:grpSpPr>
-      <p:sp>
-        <p:nvSpPr>
-          <p:cNvPr id="2" name="Title 1">
-            <a:extLst>
-              <a:ext uri="{FF2B5EF4-FFF2-40B4-BE49-F238E27FC236}">
-                <a16:creationId xmlns:a16="http://schemas.microsoft.com/office/drawing/2014/main" id="{912DF434-28DB-4621-A497-D62C41CE0419}"/>
-              </a:ext>
-            </a:extLst>
-          </p:cNvPr>
-          <p:cNvSpPr>
-            <a:spLocks noGrp="1"/>
-          </p:cNvSpPr>
-          <p:nvPr>
-            <p:ph type="title"/>
-          </p:nvPr>
-        </p:nvSpPr>
-        <p:spPr>
-          <a:xfrm>
-            <a:off x="1167492" y="381001"/>
-            <a:ext cx="9779183" cy="1092718"/>
-          </a:xfrm>
-        </p:spPr>
-        <p:txBody>
-          <a:bodyPr/>
-          <a:lstStyle/>
-          <a:p>
-            <a:pPr>
-              <a:lnSpc>
-                <a:spcPct val="150000"/>
-              </a:lnSpc>
-            </a:pPr>
-            <a:r>
-              <a:rPr lang="en-US" dirty="0">
-                <a:latin typeface="Baskerville Old Face" panose="02020602080505020303" pitchFamily="18" charset="0"/>
-              </a:rPr>
-              <a:t>Agenda</a:t>
-            </a:r>
-          </a:p>
-        </p:txBody>
-      </p:sp>
-      <p:sp>
-        <p:nvSpPr>
-          <p:cNvPr id="3" name="Content Placeholder 2">
-            <a:extLst>
-              <a:ext uri="{FF2B5EF4-FFF2-40B4-BE49-F238E27FC236}">
-                <a16:creationId xmlns:a16="http://schemas.microsoft.com/office/drawing/2014/main" id="{22788C46-D0BC-4307-AE55-7601A139E7CB}"/>
-              </a:ext>
-            </a:extLst>
-          </p:cNvPr>
-          <p:cNvSpPr>
-            <a:spLocks noGrp="1"/>
-          </p:cNvSpPr>
-          <p:nvPr>
-            <p:ph idx="1"/>
-          </p:nvPr>
-        </p:nvSpPr>
-        <p:spPr>
-          <a:xfrm>
-            <a:off x="1167493" y="1724629"/>
-            <a:ext cx="9779182" cy="3659654"/>
-          </a:xfrm>
-        </p:spPr>
-        <p:txBody>
           <a:bodyPr vert="horz" lIns="91440" tIns="45720" rIns="91440" bIns="45720" rtlCol="0" anchor="t">
-            <a:normAutofit fontScale="85000" lnSpcReduction="20000"/>
+            <a:normAutofit/>
           </a:bodyPr>
           <a:lstStyle/>
           <a:p>
@@ -19500,153 +18359,8 @@
               <a:rPr lang="en-US" dirty="0">
                 <a:latin typeface="Baskerville Old Face" panose="02020602080505020303" pitchFamily="18" charset="0"/>
               </a:rPr>
-              <a:t>Problem statement</a:t>
+              <a:t>Implement a secure user withdrawal system using third parties like MOMO and a policy that the system approves a user’s withdrawal request if and only if their secret code assigned during rotation is valid and correct, and the njangi head has approved</a:t>
             </a:r>
-          </a:p>
-          <a:p>
-            <a:pPr marL="457200" indent="-457200">
-              <a:lnSpc>
-                <a:spcPct val="150000"/>
-              </a:lnSpc>
-              <a:buFont typeface="Arial" panose="020B0604020202020204" pitchFamily="34" charset="0"/>
-              <a:buChar char="•"/>
-            </a:pPr>
-            <a:r>
-              <a:rPr lang="en-US" dirty="0">
-                <a:latin typeface="Baskerville Old Face" panose="02020602080505020303" pitchFamily="18" charset="0"/>
-              </a:rPr>
-              <a:t>Objectives</a:t>
-            </a:r>
-          </a:p>
-          <a:p>
-            <a:pPr marL="457200" indent="-457200">
-              <a:lnSpc>
-                <a:spcPct val="150000"/>
-              </a:lnSpc>
-              <a:buFont typeface="Arial" panose="020B0604020202020204" pitchFamily="34" charset="0"/>
-              <a:buChar char="•"/>
-            </a:pPr>
-            <a:r>
-              <a:rPr lang="en-US" dirty="0">
-                <a:latin typeface="Baskerville Old Face" panose="02020602080505020303" pitchFamily="18" charset="0"/>
-              </a:rPr>
-              <a:t>Project life cycle</a:t>
-            </a:r>
-          </a:p>
-          <a:p>
-            <a:pPr marL="457200" indent="-457200">
-              <a:lnSpc>
-                <a:spcPct val="150000"/>
-              </a:lnSpc>
-              <a:buFont typeface="Arial" panose="020B0604020202020204" pitchFamily="34" charset="0"/>
-              <a:buChar char="•"/>
-            </a:pPr>
-            <a:r>
-              <a:rPr lang="en-US" dirty="0">
-                <a:latin typeface="Baskerville Old Face" panose="02020602080505020303" pitchFamily="18" charset="0"/>
-              </a:rPr>
-              <a:t>Use case diagram</a:t>
-            </a:r>
-          </a:p>
-          <a:p>
-            <a:pPr marL="457200" indent="-457200">
-              <a:lnSpc>
-                <a:spcPct val="150000"/>
-              </a:lnSpc>
-              <a:buFont typeface="Arial" panose="020B0604020202020204" pitchFamily="34" charset="0"/>
-              <a:buChar char="•"/>
-            </a:pPr>
-            <a:r>
-              <a:rPr lang="en-US" dirty="0">
-                <a:latin typeface="Baskerville Old Face" panose="02020602080505020303" pitchFamily="18" charset="0"/>
-              </a:rPr>
-              <a:t>Sequence diagrams</a:t>
-            </a:r>
-          </a:p>
-          <a:p>
-            <a:pPr marL="457200" indent="-457200">
-              <a:lnSpc>
-                <a:spcPct val="150000"/>
-              </a:lnSpc>
-              <a:buFont typeface="Arial" panose="020B0604020202020204" pitchFamily="34" charset="0"/>
-              <a:buChar char="•"/>
-            </a:pPr>
-            <a:r>
-              <a:rPr lang="en-US" dirty="0">
-                <a:latin typeface="Baskerville Old Face" panose="02020602080505020303" pitchFamily="18" charset="0"/>
-              </a:rPr>
-              <a:t>Class diagram</a:t>
-            </a:r>
-          </a:p>
-          <a:p>
-            <a:endParaRPr lang="en-US" sz="2000" dirty="0"/>
-          </a:p>
-        </p:txBody>
-      </p:sp>
-      <p:sp>
-        <p:nvSpPr>
-          <p:cNvPr id="5" name="Footer Placeholder 4">
-            <a:extLst>
-              <a:ext uri="{FF2B5EF4-FFF2-40B4-BE49-F238E27FC236}">
-                <a16:creationId xmlns:a16="http://schemas.microsoft.com/office/drawing/2014/main" id="{6209FEB4-4C5C-EB43-9696-7B42453DB79B}"/>
-              </a:ext>
-            </a:extLst>
-          </p:cNvPr>
-          <p:cNvSpPr>
-            <a:spLocks noGrp="1"/>
-          </p:cNvSpPr>
-          <p:nvPr>
-            <p:ph type="ftr" sz="quarter" idx="3"/>
-          </p:nvPr>
-        </p:nvSpPr>
-        <p:spPr>
-          <a:xfrm>
-            <a:off x="4038600" y="6356350"/>
-            <a:ext cx="4114800" cy="365125"/>
-          </a:xfrm>
-        </p:spPr>
-        <p:txBody>
-          <a:bodyPr/>
-          <a:lstStyle/>
-          <a:p>
-            <a:r>
-              <a:rPr lang="en-US" dirty="0"/>
-              <a:t>Njangi-Hub</a:t>
-            </a:r>
-          </a:p>
-        </p:txBody>
-      </p:sp>
-      <p:sp>
-        <p:nvSpPr>
-          <p:cNvPr id="6" name="Slide Number Placeholder 5">
-            <a:extLst>
-              <a:ext uri="{FF2B5EF4-FFF2-40B4-BE49-F238E27FC236}">
-                <a16:creationId xmlns:a16="http://schemas.microsoft.com/office/drawing/2014/main" id="{60D470D0-6D64-5E42-9515-048F8779CD5E}"/>
-              </a:ext>
-            </a:extLst>
-          </p:cNvPr>
-          <p:cNvSpPr>
-            <a:spLocks noGrp="1"/>
-          </p:cNvSpPr>
-          <p:nvPr>
-            <p:ph type="sldNum" sz="quarter" idx="4"/>
-          </p:nvPr>
-        </p:nvSpPr>
-        <p:spPr>
-          <a:xfrm>
-            <a:off x="10153276" y="6356350"/>
-            <a:ext cx="1657723" cy="365125"/>
-          </a:xfrm>
-        </p:spPr>
-        <p:txBody>
-          <a:bodyPr/>
-          <a:lstStyle/>
-          <a:p>
-            <a:fld id="{294A09A9-5501-47C1-A89A-A340965A2BE2}" type="slidenum">
-              <a:rPr lang="en-US" smtClean="0"/>
-              <a:pPr/>
-              <a:t>3</a:t>
-            </a:fld>
             <a:endParaRPr lang="en-US" dirty="0"/>
           </a:p>
         </p:txBody>
@@ -19654,7 +18368,7 @@
     </p:spTree>
     <p:extLst>
       <p:ext uri="{BB962C8B-B14F-4D97-AF65-F5344CB8AC3E}">
-        <p14:creationId xmlns:p14="http://schemas.microsoft.com/office/powerpoint/2010/main" val="1325608595"/>
+        <p14:creationId xmlns:p14="http://schemas.microsoft.com/office/powerpoint/2010/main" val="3177204161"/>
       </p:ext>
     </p:extLst>
   </p:cSld>
@@ -19664,222 +18378,7 @@
 </p:sld>
 </file>
 
-<file path=ppt/slides/slide4.xml><?xml version="1.0" encoding="utf-8"?>
-<p:sld xmlns:a="http://schemas.openxmlformats.org/drawingml/2006/main" xmlns:r="http://schemas.openxmlformats.org/officeDocument/2006/relationships" xmlns:p="http://schemas.openxmlformats.org/presentationml/2006/main">
-  <p:cSld>
-    <p:spTree>
-      <p:nvGrpSpPr>
-        <p:cNvPr id="1" name=""/>
-        <p:cNvGrpSpPr/>
-        <p:nvPr/>
-      </p:nvGrpSpPr>
-      <p:grpSpPr>
-        <a:xfrm>
-          <a:off x="0" y="0"/>
-          <a:ext cx="0" cy="0"/>
-          <a:chOff x="0" y="0"/>
-          <a:chExt cx="0" cy="0"/>
-        </a:xfrm>
-      </p:grpSpPr>
-      <p:sp>
-        <p:nvSpPr>
-          <p:cNvPr id="2" name="Title 1">
-            <a:extLst>
-              <a:ext uri="{FF2B5EF4-FFF2-40B4-BE49-F238E27FC236}">
-                <a16:creationId xmlns:a16="http://schemas.microsoft.com/office/drawing/2014/main" id="{8C543F67-9C70-4748-8C0C-3A7863422F99}"/>
-              </a:ext>
-            </a:extLst>
-          </p:cNvPr>
-          <p:cNvSpPr>
-            <a:spLocks noGrp="1"/>
-          </p:cNvSpPr>
-          <p:nvPr>
-            <p:ph type="title"/>
-          </p:nvPr>
-        </p:nvSpPr>
-        <p:spPr>
-          <a:xfrm>
-            <a:off x="1167492" y="381000"/>
-            <a:ext cx="9779183" cy="1325563"/>
-          </a:xfrm>
-        </p:spPr>
-        <p:txBody>
-          <a:bodyPr/>
-          <a:lstStyle/>
-          <a:p>
-            <a:pPr algn="ctr">
-              <a:lnSpc>
-                <a:spcPct val="150000"/>
-              </a:lnSpc>
-            </a:pPr>
-            <a:r>
-              <a:rPr lang="en-US" sz="5400" dirty="0">
-                <a:latin typeface="Baskerville Old Face" panose="02020602080505020303" pitchFamily="18" charset="0"/>
-              </a:rPr>
-              <a:t>Problem statement</a:t>
-            </a:r>
-          </a:p>
-        </p:txBody>
-      </p:sp>
-      <p:sp>
-        <p:nvSpPr>
-          <p:cNvPr id="3" name="Content Placeholder 2">
-            <a:extLst>
-              <a:ext uri="{FF2B5EF4-FFF2-40B4-BE49-F238E27FC236}">
-                <a16:creationId xmlns:a16="http://schemas.microsoft.com/office/drawing/2014/main" id="{95B371F2-DBA5-415A-82C8-651F587B857A}"/>
-              </a:ext>
-            </a:extLst>
-          </p:cNvPr>
-          <p:cNvSpPr>
-            <a:spLocks noGrp="1"/>
-          </p:cNvSpPr>
-          <p:nvPr>
-            <p:ph type="body" idx="1"/>
-          </p:nvPr>
-        </p:nvSpPr>
-        <p:spPr>
-          <a:xfrm>
-            <a:off x="1167492" y="2653167"/>
-            <a:ext cx="9779183" cy="3436483"/>
-          </a:xfrm>
-        </p:spPr>
-        <p:txBody>
-          <a:bodyPr vert="horz" lIns="91440" tIns="45720" rIns="91440" bIns="45720" rtlCol="0" anchor="t">
-            <a:normAutofit fontScale="92500" lnSpcReduction="20000"/>
-          </a:bodyPr>
-          <a:lstStyle/>
-          <a:p>
-            <a:pPr marL="342900" indent="-342900">
-              <a:buFont typeface="Wingdings" panose="05000000000000000000" pitchFamily="2" charset="2"/>
-              <a:buChar char="q"/>
-            </a:pPr>
-            <a:r>
-              <a:rPr lang="en-US" sz="3200" dirty="0">
-                <a:latin typeface="Baskerville Old Face" panose="02020602080505020303" pitchFamily="18" charset="0"/>
-              </a:rPr>
-              <a:t>Manual management of financial transactions in njangi houses</a:t>
-            </a:r>
-          </a:p>
-          <a:p>
-            <a:pPr marL="342900" indent="-342900">
-              <a:buFont typeface="Wingdings" panose="05000000000000000000" pitchFamily="2" charset="2"/>
-              <a:buChar char="q"/>
-            </a:pPr>
-            <a:r>
-              <a:rPr lang="en-US" sz="3200" dirty="0">
-                <a:latin typeface="Baskerville Old Face" panose="02020602080505020303" pitchFamily="18" charset="0"/>
-              </a:rPr>
-              <a:t>Lack of transparency in transactions</a:t>
-            </a:r>
-          </a:p>
-          <a:p>
-            <a:pPr marL="342900" indent="-342900">
-              <a:buFont typeface="Wingdings" panose="05000000000000000000" pitchFamily="2" charset="2"/>
-              <a:buChar char="q"/>
-            </a:pPr>
-            <a:r>
-              <a:rPr lang="en-US" sz="3200" dirty="0">
-                <a:latin typeface="Baskerville Old Face" panose="02020602080505020303" pitchFamily="18" charset="0"/>
-              </a:rPr>
-              <a:t>Lack of efficient payment and rotation schedules</a:t>
-            </a:r>
-          </a:p>
-          <a:p>
-            <a:pPr marL="342900" indent="-342900">
-              <a:buFont typeface="Wingdings" panose="05000000000000000000" pitchFamily="2" charset="2"/>
-              <a:buChar char="q"/>
-            </a:pPr>
-            <a:r>
-              <a:rPr lang="en-US" sz="3200" dirty="0">
-                <a:latin typeface="Baskerville Old Face" panose="02020602080505020303" pitchFamily="18" charset="0"/>
-              </a:rPr>
-              <a:t>Poor reporting and tracking systems </a:t>
-            </a:r>
-          </a:p>
-        </p:txBody>
-      </p:sp>
-      <p:sp>
-        <p:nvSpPr>
-          <p:cNvPr id="5" name="Footer Placeholder 4">
-            <a:extLst>
-              <a:ext uri="{FF2B5EF4-FFF2-40B4-BE49-F238E27FC236}">
-                <a16:creationId xmlns:a16="http://schemas.microsoft.com/office/drawing/2014/main" id="{D593FA18-50D6-0344-B477-1D7C91CF4029}"/>
-              </a:ext>
-            </a:extLst>
-          </p:cNvPr>
-          <p:cNvSpPr>
-            <a:spLocks noGrp="1"/>
-          </p:cNvSpPr>
-          <p:nvPr>
-            <p:ph type="ftr" sz="quarter" idx="11"/>
-          </p:nvPr>
-        </p:nvSpPr>
-        <p:spPr>
-          <a:xfrm>
-            <a:off x="4038600" y="6356350"/>
-            <a:ext cx="4114800" cy="365125"/>
-          </a:xfrm>
-        </p:spPr>
-        <p:txBody>
-          <a:bodyPr/>
-          <a:lstStyle/>
-          <a:p>
-            <a:r>
-              <a:rPr lang="en-US" dirty="0"/>
-              <a:t>Njangi-Hub</a:t>
-            </a:r>
-          </a:p>
-        </p:txBody>
-      </p:sp>
-      <p:sp>
-        <p:nvSpPr>
-          <p:cNvPr id="6" name="Slide Number Placeholder 5">
-            <a:extLst>
-              <a:ext uri="{FF2B5EF4-FFF2-40B4-BE49-F238E27FC236}">
-                <a16:creationId xmlns:a16="http://schemas.microsoft.com/office/drawing/2014/main" id="{134C72D2-EFDF-844A-8472-CB49A59B127B}"/>
-              </a:ext>
-            </a:extLst>
-          </p:cNvPr>
-          <p:cNvSpPr>
-            <a:spLocks noGrp="1"/>
-          </p:cNvSpPr>
-          <p:nvPr>
-            <p:ph type="sldNum" sz="quarter" idx="12"/>
-          </p:nvPr>
-        </p:nvSpPr>
-        <p:spPr>
-          <a:xfrm>
-            <a:off x="10206318" y="6356350"/>
-            <a:ext cx="1604682" cy="365125"/>
-          </a:xfrm>
-        </p:spPr>
-        <p:txBody>
-          <a:bodyPr/>
-          <a:lstStyle/>
-          <a:p>
-            <a:fld id="{294A09A9-5501-47C1-A89A-A340965A2BE2}" type="slidenum">
-              <a:rPr lang="en-US" smtClean="0"/>
-              <a:pPr/>
-              <a:t>4</a:t>
-            </a:fld>
-            <a:endParaRPr lang="en-US" dirty="0"/>
-          </a:p>
-        </p:txBody>
-      </p:sp>
-    </p:spTree>
-    <p:extLst>
-      <p:ext uri="{BB962C8B-B14F-4D97-AF65-F5344CB8AC3E}">
-        <p14:creationId xmlns:p14="http://schemas.microsoft.com/office/powerpoint/2010/main" val="1639799154"/>
-      </p:ext>
-    </p:extLst>
-  </p:cSld>
-  <p:clrMapOvr>
-    <a:masterClrMapping/>
-  </p:clrMapOvr>
-</p:sld>
-</file>
-
-<file path=ppt/slides/slide5.xml><?xml version="1.0" encoding="utf-8"?>
+<file path=ppt/slides/slide11.xml><?xml version="1.0" encoding="utf-8"?>
 <p:sld xmlns:a="http://schemas.openxmlformats.org/drawingml/2006/main" xmlns:r="http://schemas.openxmlformats.org/officeDocument/2006/relationships" xmlns:p="http://schemas.openxmlformats.org/presentationml/2006/main">
   <p:cSld>
     <p:spTree>
@@ -19922,7 +18421,7 @@
               <a:rPr lang="en-US" sz="6000" dirty="0">
                 <a:latin typeface="Baskerville Old Face" panose="02020602080505020303" pitchFamily="18" charset="0"/>
               </a:rPr>
-              <a:t>Objectives</a:t>
+              <a:t>Functional Requirements</a:t>
             </a:r>
           </a:p>
         </p:txBody>
@@ -19946,7 +18445,7 @@
         <p:spPr/>
         <p:txBody>
           <a:bodyPr vert="horz" lIns="91440" tIns="45720" rIns="91440" bIns="45720" rtlCol="0" anchor="t">
-            <a:normAutofit/>
+            <a:normAutofit fontScale="92500" lnSpcReduction="20000"/>
           </a:bodyPr>
           <a:lstStyle/>
           <a:p>
@@ -19961,7 +18460,7 @@
               <a:rPr lang="en-US" dirty="0">
                 <a:latin typeface="Baskerville Old Face" panose="02020602080505020303" pitchFamily="18" charset="0"/>
               </a:rPr>
-              <a:t>Implement and automate efficient contribution management</a:t>
+              <a:t>Users must be able to create, verify and manage accounts</a:t>
             </a:r>
           </a:p>
           <a:p>
@@ -19976,7 +18475,7 @@
               <a:rPr lang="en-US" dirty="0">
                 <a:latin typeface="Baskerville Old Face" panose="02020602080505020303" pitchFamily="18" charset="0"/>
               </a:rPr>
-              <a:t>Automate njangi process and save time wasted in follow ups</a:t>
+              <a:t>System must be able to generate and manage reports and tracking</a:t>
             </a:r>
           </a:p>
           <a:p>
@@ -19991,7 +18490,7 @@
               <a:rPr lang="en-US" dirty="0">
                 <a:latin typeface="Baskerville Old Face" panose="02020602080505020303" pitchFamily="18" charset="0"/>
               </a:rPr>
-              <a:t>Enhance transparency and accountability in njangi</a:t>
+              <a:t>Verified users must be able to create and manage njangi groups</a:t>
             </a:r>
           </a:p>
           <a:p>
@@ -20006,7 +18505,22 @@
               <a:rPr lang="en-US" dirty="0">
                 <a:latin typeface="Baskerville Old Face" panose="02020602080505020303" pitchFamily="18" charset="0"/>
               </a:rPr>
-              <a:t>Ensure security and data privacy for users and their transactions</a:t>
+              <a:t>Verified users must be able to join njangi groups</a:t>
+            </a:r>
+          </a:p>
+          <a:p>
+            <a:pPr marL="457200" indent="-457200">
+              <a:lnSpc>
+                <a:spcPct val="150000"/>
+              </a:lnSpc>
+              <a:buFont typeface="Arial" panose="020B0604020202020204" pitchFamily="34" charset="0"/>
+              <a:buChar char="•"/>
+            </a:pPr>
+            <a:r>
+              <a:rPr lang="en-US" dirty="0">
+                <a:latin typeface="Baskerville Old Face" panose="02020602080505020303" pitchFamily="18" charset="0"/>
+              </a:rPr>
+              <a:t>Users must be able to pay and withdraw contributions</a:t>
             </a:r>
           </a:p>
           <a:p>
@@ -20017,7 +18531,7 @@
     </p:spTree>
     <p:extLst>
       <p:ext uri="{BB962C8B-B14F-4D97-AF65-F5344CB8AC3E}">
-        <p14:creationId xmlns:p14="http://schemas.microsoft.com/office/powerpoint/2010/main" val="3446797337"/>
+        <p14:creationId xmlns:p14="http://schemas.microsoft.com/office/powerpoint/2010/main" val="1140540027"/>
       </p:ext>
     </p:extLst>
   </p:cSld>
@@ -20027,7 +18541,7 @@
 </p:sld>
 </file>
 
-<file path=ppt/slides/slide6.xml><?xml version="1.0" encoding="utf-8"?>
+<file path=ppt/slides/slide12.xml><?xml version="1.0" encoding="utf-8"?>
 <p:sld xmlns:a="http://schemas.openxmlformats.org/drawingml/2006/main" xmlns:r="http://schemas.openxmlformats.org/officeDocument/2006/relationships" xmlns:p="http://schemas.openxmlformats.org/presentationml/2006/main">
   <p:cSld>
     <p:spTree>
@@ -20070,7 +18584,7 @@
               <a:rPr lang="en-US" sz="6000" dirty="0">
                 <a:latin typeface="Baskerville Old Face" panose="02020602080505020303" pitchFamily="18" charset="0"/>
               </a:rPr>
-              <a:t>Functional Requirements</a:t>
+              <a:t>Non-Functional Requirements</a:t>
             </a:r>
           </a:p>
         </p:txBody>
@@ -20109,169 +18623,6 @@
               <a:rPr lang="en-US" dirty="0">
                 <a:latin typeface="Baskerville Old Face" panose="02020602080505020303" pitchFamily="18" charset="0"/>
               </a:rPr>
-              <a:t>Users must be able to create, verify and manage accounts</a:t>
-            </a:r>
-          </a:p>
-          <a:p>
-            <a:pPr marL="457200" indent="-457200">
-              <a:lnSpc>
-                <a:spcPct val="150000"/>
-              </a:lnSpc>
-              <a:buFont typeface="Arial" panose="020B0604020202020204" pitchFamily="34" charset="0"/>
-              <a:buChar char="•"/>
-            </a:pPr>
-            <a:r>
-              <a:rPr lang="en-US" dirty="0">
-                <a:latin typeface="Baskerville Old Face" panose="02020602080505020303" pitchFamily="18" charset="0"/>
-              </a:rPr>
-              <a:t>System must be able to generate and manage reports and tracking</a:t>
-            </a:r>
-          </a:p>
-          <a:p>
-            <a:pPr marL="457200" indent="-457200">
-              <a:lnSpc>
-                <a:spcPct val="150000"/>
-              </a:lnSpc>
-              <a:buFont typeface="Arial" panose="020B0604020202020204" pitchFamily="34" charset="0"/>
-              <a:buChar char="•"/>
-            </a:pPr>
-            <a:r>
-              <a:rPr lang="en-US" dirty="0">
-                <a:latin typeface="Baskerville Old Face" panose="02020602080505020303" pitchFamily="18" charset="0"/>
-              </a:rPr>
-              <a:t>Verified users must be able to create and manage njangi groups</a:t>
-            </a:r>
-          </a:p>
-          <a:p>
-            <a:pPr marL="457200" indent="-457200">
-              <a:lnSpc>
-                <a:spcPct val="150000"/>
-              </a:lnSpc>
-              <a:buFont typeface="Arial" panose="020B0604020202020204" pitchFamily="34" charset="0"/>
-              <a:buChar char="•"/>
-            </a:pPr>
-            <a:r>
-              <a:rPr lang="en-US" dirty="0">
-                <a:latin typeface="Baskerville Old Face" panose="02020602080505020303" pitchFamily="18" charset="0"/>
-              </a:rPr>
-              <a:t>Verified users must be able to join njangi groups</a:t>
-            </a:r>
-          </a:p>
-          <a:p>
-            <a:pPr marL="457200" indent="-457200">
-              <a:lnSpc>
-                <a:spcPct val="150000"/>
-              </a:lnSpc>
-              <a:buFont typeface="Arial" panose="020B0604020202020204" pitchFamily="34" charset="0"/>
-              <a:buChar char="•"/>
-            </a:pPr>
-            <a:r>
-              <a:rPr lang="en-US" dirty="0">
-                <a:latin typeface="Baskerville Old Face" panose="02020602080505020303" pitchFamily="18" charset="0"/>
-              </a:rPr>
-              <a:t>Users must be able to pay and withdraw contributions</a:t>
-            </a:r>
-          </a:p>
-          <a:p>
-            <a:endParaRPr lang="en-US" dirty="0"/>
-          </a:p>
-        </p:txBody>
-      </p:sp>
-    </p:spTree>
-    <p:extLst>
-      <p:ext uri="{BB962C8B-B14F-4D97-AF65-F5344CB8AC3E}">
-        <p14:creationId xmlns:p14="http://schemas.microsoft.com/office/powerpoint/2010/main" val="1140540027"/>
-      </p:ext>
-    </p:extLst>
-  </p:cSld>
-  <p:clrMapOvr>
-    <a:masterClrMapping/>
-  </p:clrMapOvr>
-</p:sld>
-</file>
-
-<file path=ppt/slides/slide7.xml><?xml version="1.0" encoding="utf-8"?>
-<p:sld xmlns:a="http://schemas.openxmlformats.org/drawingml/2006/main" xmlns:r="http://schemas.openxmlformats.org/officeDocument/2006/relationships" xmlns:p="http://schemas.openxmlformats.org/presentationml/2006/main">
-  <p:cSld>
-    <p:spTree>
-      <p:nvGrpSpPr>
-        <p:cNvPr id="1" name=""/>
-        <p:cNvGrpSpPr/>
-        <p:nvPr/>
-      </p:nvGrpSpPr>
-      <p:grpSpPr>
-        <a:xfrm>
-          <a:off x="0" y="0"/>
-          <a:ext cx="0" cy="0"/>
-          <a:chOff x="0" y="0"/>
-          <a:chExt cx="0" cy="0"/>
-        </a:xfrm>
-      </p:grpSpPr>
-      <p:sp>
-        <p:nvSpPr>
-          <p:cNvPr id="2" name="Title 1">
-            <a:extLst>
-              <a:ext uri="{FF2B5EF4-FFF2-40B4-BE49-F238E27FC236}">
-                <a16:creationId xmlns:a16="http://schemas.microsoft.com/office/drawing/2014/main" id="{8460295B-54B9-4937-90E3-BAB9CE69E30B}"/>
-              </a:ext>
-            </a:extLst>
-          </p:cNvPr>
-          <p:cNvSpPr>
-            <a:spLocks noGrp="1"/>
-          </p:cNvSpPr>
-          <p:nvPr>
-            <p:ph type="title"/>
-          </p:nvPr>
-        </p:nvSpPr>
-        <p:spPr/>
-        <p:txBody>
-          <a:bodyPr/>
-          <a:lstStyle/>
-          <a:p>
-            <a:pPr algn="ctr"/>
-            <a:r>
-              <a:rPr lang="en-US" sz="6000" dirty="0">
-                <a:latin typeface="Baskerville Old Face" panose="02020602080505020303" pitchFamily="18" charset="0"/>
-              </a:rPr>
-              <a:t>Non-Functional Requirements</a:t>
-            </a:r>
-          </a:p>
-        </p:txBody>
-      </p:sp>
-      <p:sp>
-        <p:nvSpPr>
-          <p:cNvPr id="4" name="Text Placeholder 3">
-            <a:extLst>
-              <a:ext uri="{FF2B5EF4-FFF2-40B4-BE49-F238E27FC236}">
-                <a16:creationId xmlns:a16="http://schemas.microsoft.com/office/drawing/2014/main" id="{D51A6D85-3837-435F-A342-5A3F98172B12}"/>
-              </a:ext>
-            </a:extLst>
-          </p:cNvPr>
-          <p:cNvSpPr>
-            <a:spLocks noGrp="1"/>
-          </p:cNvSpPr>
-          <p:nvPr>
-            <p:ph idx="1"/>
-          </p:nvPr>
-        </p:nvSpPr>
-        <p:spPr/>
-        <p:txBody>
-          <a:bodyPr vert="horz" lIns="91440" tIns="45720" rIns="91440" bIns="45720" rtlCol="0" anchor="t">
-            <a:normAutofit fontScale="92500" lnSpcReduction="20000"/>
-          </a:bodyPr>
-          <a:lstStyle/>
-          <a:p>
-            <a:pPr marL="457200" indent="-457200">
-              <a:lnSpc>
-                <a:spcPct val="150000"/>
-              </a:lnSpc>
-              <a:buFont typeface="Arial" panose="020B0604020202020204" pitchFamily="34" charset="0"/>
-              <a:buChar char="•"/>
-            </a:pPr>
-            <a:r>
-              <a:rPr lang="en-US" dirty="0">
-                <a:latin typeface="Baskerville Old Face" panose="02020602080505020303" pitchFamily="18" charset="0"/>
-              </a:rPr>
               <a:t>Security</a:t>
             </a:r>
           </a:p>
@@ -20353,7 +18704,7 @@
 </p:sld>
 </file>
 
-<file path=ppt/slides/slide8.xml><?xml version="1.0" encoding="utf-8"?>
+<file path=ppt/slides/slide13.xml><?xml version="1.0" encoding="utf-8"?>
 <p:sld xmlns:a="http://schemas.openxmlformats.org/drawingml/2006/main" xmlns:r="http://schemas.openxmlformats.org/officeDocument/2006/relationships" xmlns:p="http://schemas.openxmlformats.org/presentationml/2006/main">
   <p:cSld>
     <p:spTree>
@@ -20453,7 +18804,7 @@
             <a:fld id="{294A09A9-5501-47C1-A89A-A340965A2BE2}" type="slidenum">
               <a:rPr lang="en-US" smtClean="0"/>
               <a:pPr/>
-              <a:t>8</a:t>
+              <a:t>13</a:t>
             </a:fld>
             <a:endParaRPr lang="en-US" dirty="0"/>
           </a:p>
@@ -20504,7 +18855,7 @@
 </p:sld>
 </file>
 
-<file path=ppt/slides/slide9.xml><?xml version="1.0" encoding="utf-8"?>
+<file path=ppt/slides/slide14.xml><?xml version="1.0" encoding="utf-8"?>
 <p:sld xmlns:a="http://schemas.openxmlformats.org/drawingml/2006/main" xmlns:r="http://schemas.openxmlformats.org/officeDocument/2006/relationships" xmlns:p="http://schemas.openxmlformats.org/presentationml/2006/main">
   <p:cSld>
     <p:spTree>
@@ -20631,7 +18982,7 @@
           <a:p>
             <a:fld id="{294A09A9-5501-47C1-A89A-A340965A2BE2}" type="slidenum">
               <a:rPr lang="en-US" smtClean="0"/>
-              <a:t>9</a:t>
+              <a:t>14</a:t>
             </a:fld>
             <a:endParaRPr lang="en-US" dirty="0"/>
           </a:p>
@@ -20641,6 +18992,2180 @@
     <p:extLst>
       <p:ext uri="{BB962C8B-B14F-4D97-AF65-F5344CB8AC3E}">
         <p14:creationId xmlns:p14="http://schemas.microsoft.com/office/powerpoint/2010/main" val="932498405"/>
+      </p:ext>
+    </p:extLst>
+  </p:cSld>
+  <p:clrMapOvr>
+    <a:masterClrMapping/>
+  </p:clrMapOvr>
+</p:sld>
+</file>
+
+<file path=ppt/slides/slide15.xml><?xml version="1.0" encoding="utf-8"?>
+<p:sld xmlns:a="http://schemas.openxmlformats.org/drawingml/2006/main" xmlns:r="http://schemas.openxmlformats.org/officeDocument/2006/relationships" xmlns:p="http://schemas.openxmlformats.org/presentationml/2006/main">
+  <p:cSld>
+    <p:spTree>
+      <p:nvGrpSpPr>
+        <p:cNvPr id="1" name=""/>
+        <p:cNvGrpSpPr/>
+        <p:nvPr/>
+      </p:nvGrpSpPr>
+      <p:grpSpPr>
+        <a:xfrm>
+          <a:off x="0" y="0"/>
+          <a:ext cx="0" cy="0"/>
+          <a:chOff x="0" y="0"/>
+          <a:chExt cx="0" cy="0"/>
+        </a:xfrm>
+      </p:grpSpPr>
+      <p:sp>
+        <p:nvSpPr>
+          <p:cNvPr id="2" name="Title 1">
+            <a:extLst>
+              <a:ext uri="{FF2B5EF4-FFF2-40B4-BE49-F238E27FC236}">
+                <a16:creationId xmlns:a16="http://schemas.microsoft.com/office/drawing/2014/main" id="{CB687F20-DD1F-4C4B-527B-09DA3870586B}"/>
+              </a:ext>
+            </a:extLst>
+          </p:cNvPr>
+          <p:cNvSpPr>
+            <a:spLocks noGrp="1"/>
+          </p:cNvSpPr>
+          <p:nvPr>
+            <p:ph type="title"/>
+          </p:nvPr>
+        </p:nvSpPr>
+        <p:spPr/>
+        <p:txBody>
+          <a:bodyPr/>
+          <a:lstStyle/>
+          <a:p>
+            <a:pPr algn="ctr"/>
+            <a:r>
+              <a:rPr lang="en-US" sz="5400" dirty="0">
+                <a:latin typeface="Baskerville Old Face" panose="02020602080505020303" pitchFamily="18" charset="0"/>
+              </a:rPr>
+              <a:t>Existing System</a:t>
+            </a:r>
+            <a:endParaRPr lang="en-CM" sz="5400" dirty="0">
+              <a:latin typeface="Baskerville Old Face" panose="02020602080505020303" pitchFamily="18" charset="0"/>
+            </a:endParaRPr>
+          </a:p>
+        </p:txBody>
+      </p:sp>
+      <p:sp>
+        <p:nvSpPr>
+          <p:cNvPr id="3" name="Content Placeholder 2">
+            <a:extLst>
+              <a:ext uri="{FF2B5EF4-FFF2-40B4-BE49-F238E27FC236}">
+                <a16:creationId xmlns:a16="http://schemas.microsoft.com/office/drawing/2014/main" id="{FE7CCBD0-A821-C487-F64F-26C075565DCE}"/>
+              </a:ext>
+            </a:extLst>
+          </p:cNvPr>
+          <p:cNvSpPr>
+            <a:spLocks noGrp="1"/>
+          </p:cNvSpPr>
+          <p:nvPr>
+            <p:ph idx="1"/>
+          </p:nvPr>
+        </p:nvSpPr>
+        <p:spPr/>
+        <p:txBody>
+          <a:bodyPr/>
+          <a:lstStyle/>
+          <a:p>
+            <a:pPr marL="457200" indent="-457200">
+              <a:lnSpc>
+                <a:spcPct val="150000"/>
+              </a:lnSpc>
+              <a:buFont typeface="Arial" panose="020B0604020202020204" pitchFamily="34" charset="0"/>
+              <a:buChar char="•"/>
+            </a:pPr>
+            <a:r>
+              <a:rPr lang="en-US" sz="3200" dirty="0">
+                <a:latin typeface="Baskerville Old Face" panose="02020602080505020303" pitchFamily="18" charset="0"/>
+              </a:rPr>
+              <a:t>Manual system</a:t>
+            </a:r>
+          </a:p>
+          <a:p>
+            <a:pPr marL="457200" indent="-457200">
+              <a:lnSpc>
+                <a:spcPct val="150000"/>
+              </a:lnSpc>
+              <a:buFont typeface="Arial" panose="020B0604020202020204" pitchFamily="34" charset="0"/>
+              <a:buChar char="•"/>
+            </a:pPr>
+            <a:r>
+              <a:rPr lang="en-US" sz="3200" dirty="0">
+                <a:latin typeface="Baskerville Old Face" panose="02020602080505020303" pitchFamily="18" charset="0"/>
+              </a:rPr>
+              <a:t>No existing system in Cameroon</a:t>
+            </a:r>
+          </a:p>
+          <a:p>
+            <a:endParaRPr lang="en-CM" dirty="0"/>
+          </a:p>
+        </p:txBody>
+      </p:sp>
+      <p:sp>
+        <p:nvSpPr>
+          <p:cNvPr id="4" name="Footer Placeholder 3">
+            <a:extLst>
+              <a:ext uri="{FF2B5EF4-FFF2-40B4-BE49-F238E27FC236}">
+                <a16:creationId xmlns:a16="http://schemas.microsoft.com/office/drawing/2014/main" id="{C065695A-1892-92AD-11D7-69A3389A81C2}"/>
+              </a:ext>
+            </a:extLst>
+          </p:cNvPr>
+          <p:cNvSpPr>
+            <a:spLocks noGrp="1"/>
+          </p:cNvSpPr>
+          <p:nvPr>
+            <p:ph type="ftr" sz="quarter" idx="3"/>
+          </p:nvPr>
+        </p:nvSpPr>
+        <p:spPr/>
+        <p:txBody>
+          <a:bodyPr/>
+          <a:lstStyle/>
+          <a:p>
+            <a:r>
+              <a:rPr lang="en-US" dirty="0"/>
+              <a:t>Njangi-Hub</a:t>
+            </a:r>
+          </a:p>
+        </p:txBody>
+      </p:sp>
+      <p:sp>
+        <p:nvSpPr>
+          <p:cNvPr id="5" name="Slide Number Placeholder 4">
+            <a:extLst>
+              <a:ext uri="{FF2B5EF4-FFF2-40B4-BE49-F238E27FC236}">
+                <a16:creationId xmlns:a16="http://schemas.microsoft.com/office/drawing/2014/main" id="{6F1122C5-CB19-7CC4-CF98-72A0118707E2}"/>
+              </a:ext>
+            </a:extLst>
+          </p:cNvPr>
+          <p:cNvSpPr>
+            <a:spLocks noGrp="1"/>
+          </p:cNvSpPr>
+          <p:nvPr>
+            <p:ph type="sldNum" sz="quarter" idx="4"/>
+          </p:nvPr>
+        </p:nvSpPr>
+        <p:spPr/>
+        <p:txBody>
+          <a:bodyPr/>
+          <a:lstStyle/>
+          <a:p>
+            <a:fld id="{294A09A9-5501-47C1-A89A-A340965A2BE2}" type="slidenum">
+              <a:rPr lang="en-US" smtClean="0"/>
+              <a:pPr/>
+              <a:t>15</a:t>
+            </a:fld>
+            <a:endParaRPr lang="en-US" dirty="0"/>
+          </a:p>
+        </p:txBody>
+      </p:sp>
+    </p:spTree>
+    <p:extLst>
+      <p:ext uri="{BB962C8B-B14F-4D97-AF65-F5344CB8AC3E}">
+        <p14:creationId xmlns:p14="http://schemas.microsoft.com/office/powerpoint/2010/main" val="3424418183"/>
+      </p:ext>
+    </p:extLst>
+  </p:cSld>
+  <p:clrMapOvr>
+    <a:masterClrMapping/>
+  </p:clrMapOvr>
+</p:sld>
+</file>
+
+<file path=ppt/slides/slide16.xml><?xml version="1.0" encoding="utf-8"?>
+<p:sld xmlns:a="http://schemas.openxmlformats.org/drawingml/2006/main" xmlns:r="http://schemas.openxmlformats.org/officeDocument/2006/relationships" xmlns:p="http://schemas.openxmlformats.org/presentationml/2006/main">
+  <p:cSld>
+    <p:spTree>
+      <p:nvGrpSpPr>
+        <p:cNvPr id="1" name=""/>
+        <p:cNvGrpSpPr/>
+        <p:nvPr/>
+      </p:nvGrpSpPr>
+      <p:grpSpPr>
+        <a:xfrm>
+          <a:off x="0" y="0"/>
+          <a:ext cx="0" cy="0"/>
+          <a:chOff x="0" y="0"/>
+          <a:chExt cx="0" cy="0"/>
+        </a:xfrm>
+      </p:grpSpPr>
+      <p:sp>
+        <p:nvSpPr>
+          <p:cNvPr id="2" name="Title 1">
+            <a:extLst>
+              <a:ext uri="{FF2B5EF4-FFF2-40B4-BE49-F238E27FC236}">
+                <a16:creationId xmlns:a16="http://schemas.microsoft.com/office/drawing/2014/main" id="{9C613D61-4322-6317-A7AC-95FFCCEC96C0}"/>
+              </a:ext>
+            </a:extLst>
+          </p:cNvPr>
+          <p:cNvSpPr>
+            <a:spLocks noGrp="1"/>
+          </p:cNvSpPr>
+          <p:nvPr>
+            <p:ph type="ctrTitle"/>
+          </p:nvPr>
+        </p:nvSpPr>
+        <p:spPr>
+          <a:xfrm>
+            <a:off x="1048225" y="1602739"/>
+            <a:ext cx="6245912" cy="2387600"/>
+          </a:xfrm>
+        </p:spPr>
+        <p:txBody>
+          <a:bodyPr/>
+          <a:lstStyle/>
+          <a:p>
+            <a:pPr>
+              <a:lnSpc>
+                <a:spcPct val="150000"/>
+              </a:lnSpc>
+            </a:pPr>
+            <a:r>
+              <a:rPr lang="en-US" dirty="0">
+                <a:latin typeface="Baskerville Old Face" panose="02020602080505020303" pitchFamily="18" charset="0"/>
+              </a:rPr>
+              <a:t>Diagrams…</a:t>
+            </a:r>
+            <a:endParaRPr lang="en-CM" dirty="0">
+              <a:latin typeface="Baskerville Old Face" panose="02020602080505020303" pitchFamily="18" charset="0"/>
+            </a:endParaRPr>
+          </a:p>
+        </p:txBody>
+      </p:sp>
+    </p:spTree>
+    <p:extLst>
+      <p:ext uri="{BB962C8B-B14F-4D97-AF65-F5344CB8AC3E}">
+        <p14:creationId xmlns:p14="http://schemas.microsoft.com/office/powerpoint/2010/main" val="3370994497"/>
+      </p:ext>
+    </p:extLst>
+  </p:cSld>
+  <p:clrMapOvr>
+    <a:masterClrMapping/>
+  </p:clrMapOvr>
+</p:sld>
+</file>
+
+<file path=ppt/slides/slide17.xml><?xml version="1.0" encoding="utf-8"?>
+<p:sld xmlns:a="http://schemas.openxmlformats.org/drawingml/2006/main" xmlns:r="http://schemas.openxmlformats.org/officeDocument/2006/relationships" xmlns:p="http://schemas.openxmlformats.org/presentationml/2006/main">
+  <p:cSld>
+    <p:spTree>
+      <p:nvGrpSpPr>
+        <p:cNvPr id="1" name=""/>
+        <p:cNvGrpSpPr/>
+        <p:nvPr/>
+      </p:nvGrpSpPr>
+      <p:grpSpPr>
+        <a:xfrm>
+          <a:off x="0" y="0"/>
+          <a:ext cx="0" cy="0"/>
+          <a:chOff x="0" y="0"/>
+          <a:chExt cx="0" cy="0"/>
+        </a:xfrm>
+      </p:grpSpPr>
+      <p:sp>
+        <p:nvSpPr>
+          <p:cNvPr id="2" name="Title 1">
+            <a:extLst>
+              <a:ext uri="{FF2B5EF4-FFF2-40B4-BE49-F238E27FC236}">
+                <a16:creationId xmlns:a16="http://schemas.microsoft.com/office/drawing/2014/main" id="{45AEDAD5-1401-046B-A790-C095D98C531B}"/>
+              </a:ext>
+            </a:extLst>
+          </p:cNvPr>
+          <p:cNvSpPr>
+            <a:spLocks noGrp="1"/>
+          </p:cNvSpPr>
+          <p:nvPr>
+            <p:ph type="title"/>
+          </p:nvPr>
+        </p:nvSpPr>
+        <p:spPr/>
+        <p:txBody>
+          <a:bodyPr/>
+          <a:lstStyle/>
+          <a:p>
+            <a:pPr algn="ctr"/>
+            <a:r>
+              <a:rPr lang="en-US" dirty="0">
+                <a:latin typeface="Baskerville Old Face" panose="02020602080505020303" pitchFamily="18" charset="0"/>
+              </a:rPr>
+              <a:t>Use case: User’s Module</a:t>
+            </a:r>
+            <a:endParaRPr lang="en-CM" dirty="0">
+              <a:latin typeface="Baskerville Old Face" panose="02020602080505020303" pitchFamily="18" charset="0"/>
+            </a:endParaRPr>
+          </a:p>
+        </p:txBody>
+      </p:sp>
+      <p:pic>
+        <p:nvPicPr>
+          <p:cNvPr id="7" name="Content Placeholder 6">
+            <a:extLst>
+              <a:ext uri="{FF2B5EF4-FFF2-40B4-BE49-F238E27FC236}">
+                <a16:creationId xmlns:a16="http://schemas.microsoft.com/office/drawing/2014/main" id="{1CCD097E-AE9A-153C-A72B-00A90D5E4860}"/>
+              </a:ext>
+            </a:extLst>
+          </p:cNvPr>
+          <p:cNvPicPr>
+            <a:picLocks noGrp="1" noChangeAspect="1"/>
+          </p:cNvPicPr>
+          <p:nvPr>
+            <p:ph idx="1"/>
+          </p:nvPr>
+        </p:nvPicPr>
+        <p:blipFill>
+          <a:blip r:embed="rId2"/>
+          <a:stretch>
+            <a:fillRect/>
+          </a:stretch>
+        </p:blipFill>
+        <p:spPr>
+          <a:xfrm>
+            <a:off x="2755900" y="2017713"/>
+            <a:ext cx="6034635" cy="3367087"/>
+          </a:xfrm>
+        </p:spPr>
+      </p:pic>
+      <p:sp>
+        <p:nvSpPr>
+          <p:cNvPr id="4" name="Footer Placeholder 3">
+            <a:extLst>
+              <a:ext uri="{FF2B5EF4-FFF2-40B4-BE49-F238E27FC236}">
+                <a16:creationId xmlns:a16="http://schemas.microsoft.com/office/drawing/2014/main" id="{9E6D0BFE-3CB0-BD1B-9E94-89E4AFB9BFA8}"/>
+              </a:ext>
+            </a:extLst>
+          </p:cNvPr>
+          <p:cNvSpPr>
+            <a:spLocks noGrp="1"/>
+          </p:cNvSpPr>
+          <p:nvPr>
+            <p:ph type="ftr" sz="quarter" idx="3"/>
+          </p:nvPr>
+        </p:nvSpPr>
+        <p:spPr/>
+        <p:txBody>
+          <a:bodyPr/>
+          <a:lstStyle/>
+          <a:p>
+            <a:r>
+              <a:rPr lang="en-US" dirty="0"/>
+              <a:t>Njangi-Hub</a:t>
+            </a:r>
+          </a:p>
+        </p:txBody>
+      </p:sp>
+      <p:sp>
+        <p:nvSpPr>
+          <p:cNvPr id="5" name="Slide Number Placeholder 4">
+            <a:extLst>
+              <a:ext uri="{FF2B5EF4-FFF2-40B4-BE49-F238E27FC236}">
+                <a16:creationId xmlns:a16="http://schemas.microsoft.com/office/drawing/2014/main" id="{55473CC1-4CB4-CAD6-B1F0-6BE8449D086F}"/>
+              </a:ext>
+            </a:extLst>
+          </p:cNvPr>
+          <p:cNvSpPr>
+            <a:spLocks noGrp="1"/>
+          </p:cNvSpPr>
+          <p:nvPr>
+            <p:ph type="sldNum" sz="quarter" idx="4"/>
+          </p:nvPr>
+        </p:nvSpPr>
+        <p:spPr/>
+        <p:txBody>
+          <a:bodyPr/>
+          <a:lstStyle/>
+          <a:p>
+            <a:fld id="{294A09A9-5501-47C1-A89A-A340965A2BE2}" type="slidenum">
+              <a:rPr lang="en-US" smtClean="0"/>
+              <a:pPr/>
+              <a:t>17</a:t>
+            </a:fld>
+            <a:endParaRPr lang="en-US" dirty="0"/>
+          </a:p>
+        </p:txBody>
+      </p:sp>
+    </p:spTree>
+    <p:extLst>
+      <p:ext uri="{BB962C8B-B14F-4D97-AF65-F5344CB8AC3E}">
+        <p14:creationId xmlns:p14="http://schemas.microsoft.com/office/powerpoint/2010/main" val="2010260770"/>
+      </p:ext>
+    </p:extLst>
+  </p:cSld>
+  <p:clrMapOvr>
+    <a:masterClrMapping/>
+  </p:clrMapOvr>
+</p:sld>
+</file>
+
+<file path=ppt/slides/slide18.xml><?xml version="1.0" encoding="utf-8"?>
+<p:sld xmlns:a="http://schemas.openxmlformats.org/drawingml/2006/main" xmlns:r="http://schemas.openxmlformats.org/officeDocument/2006/relationships" xmlns:p="http://schemas.openxmlformats.org/presentationml/2006/main">
+  <p:cSld>
+    <p:spTree>
+      <p:nvGrpSpPr>
+        <p:cNvPr id="1" name=""/>
+        <p:cNvGrpSpPr/>
+        <p:nvPr/>
+      </p:nvGrpSpPr>
+      <p:grpSpPr>
+        <a:xfrm>
+          <a:off x="0" y="0"/>
+          <a:ext cx="0" cy="0"/>
+          <a:chOff x="0" y="0"/>
+          <a:chExt cx="0" cy="0"/>
+        </a:xfrm>
+      </p:grpSpPr>
+      <p:sp>
+        <p:nvSpPr>
+          <p:cNvPr id="2" name="Title 1">
+            <a:extLst>
+              <a:ext uri="{FF2B5EF4-FFF2-40B4-BE49-F238E27FC236}">
+                <a16:creationId xmlns:a16="http://schemas.microsoft.com/office/drawing/2014/main" id="{45AEDAD5-1401-046B-A790-C095D98C531B}"/>
+              </a:ext>
+            </a:extLst>
+          </p:cNvPr>
+          <p:cNvSpPr>
+            <a:spLocks noGrp="1"/>
+          </p:cNvSpPr>
+          <p:nvPr>
+            <p:ph type="title"/>
+          </p:nvPr>
+        </p:nvSpPr>
+        <p:spPr/>
+        <p:txBody>
+          <a:bodyPr/>
+          <a:lstStyle/>
+          <a:p>
+            <a:pPr algn="ctr"/>
+            <a:r>
+              <a:rPr lang="en-US" sz="5400" dirty="0">
+                <a:latin typeface="Baskerville Old Face" panose="02020602080505020303" pitchFamily="18" charset="0"/>
+              </a:rPr>
+              <a:t>Use case: Njangi head’s Module</a:t>
+            </a:r>
+            <a:endParaRPr lang="en-CM" sz="5400" dirty="0">
+              <a:latin typeface="Baskerville Old Face" panose="02020602080505020303" pitchFamily="18" charset="0"/>
+            </a:endParaRPr>
+          </a:p>
+        </p:txBody>
+      </p:sp>
+      <p:pic>
+        <p:nvPicPr>
+          <p:cNvPr id="7" name="Content Placeholder 6">
+            <a:extLst>
+              <a:ext uri="{FF2B5EF4-FFF2-40B4-BE49-F238E27FC236}">
+                <a16:creationId xmlns:a16="http://schemas.microsoft.com/office/drawing/2014/main" id="{BD991CF0-5E2B-4FF1-162C-0BFC843BACFC}"/>
+              </a:ext>
+            </a:extLst>
+          </p:cNvPr>
+          <p:cNvPicPr>
+            <a:picLocks noGrp="1" noChangeAspect="1"/>
+          </p:cNvPicPr>
+          <p:nvPr>
+            <p:ph idx="1"/>
+          </p:nvPr>
+        </p:nvPicPr>
+        <p:blipFill>
+          <a:blip r:embed="rId2"/>
+          <a:stretch>
+            <a:fillRect/>
+          </a:stretch>
+        </p:blipFill>
+        <p:spPr>
+          <a:xfrm>
+            <a:off x="3454400" y="2017713"/>
+            <a:ext cx="4313816" cy="3367087"/>
+          </a:xfrm>
+        </p:spPr>
+      </p:pic>
+      <p:sp>
+        <p:nvSpPr>
+          <p:cNvPr id="4" name="Footer Placeholder 3">
+            <a:extLst>
+              <a:ext uri="{FF2B5EF4-FFF2-40B4-BE49-F238E27FC236}">
+                <a16:creationId xmlns:a16="http://schemas.microsoft.com/office/drawing/2014/main" id="{9E6D0BFE-3CB0-BD1B-9E94-89E4AFB9BFA8}"/>
+              </a:ext>
+            </a:extLst>
+          </p:cNvPr>
+          <p:cNvSpPr>
+            <a:spLocks noGrp="1"/>
+          </p:cNvSpPr>
+          <p:nvPr>
+            <p:ph type="ftr" sz="quarter" idx="3"/>
+          </p:nvPr>
+        </p:nvSpPr>
+        <p:spPr/>
+        <p:txBody>
+          <a:bodyPr/>
+          <a:lstStyle/>
+          <a:p>
+            <a:r>
+              <a:rPr lang="en-US" dirty="0"/>
+              <a:t>Njangi-Hub</a:t>
+            </a:r>
+          </a:p>
+        </p:txBody>
+      </p:sp>
+      <p:sp>
+        <p:nvSpPr>
+          <p:cNvPr id="5" name="Slide Number Placeholder 4">
+            <a:extLst>
+              <a:ext uri="{FF2B5EF4-FFF2-40B4-BE49-F238E27FC236}">
+                <a16:creationId xmlns:a16="http://schemas.microsoft.com/office/drawing/2014/main" id="{55473CC1-4CB4-CAD6-B1F0-6BE8449D086F}"/>
+              </a:ext>
+            </a:extLst>
+          </p:cNvPr>
+          <p:cNvSpPr>
+            <a:spLocks noGrp="1"/>
+          </p:cNvSpPr>
+          <p:nvPr>
+            <p:ph type="sldNum" sz="quarter" idx="4"/>
+          </p:nvPr>
+        </p:nvSpPr>
+        <p:spPr/>
+        <p:txBody>
+          <a:bodyPr/>
+          <a:lstStyle/>
+          <a:p>
+            <a:fld id="{294A09A9-5501-47C1-A89A-A340965A2BE2}" type="slidenum">
+              <a:rPr lang="en-US" smtClean="0"/>
+              <a:pPr/>
+              <a:t>18</a:t>
+            </a:fld>
+            <a:endParaRPr lang="en-US" dirty="0"/>
+          </a:p>
+        </p:txBody>
+      </p:sp>
+    </p:spTree>
+    <p:extLst>
+      <p:ext uri="{BB962C8B-B14F-4D97-AF65-F5344CB8AC3E}">
+        <p14:creationId xmlns:p14="http://schemas.microsoft.com/office/powerpoint/2010/main" val="1674946439"/>
+      </p:ext>
+    </p:extLst>
+  </p:cSld>
+  <p:clrMapOvr>
+    <a:masterClrMapping/>
+  </p:clrMapOvr>
+</p:sld>
+</file>
+
+<file path=ppt/slides/slide19.xml><?xml version="1.0" encoding="utf-8"?>
+<p:sld xmlns:a="http://schemas.openxmlformats.org/drawingml/2006/main" xmlns:r="http://schemas.openxmlformats.org/officeDocument/2006/relationships" xmlns:p="http://schemas.openxmlformats.org/presentationml/2006/main">
+  <p:cSld>
+    <p:spTree>
+      <p:nvGrpSpPr>
+        <p:cNvPr id="1" name=""/>
+        <p:cNvGrpSpPr/>
+        <p:nvPr/>
+      </p:nvGrpSpPr>
+      <p:grpSpPr>
+        <a:xfrm>
+          <a:off x="0" y="0"/>
+          <a:ext cx="0" cy="0"/>
+          <a:chOff x="0" y="0"/>
+          <a:chExt cx="0" cy="0"/>
+        </a:xfrm>
+      </p:grpSpPr>
+      <p:sp>
+        <p:nvSpPr>
+          <p:cNvPr id="2" name="Title 1">
+            <a:extLst>
+              <a:ext uri="{FF2B5EF4-FFF2-40B4-BE49-F238E27FC236}">
+                <a16:creationId xmlns:a16="http://schemas.microsoft.com/office/drawing/2014/main" id="{69FAE308-3076-43DB-B834-DA0B0AE19AF9}"/>
+              </a:ext>
+            </a:extLst>
+          </p:cNvPr>
+          <p:cNvSpPr>
+            <a:spLocks noGrp="1"/>
+          </p:cNvSpPr>
+          <p:nvPr>
+            <p:ph type="ctrTitle"/>
+          </p:nvPr>
+        </p:nvSpPr>
+        <p:spPr>
+          <a:xfrm>
+            <a:off x="926194" y="2734200"/>
+            <a:ext cx="6245912" cy="1389600"/>
+          </a:xfrm>
+        </p:spPr>
+        <p:txBody>
+          <a:bodyPr/>
+          <a:lstStyle/>
+          <a:p>
+            <a:r>
+              <a:rPr lang="en-US" sz="6600" dirty="0">
+                <a:latin typeface="Baskerville Old Face" panose="02020602080505020303" pitchFamily="18" charset="0"/>
+              </a:rPr>
+              <a:t>Thank you</a:t>
+            </a:r>
+          </a:p>
+        </p:txBody>
+      </p:sp>
+    </p:spTree>
+    <p:extLst>
+      <p:ext uri="{BB962C8B-B14F-4D97-AF65-F5344CB8AC3E}">
+        <p14:creationId xmlns:p14="http://schemas.microsoft.com/office/powerpoint/2010/main" val="926184573"/>
+      </p:ext>
+    </p:extLst>
+  </p:cSld>
+  <p:clrMapOvr>
+    <a:masterClrMapping/>
+  </p:clrMapOvr>
+</p:sld>
+</file>
+
+<file path=ppt/slides/slide2.xml><?xml version="1.0" encoding="utf-8"?>
+<p:sld xmlns:a="http://schemas.openxmlformats.org/drawingml/2006/main" xmlns:r="http://schemas.openxmlformats.org/officeDocument/2006/relationships" xmlns:p="http://schemas.openxmlformats.org/presentationml/2006/main">
+  <p:cSld>
+    <p:spTree>
+      <p:nvGrpSpPr>
+        <p:cNvPr id="1" name=""/>
+        <p:cNvGrpSpPr/>
+        <p:nvPr/>
+      </p:nvGrpSpPr>
+      <p:grpSpPr>
+        <a:xfrm>
+          <a:off x="0" y="0"/>
+          <a:ext cx="0" cy="0"/>
+          <a:chOff x="0" y="0"/>
+          <a:chExt cx="0" cy="0"/>
+        </a:xfrm>
+      </p:grpSpPr>
+      <p:sp>
+        <p:nvSpPr>
+          <p:cNvPr id="2" name="Title 1">
+            <a:extLst>
+              <a:ext uri="{FF2B5EF4-FFF2-40B4-BE49-F238E27FC236}">
+                <a16:creationId xmlns:a16="http://schemas.microsoft.com/office/drawing/2014/main" id="{27A6F7BB-30A8-4980-AD4A-2FB0B53FA6C9}"/>
+              </a:ext>
+            </a:extLst>
+          </p:cNvPr>
+          <p:cNvSpPr>
+            <a:spLocks noGrp="1"/>
+          </p:cNvSpPr>
+          <p:nvPr>
+            <p:ph type="title"/>
+          </p:nvPr>
+        </p:nvSpPr>
+        <p:spPr>
+          <a:xfrm>
+            <a:off x="750430" y="381000"/>
+            <a:ext cx="8401624" cy="1325563"/>
+          </a:xfrm>
+        </p:spPr>
+        <p:txBody>
+          <a:bodyPr/>
+          <a:lstStyle/>
+          <a:p>
+            <a:pPr algn="ctr"/>
+            <a:r>
+              <a:rPr lang="en-US" sz="5400" dirty="0">
+                <a:latin typeface="Baskerville Old Face" panose="02020602080505020303" pitchFamily="18" charset="0"/>
+              </a:rPr>
+              <a:t>Meet our team</a:t>
+            </a:r>
+          </a:p>
+        </p:txBody>
+      </p:sp>
+      <p:sp>
+        <p:nvSpPr>
+          <p:cNvPr id="34" name="Text Placeholder 33">
+            <a:extLst>
+              <a:ext uri="{FF2B5EF4-FFF2-40B4-BE49-F238E27FC236}">
+                <a16:creationId xmlns:a16="http://schemas.microsoft.com/office/drawing/2014/main" id="{C1C92E27-D550-F44E-8491-927F819E72B8}"/>
+              </a:ext>
+            </a:extLst>
+          </p:cNvPr>
+          <p:cNvSpPr>
+            <a:spLocks noGrp="1"/>
+          </p:cNvSpPr>
+          <p:nvPr>
+            <p:ph type="body" sz="quarter" idx="17"/>
+          </p:nvPr>
+        </p:nvSpPr>
+        <p:spPr>
+          <a:xfrm>
+            <a:off x="2123351" y="2426400"/>
+            <a:ext cx="2281237" cy="347662"/>
+          </a:xfrm>
+        </p:spPr>
+        <p:txBody>
+          <a:bodyPr/>
+          <a:lstStyle/>
+          <a:p>
+            <a:r>
+              <a:rPr lang="en-US" sz="2000" dirty="0">
+                <a:latin typeface="Baskerville Old Face" panose="02020602080505020303" pitchFamily="18" charset="0"/>
+              </a:rPr>
+              <a:t>Kanyi Vanessa</a:t>
+            </a:r>
+          </a:p>
+        </p:txBody>
+      </p:sp>
+      <p:sp>
+        <p:nvSpPr>
+          <p:cNvPr id="35" name="Text Placeholder 34">
+            <a:extLst>
+              <a:ext uri="{FF2B5EF4-FFF2-40B4-BE49-F238E27FC236}">
+                <a16:creationId xmlns:a16="http://schemas.microsoft.com/office/drawing/2014/main" id="{7D722C50-45F7-D84B-B216-568F72D66349}"/>
+              </a:ext>
+            </a:extLst>
+          </p:cNvPr>
+          <p:cNvSpPr>
+            <a:spLocks noGrp="1"/>
+          </p:cNvSpPr>
+          <p:nvPr>
+            <p:ph type="body" sz="quarter" idx="18"/>
+          </p:nvPr>
+        </p:nvSpPr>
+        <p:spPr>
+          <a:xfrm>
+            <a:off x="2123350" y="2811646"/>
+            <a:ext cx="2281237" cy="347662"/>
+          </a:xfrm>
+        </p:spPr>
+        <p:txBody>
+          <a:bodyPr/>
+          <a:lstStyle/>
+          <a:p>
+            <a:r>
+              <a:rPr lang="en-US" sz="1600" dirty="0">
+                <a:latin typeface="Baskerville Old Face" panose="02020602080505020303" pitchFamily="18" charset="0"/>
+              </a:rPr>
+              <a:t>Analyst</a:t>
+            </a:r>
+          </a:p>
+        </p:txBody>
+      </p:sp>
+      <p:sp>
+        <p:nvSpPr>
+          <p:cNvPr id="36" name="Text Placeholder 35">
+            <a:extLst>
+              <a:ext uri="{FF2B5EF4-FFF2-40B4-BE49-F238E27FC236}">
+                <a16:creationId xmlns:a16="http://schemas.microsoft.com/office/drawing/2014/main" id="{176187A9-3EBE-F64D-AE99-021BB3767F90}"/>
+              </a:ext>
+            </a:extLst>
+          </p:cNvPr>
+          <p:cNvSpPr>
+            <a:spLocks noGrp="1"/>
+          </p:cNvSpPr>
+          <p:nvPr>
+            <p:ph type="body" sz="quarter" idx="19"/>
+          </p:nvPr>
+        </p:nvSpPr>
+        <p:spPr>
+          <a:xfrm>
+            <a:off x="6870817" y="2422565"/>
+            <a:ext cx="2281237" cy="347662"/>
+          </a:xfrm>
+        </p:spPr>
+        <p:txBody>
+          <a:bodyPr/>
+          <a:lstStyle/>
+          <a:p>
+            <a:r>
+              <a:rPr lang="en-US" sz="2000" dirty="0">
+                <a:latin typeface="Baskerville Old Face" panose="02020602080505020303" pitchFamily="18" charset="0"/>
+              </a:rPr>
+              <a:t>Kwa Adella</a:t>
+            </a:r>
+          </a:p>
+        </p:txBody>
+      </p:sp>
+      <p:sp>
+        <p:nvSpPr>
+          <p:cNvPr id="37" name="Text Placeholder 36">
+            <a:extLst>
+              <a:ext uri="{FF2B5EF4-FFF2-40B4-BE49-F238E27FC236}">
+                <a16:creationId xmlns:a16="http://schemas.microsoft.com/office/drawing/2014/main" id="{7990731F-95DE-4F44-8EA0-E275CEAFD8A2}"/>
+              </a:ext>
+            </a:extLst>
+          </p:cNvPr>
+          <p:cNvSpPr>
+            <a:spLocks noGrp="1"/>
+          </p:cNvSpPr>
+          <p:nvPr>
+            <p:ph type="body" sz="quarter" idx="20"/>
+          </p:nvPr>
+        </p:nvSpPr>
+        <p:spPr>
+          <a:xfrm>
+            <a:off x="6870816" y="2807811"/>
+            <a:ext cx="2281237" cy="347662"/>
+          </a:xfrm>
+        </p:spPr>
+        <p:txBody>
+          <a:bodyPr/>
+          <a:lstStyle/>
+          <a:p>
+            <a:r>
+              <a:rPr lang="en-US" sz="1600" dirty="0">
+                <a:latin typeface="Baskerville Old Face" panose="02020602080505020303" pitchFamily="18" charset="0"/>
+              </a:rPr>
+              <a:t>Designer and Analyst</a:t>
+            </a:r>
+          </a:p>
+        </p:txBody>
+      </p:sp>
+      <p:sp>
+        <p:nvSpPr>
+          <p:cNvPr id="38" name="Text Placeholder 37">
+            <a:extLst>
+              <a:ext uri="{FF2B5EF4-FFF2-40B4-BE49-F238E27FC236}">
+                <a16:creationId xmlns:a16="http://schemas.microsoft.com/office/drawing/2014/main" id="{5B19EE51-628F-CA4E-94B0-57E9ACA1446A}"/>
+              </a:ext>
+            </a:extLst>
+          </p:cNvPr>
+          <p:cNvSpPr>
+            <a:spLocks noGrp="1"/>
+          </p:cNvSpPr>
+          <p:nvPr>
+            <p:ph type="body" sz="quarter" idx="21"/>
+          </p:nvPr>
+        </p:nvSpPr>
+        <p:spPr>
+          <a:xfrm>
+            <a:off x="2123351" y="4498793"/>
+            <a:ext cx="2281237" cy="347662"/>
+          </a:xfrm>
+        </p:spPr>
+        <p:txBody>
+          <a:bodyPr/>
+          <a:lstStyle/>
+          <a:p>
+            <a:r>
+              <a:rPr lang="en-US" sz="2000" dirty="0">
+                <a:latin typeface="Baskerville Old Face" panose="02020602080505020303" pitchFamily="18" charset="0"/>
+              </a:rPr>
+              <a:t>Neba Nadine</a:t>
+            </a:r>
+          </a:p>
+        </p:txBody>
+      </p:sp>
+      <p:sp>
+        <p:nvSpPr>
+          <p:cNvPr id="39" name="Text Placeholder 38">
+            <a:extLst>
+              <a:ext uri="{FF2B5EF4-FFF2-40B4-BE49-F238E27FC236}">
+                <a16:creationId xmlns:a16="http://schemas.microsoft.com/office/drawing/2014/main" id="{2A6ACC78-74DF-604E-BD14-4BBE7B4EEF5B}"/>
+              </a:ext>
+            </a:extLst>
+          </p:cNvPr>
+          <p:cNvSpPr>
+            <a:spLocks noGrp="1"/>
+          </p:cNvSpPr>
+          <p:nvPr>
+            <p:ph type="body" sz="quarter" idx="22"/>
+          </p:nvPr>
+        </p:nvSpPr>
+        <p:spPr>
+          <a:xfrm>
+            <a:off x="2123350" y="4884039"/>
+            <a:ext cx="2281237" cy="347662"/>
+          </a:xfrm>
+        </p:spPr>
+        <p:txBody>
+          <a:bodyPr/>
+          <a:lstStyle/>
+          <a:p>
+            <a:r>
+              <a:rPr lang="en-US" sz="1600" dirty="0">
+                <a:latin typeface="Baskerville Old Face" panose="02020602080505020303" pitchFamily="18" charset="0"/>
+              </a:rPr>
+              <a:t>Analyst</a:t>
+            </a:r>
+          </a:p>
+        </p:txBody>
+      </p:sp>
+      <p:sp>
+        <p:nvSpPr>
+          <p:cNvPr id="40" name="Text Placeholder 39">
+            <a:extLst>
+              <a:ext uri="{FF2B5EF4-FFF2-40B4-BE49-F238E27FC236}">
+                <a16:creationId xmlns:a16="http://schemas.microsoft.com/office/drawing/2014/main" id="{9DC429C0-1DEB-1F4F-AE66-C503B31B7B48}"/>
+              </a:ext>
+            </a:extLst>
+          </p:cNvPr>
+          <p:cNvSpPr>
+            <a:spLocks noGrp="1"/>
+          </p:cNvSpPr>
+          <p:nvPr>
+            <p:ph type="body" sz="quarter" idx="23"/>
+          </p:nvPr>
+        </p:nvSpPr>
+        <p:spPr>
+          <a:xfrm>
+            <a:off x="6870817" y="4498793"/>
+            <a:ext cx="2281237" cy="347662"/>
+          </a:xfrm>
+        </p:spPr>
+        <p:txBody>
+          <a:bodyPr/>
+          <a:lstStyle/>
+          <a:p>
+            <a:r>
+              <a:rPr lang="en-US" sz="2000" dirty="0">
+                <a:latin typeface="Baskerville Old Face" panose="02020602080505020303" pitchFamily="18" charset="0"/>
+              </a:rPr>
+              <a:t>Emmanuel </a:t>
+            </a:r>
+            <a:r>
+              <a:rPr lang="en-US" sz="2000" dirty="0" err="1">
+                <a:latin typeface="Baskerville Old Face" panose="02020602080505020303" pitchFamily="18" charset="0"/>
+              </a:rPr>
+              <a:t>Takor</a:t>
+            </a:r>
+            <a:endParaRPr lang="en-US" sz="2000" dirty="0">
+              <a:latin typeface="Baskerville Old Face" panose="02020602080505020303" pitchFamily="18" charset="0"/>
+            </a:endParaRPr>
+          </a:p>
+        </p:txBody>
+      </p:sp>
+      <p:sp>
+        <p:nvSpPr>
+          <p:cNvPr id="41" name="Text Placeholder 40">
+            <a:extLst>
+              <a:ext uri="{FF2B5EF4-FFF2-40B4-BE49-F238E27FC236}">
+                <a16:creationId xmlns:a16="http://schemas.microsoft.com/office/drawing/2014/main" id="{31C0CCD4-2502-A14F-B520-7B57524EDF8E}"/>
+              </a:ext>
+            </a:extLst>
+          </p:cNvPr>
+          <p:cNvSpPr>
+            <a:spLocks noGrp="1"/>
+          </p:cNvSpPr>
+          <p:nvPr>
+            <p:ph type="body" sz="quarter" idx="24"/>
+          </p:nvPr>
+        </p:nvSpPr>
+        <p:spPr>
+          <a:xfrm>
+            <a:off x="6870816" y="4884039"/>
+            <a:ext cx="2281237" cy="347662"/>
+          </a:xfrm>
+        </p:spPr>
+        <p:txBody>
+          <a:bodyPr/>
+          <a:lstStyle/>
+          <a:p>
+            <a:r>
+              <a:rPr lang="en-US" sz="1600" dirty="0">
+                <a:latin typeface="Baskerville Old Face" panose="02020602080505020303" pitchFamily="18" charset="0"/>
+              </a:rPr>
+              <a:t>Analyst</a:t>
+            </a:r>
+          </a:p>
+        </p:txBody>
+      </p:sp>
+      <p:sp>
+        <p:nvSpPr>
+          <p:cNvPr id="4" name="Footer Placeholder 3">
+            <a:extLst>
+              <a:ext uri="{FF2B5EF4-FFF2-40B4-BE49-F238E27FC236}">
+                <a16:creationId xmlns:a16="http://schemas.microsoft.com/office/drawing/2014/main" id="{BCF90246-DFB2-A340-AADC-E85D28C31B3E}"/>
+              </a:ext>
+            </a:extLst>
+          </p:cNvPr>
+          <p:cNvSpPr>
+            <a:spLocks noGrp="1"/>
+          </p:cNvSpPr>
+          <p:nvPr>
+            <p:ph type="ftr" sz="quarter" idx="11"/>
+          </p:nvPr>
+        </p:nvSpPr>
+        <p:spPr>
+          <a:xfrm>
+            <a:off x="2871106" y="6356350"/>
+            <a:ext cx="4114800" cy="365125"/>
+          </a:xfrm>
+        </p:spPr>
+        <p:txBody>
+          <a:bodyPr/>
+          <a:lstStyle/>
+          <a:p>
+            <a:r>
+              <a:rPr lang="en-US" dirty="0">
+                <a:latin typeface="Baskerville Old Face" panose="02020602080505020303" pitchFamily="18" charset="0"/>
+              </a:rPr>
+              <a:t>Njangi-Hub</a:t>
+            </a:r>
+          </a:p>
+        </p:txBody>
+      </p:sp>
+      <p:sp>
+        <p:nvSpPr>
+          <p:cNvPr id="5" name="Slide Number Placeholder 4">
+            <a:extLst>
+              <a:ext uri="{FF2B5EF4-FFF2-40B4-BE49-F238E27FC236}">
+                <a16:creationId xmlns:a16="http://schemas.microsoft.com/office/drawing/2014/main" id="{987CCF58-9B83-4A4F-8CA9-3D9C9BB7A287}"/>
+              </a:ext>
+            </a:extLst>
+          </p:cNvPr>
+          <p:cNvSpPr>
+            <a:spLocks noGrp="1"/>
+          </p:cNvSpPr>
+          <p:nvPr>
+            <p:ph type="sldNum" sz="quarter" idx="12"/>
+          </p:nvPr>
+        </p:nvSpPr>
+        <p:spPr>
+          <a:xfrm>
+            <a:off x="8332334" y="6356350"/>
+            <a:ext cx="1167495" cy="365125"/>
+          </a:xfrm>
+        </p:spPr>
+        <p:txBody>
+          <a:bodyPr/>
+          <a:lstStyle/>
+          <a:p>
+            <a:fld id="{294A09A9-5501-47C1-A89A-A340965A2BE2}" type="slidenum">
+              <a:rPr lang="en-US" smtClean="0">
+                <a:latin typeface="Baskerville Old Face" panose="02020602080505020303" pitchFamily="18" charset="0"/>
+              </a:rPr>
+              <a:pPr/>
+              <a:t>2</a:t>
+            </a:fld>
+            <a:endParaRPr lang="en-US" dirty="0">
+              <a:latin typeface="Baskerville Old Face" panose="02020602080505020303" pitchFamily="18" charset="0"/>
+            </a:endParaRPr>
+          </a:p>
+        </p:txBody>
+      </p:sp>
+      <p:pic>
+        <p:nvPicPr>
+          <p:cNvPr id="11" name="Picture Placeholder 10" descr="A person in a red shirt&#10;&#10;Description automatically generated">
+            <a:extLst>
+              <a:ext uri="{FF2B5EF4-FFF2-40B4-BE49-F238E27FC236}">
+                <a16:creationId xmlns:a16="http://schemas.microsoft.com/office/drawing/2014/main" id="{E954443B-AADA-A9E2-4709-D135348DE969}"/>
+              </a:ext>
+            </a:extLst>
+          </p:cNvPr>
+          <p:cNvPicPr>
+            <a:picLocks noGrp="1" noChangeAspect="1"/>
+          </p:cNvPicPr>
+          <p:nvPr>
+            <p:ph type="pic" sz="quarter" idx="14"/>
+          </p:nvPr>
+        </p:nvPicPr>
+        <p:blipFill>
+          <a:blip r:embed="rId2"/>
+          <a:srcRect t="8490" b="8490"/>
+          <a:stretch>
+            <a:fillRect/>
+          </a:stretch>
+        </p:blipFill>
+        <p:spPr/>
+      </p:pic>
+      <p:pic>
+        <p:nvPicPr>
+          <p:cNvPr id="32" name="Picture Placeholder 31">
+            <a:extLst>
+              <a:ext uri="{FF2B5EF4-FFF2-40B4-BE49-F238E27FC236}">
+                <a16:creationId xmlns:a16="http://schemas.microsoft.com/office/drawing/2014/main" id="{36A690AB-CDCA-EA04-2610-5751FBA71CF5}"/>
+              </a:ext>
+            </a:extLst>
+          </p:cNvPr>
+          <p:cNvPicPr>
+            <a:picLocks noGrp="1" noChangeAspect="1"/>
+          </p:cNvPicPr>
+          <p:nvPr>
+            <p:ph type="pic" sz="quarter" idx="16"/>
+          </p:nvPr>
+        </p:nvPicPr>
+        <p:blipFill>
+          <a:blip r:embed="rId3"/>
+          <a:srcRect l="6420" r="6420"/>
+          <a:stretch>
+            <a:fillRect/>
+          </a:stretch>
+        </p:blipFill>
+        <p:spPr/>
+      </p:pic>
+      <p:pic>
+        <p:nvPicPr>
+          <p:cNvPr id="42" name="Picture Placeholder 41">
+            <a:extLst>
+              <a:ext uri="{FF2B5EF4-FFF2-40B4-BE49-F238E27FC236}">
+                <a16:creationId xmlns:a16="http://schemas.microsoft.com/office/drawing/2014/main" id="{C88DA0A4-6658-33C7-25A9-A461D10D9EA7}"/>
+              </a:ext>
+            </a:extLst>
+          </p:cNvPr>
+          <p:cNvPicPr>
+            <a:picLocks noGrp="1" noChangeAspect="1"/>
+          </p:cNvPicPr>
+          <p:nvPr>
+            <p:ph type="pic" sz="quarter" idx="15"/>
+          </p:nvPr>
+        </p:nvPicPr>
+        <p:blipFill>
+          <a:blip r:embed="rId4"/>
+          <a:srcRect t="4106" b="4106"/>
+          <a:stretch>
+            <a:fillRect/>
+          </a:stretch>
+        </p:blipFill>
+        <p:spPr/>
+      </p:pic>
+      <p:pic>
+        <p:nvPicPr>
+          <p:cNvPr id="28" name="Picture Placeholder 27">
+            <a:extLst>
+              <a:ext uri="{FF2B5EF4-FFF2-40B4-BE49-F238E27FC236}">
+                <a16:creationId xmlns:a16="http://schemas.microsoft.com/office/drawing/2014/main" id="{A3722873-4092-4733-C4DA-EC8002AC9913}"/>
+              </a:ext>
+            </a:extLst>
+          </p:cNvPr>
+          <p:cNvPicPr>
+            <a:picLocks noGrp="1" noChangeAspect="1"/>
+          </p:cNvPicPr>
+          <p:nvPr>
+            <p:ph type="pic" sz="quarter" idx="13"/>
+          </p:nvPr>
+        </p:nvPicPr>
+        <p:blipFill>
+          <a:blip r:embed="rId5"/>
+          <a:srcRect t="5166" b="5166"/>
+          <a:stretch>
+            <a:fillRect/>
+          </a:stretch>
+        </p:blipFill>
+        <p:spPr/>
+      </p:pic>
+    </p:spTree>
+    <p:extLst>
+      <p:ext uri="{BB962C8B-B14F-4D97-AF65-F5344CB8AC3E}">
+        <p14:creationId xmlns:p14="http://schemas.microsoft.com/office/powerpoint/2010/main" val="3335690284"/>
+      </p:ext>
+    </p:extLst>
+  </p:cSld>
+  <p:clrMapOvr>
+    <a:masterClrMapping/>
+  </p:clrMapOvr>
+</p:sld>
+</file>
+
+<file path=ppt/slides/slide3.xml><?xml version="1.0" encoding="utf-8"?>
+<p:sld xmlns:a="http://schemas.openxmlformats.org/drawingml/2006/main" xmlns:r="http://schemas.openxmlformats.org/officeDocument/2006/relationships" xmlns:p="http://schemas.openxmlformats.org/presentationml/2006/main">
+  <p:cSld>
+    <p:spTree>
+      <p:nvGrpSpPr>
+        <p:cNvPr id="1" name=""/>
+        <p:cNvGrpSpPr/>
+        <p:nvPr/>
+      </p:nvGrpSpPr>
+      <p:grpSpPr>
+        <a:xfrm>
+          <a:off x="0" y="0"/>
+          <a:ext cx="0" cy="0"/>
+          <a:chOff x="0" y="0"/>
+          <a:chExt cx="0" cy="0"/>
+        </a:xfrm>
+      </p:grpSpPr>
+      <p:sp>
+        <p:nvSpPr>
+          <p:cNvPr id="2" name="Title 1">
+            <a:extLst>
+              <a:ext uri="{FF2B5EF4-FFF2-40B4-BE49-F238E27FC236}">
+                <a16:creationId xmlns:a16="http://schemas.microsoft.com/office/drawing/2014/main" id="{912DF434-28DB-4621-A497-D62C41CE0419}"/>
+              </a:ext>
+            </a:extLst>
+          </p:cNvPr>
+          <p:cNvSpPr>
+            <a:spLocks noGrp="1"/>
+          </p:cNvSpPr>
+          <p:nvPr>
+            <p:ph type="title"/>
+          </p:nvPr>
+        </p:nvSpPr>
+        <p:spPr>
+          <a:xfrm>
+            <a:off x="1167492" y="381001"/>
+            <a:ext cx="9779183" cy="1092718"/>
+          </a:xfrm>
+        </p:spPr>
+        <p:txBody>
+          <a:bodyPr/>
+          <a:lstStyle/>
+          <a:p>
+            <a:pPr>
+              <a:lnSpc>
+                <a:spcPct val="150000"/>
+              </a:lnSpc>
+            </a:pPr>
+            <a:r>
+              <a:rPr lang="en-US" dirty="0">
+                <a:latin typeface="Baskerville Old Face" panose="02020602080505020303" pitchFamily="18" charset="0"/>
+              </a:rPr>
+              <a:t>Agenda</a:t>
+            </a:r>
+          </a:p>
+        </p:txBody>
+      </p:sp>
+      <p:sp>
+        <p:nvSpPr>
+          <p:cNvPr id="3" name="Content Placeholder 2">
+            <a:extLst>
+              <a:ext uri="{FF2B5EF4-FFF2-40B4-BE49-F238E27FC236}">
+                <a16:creationId xmlns:a16="http://schemas.microsoft.com/office/drawing/2014/main" id="{22788C46-D0BC-4307-AE55-7601A139E7CB}"/>
+              </a:ext>
+            </a:extLst>
+          </p:cNvPr>
+          <p:cNvSpPr>
+            <a:spLocks noGrp="1"/>
+          </p:cNvSpPr>
+          <p:nvPr>
+            <p:ph idx="1"/>
+          </p:nvPr>
+        </p:nvSpPr>
+        <p:spPr>
+          <a:xfrm>
+            <a:off x="1167493" y="1724629"/>
+            <a:ext cx="9779182" cy="3659654"/>
+          </a:xfrm>
+        </p:spPr>
+        <p:txBody>
+          <a:bodyPr vert="horz" lIns="91440" tIns="45720" rIns="91440" bIns="45720" rtlCol="0" anchor="t">
+            <a:normAutofit fontScale="85000" lnSpcReduction="20000"/>
+          </a:bodyPr>
+          <a:lstStyle/>
+          <a:p>
+            <a:pPr marL="457200" indent="-457200">
+              <a:lnSpc>
+                <a:spcPct val="150000"/>
+              </a:lnSpc>
+              <a:buFont typeface="Arial" panose="020B0604020202020204" pitchFamily="34" charset="0"/>
+              <a:buChar char="•"/>
+            </a:pPr>
+            <a:r>
+              <a:rPr lang="en-US" dirty="0">
+                <a:latin typeface="Baskerville Old Face" panose="02020602080505020303" pitchFamily="18" charset="0"/>
+              </a:rPr>
+              <a:t>Problem statement</a:t>
+            </a:r>
+          </a:p>
+          <a:p>
+            <a:pPr marL="457200" indent="-457200">
+              <a:lnSpc>
+                <a:spcPct val="150000"/>
+              </a:lnSpc>
+              <a:buFont typeface="Arial" panose="020B0604020202020204" pitchFamily="34" charset="0"/>
+              <a:buChar char="•"/>
+            </a:pPr>
+            <a:r>
+              <a:rPr lang="en-US" dirty="0">
+                <a:latin typeface="Baskerville Old Face" panose="02020602080505020303" pitchFamily="18" charset="0"/>
+              </a:rPr>
+              <a:t>Objectives</a:t>
+            </a:r>
+          </a:p>
+          <a:p>
+            <a:pPr marL="457200" indent="-457200">
+              <a:lnSpc>
+                <a:spcPct val="150000"/>
+              </a:lnSpc>
+              <a:buFont typeface="Arial" panose="020B0604020202020204" pitchFamily="34" charset="0"/>
+              <a:buChar char="•"/>
+            </a:pPr>
+            <a:r>
+              <a:rPr lang="en-US" dirty="0">
+                <a:latin typeface="Baskerville Old Face" panose="02020602080505020303" pitchFamily="18" charset="0"/>
+              </a:rPr>
+              <a:t>Project life cycle</a:t>
+            </a:r>
+          </a:p>
+          <a:p>
+            <a:pPr marL="457200" indent="-457200">
+              <a:lnSpc>
+                <a:spcPct val="150000"/>
+              </a:lnSpc>
+              <a:buFont typeface="Arial" panose="020B0604020202020204" pitchFamily="34" charset="0"/>
+              <a:buChar char="•"/>
+            </a:pPr>
+            <a:r>
+              <a:rPr lang="en-US" dirty="0">
+                <a:latin typeface="Baskerville Old Face" panose="02020602080505020303" pitchFamily="18" charset="0"/>
+              </a:rPr>
+              <a:t>Use case diagram</a:t>
+            </a:r>
+          </a:p>
+          <a:p>
+            <a:pPr marL="457200" indent="-457200">
+              <a:lnSpc>
+                <a:spcPct val="150000"/>
+              </a:lnSpc>
+              <a:buFont typeface="Arial" panose="020B0604020202020204" pitchFamily="34" charset="0"/>
+              <a:buChar char="•"/>
+            </a:pPr>
+            <a:r>
+              <a:rPr lang="en-US" dirty="0">
+                <a:latin typeface="Baskerville Old Face" panose="02020602080505020303" pitchFamily="18" charset="0"/>
+              </a:rPr>
+              <a:t>Sequence diagrams</a:t>
+            </a:r>
+          </a:p>
+          <a:p>
+            <a:pPr marL="457200" indent="-457200">
+              <a:lnSpc>
+                <a:spcPct val="150000"/>
+              </a:lnSpc>
+              <a:buFont typeface="Arial" panose="020B0604020202020204" pitchFamily="34" charset="0"/>
+              <a:buChar char="•"/>
+            </a:pPr>
+            <a:r>
+              <a:rPr lang="en-US" dirty="0">
+                <a:latin typeface="Baskerville Old Face" panose="02020602080505020303" pitchFamily="18" charset="0"/>
+              </a:rPr>
+              <a:t>Class diagram</a:t>
+            </a:r>
+          </a:p>
+          <a:p>
+            <a:endParaRPr lang="en-US" sz="2000" dirty="0"/>
+          </a:p>
+        </p:txBody>
+      </p:sp>
+      <p:sp>
+        <p:nvSpPr>
+          <p:cNvPr id="5" name="Footer Placeholder 4">
+            <a:extLst>
+              <a:ext uri="{FF2B5EF4-FFF2-40B4-BE49-F238E27FC236}">
+                <a16:creationId xmlns:a16="http://schemas.microsoft.com/office/drawing/2014/main" id="{6209FEB4-4C5C-EB43-9696-7B42453DB79B}"/>
+              </a:ext>
+            </a:extLst>
+          </p:cNvPr>
+          <p:cNvSpPr>
+            <a:spLocks noGrp="1"/>
+          </p:cNvSpPr>
+          <p:nvPr>
+            <p:ph type="ftr" sz="quarter" idx="3"/>
+          </p:nvPr>
+        </p:nvSpPr>
+        <p:spPr>
+          <a:xfrm>
+            <a:off x="4038600" y="6356350"/>
+            <a:ext cx="4114800" cy="365125"/>
+          </a:xfrm>
+        </p:spPr>
+        <p:txBody>
+          <a:bodyPr/>
+          <a:lstStyle/>
+          <a:p>
+            <a:r>
+              <a:rPr lang="en-US" dirty="0"/>
+              <a:t>Njangi-Hub</a:t>
+            </a:r>
+          </a:p>
+        </p:txBody>
+      </p:sp>
+      <p:sp>
+        <p:nvSpPr>
+          <p:cNvPr id="6" name="Slide Number Placeholder 5">
+            <a:extLst>
+              <a:ext uri="{FF2B5EF4-FFF2-40B4-BE49-F238E27FC236}">
+                <a16:creationId xmlns:a16="http://schemas.microsoft.com/office/drawing/2014/main" id="{60D470D0-6D64-5E42-9515-048F8779CD5E}"/>
+              </a:ext>
+            </a:extLst>
+          </p:cNvPr>
+          <p:cNvSpPr>
+            <a:spLocks noGrp="1"/>
+          </p:cNvSpPr>
+          <p:nvPr>
+            <p:ph type="sldNum" sz="quarter" idx="4"/>
+          </p:nvPr>
+        </p:nvSpPr>
+        <p:spPr>
+          <a:xfrm>
+            <a:off x="10153276" y="6356350"/>
+            <a:ext cx="1657723" cy="365125"/>
+          </a:xfrm>
+        </p:spPr>
+        <p:txBody>
+          <a:bodyPr/>
+          <a:lstStyle/>
+          <a:p>
+            <a:fld id="{294A09A9-5501-47C1-A89A-A340965A2BE2}" type="slidenum">
+              <a:rPr lang="en-US" smtClean="0"/>
+              <a:pPr/>
+              <a:t>3</a:t>
+            </a:fld>
+            <a:endParaRPr lang="en-US" dirty="0"/>
+          </a:p>
+        </p:txBody>
+      </p:sp>
+    </p:spTree>
+    <p:extLst>
+      <p:ext uri="{BB962C8B-B14F-4D97-AF65-F5344CB8AC3E}">
+        <p14:creationId xmlns:p14="http://schemas.microsoft.com/office/powerpoint/2010/main" val="1325608595"/>
+      </p:ext>
+    </p:extLst>
+  </p:cSld>
+  <p:clrMapOvr>
+    <a:masterClrMapping/>
+  </p:clrMapOvr>
+</p:sld>
+</file>
+
+<file path=ppt/slides/slide4.xml><?xml version="1.0" encoding="utf-8"?>
+<p:sld xmlns:a="http://schemas.openxmlformats.org/drawingml/2006/main" xmlns:r="http://schemas.openxmlformats.org/officeDocument/2006/relationships" xmlns:p="http://schemas.openxmlformats.org/presentationml/2006/main">
+  <p:cSld>
+    <p:spTree>
+      <p:nvGrpSpPr>
+        <p:cNvPr id="1" name=""/>
+        <p:cNvGrpSpPr/>
+        <p:nvPr/>
+      </p:nvGrpSpPr>
+      <p:grpSpPr>
+        <a:xfrm>
+          <a:off x="0" y="0"/>
+          <a:ext cx="0" cy="0"/>
+          <a:chOff x="0" y="0"/>
+          <a:chExt cx="0" cy="0"/>
+        </a:xfrm>
+      </p:grpSpPr>
+      <p:sp>
+        <p:nvSpPr>
+          <p:cNvPr id="2" name="Title 1">
+            <a:extLst>
+              <a:ext uri="{FF2B5EF4-FFF2-40B4-BE49-F238E27FC236}">
+                <a16:creationId xmlns:a16="http://schemas.microsoft.com/office/drawing/2014/main" id="{8C543F67-9C70-4748-8C0C-3A7863422F99}"/>
+              </a:ext>
+            </a:extLst>
+          </p:cNvPr>
+          <p:cNvSpPr>
+            <a:spLocks noGrp="1"/>
+          </p:cNvSpPr>
+          <p:nvPr>
+            <p:ph type="title"/>
+          </p:nvPr>
+        </p:nvSpPr>
+        <p:spPr/>
+        <p:txBody>
+          <a:bodyPr/>
+          <a:lstStyle/>
+          <a:p>
+            <a:pPr algn="ctr">
+              <a:lnSpc>
+                <a:spcPct val="150000"/>
+              </a:lnSpc>
+            </a:pPr>
+            <a:r>
+              <a:rPr lang="en-US" sz="5400" dirty="0">
+                <a:latin typeface="Baskerville Old Face" panose="02020602080505020303" pitchFamily="18" charset="0"/>
+              </a:rPr>
+              <a:t>Problem statement</a:t>
+            </a:r>
+          </a:p>
+        </p:txBody>
+      </p:sp>
+      <p:sp>
+        <p:nvSpPr>
+          <p:cNvPr id="3" name="Content Placeholder 2">
+            <a:extLst>
+              <a:ext uri="{FF2B5EF4-FFF2-40B4-BE49-F238E27FC236}">
+                <a16:creationId xmlns:a16="http://schemas.microsoft.com/office/drawing/2014/main" id="{95B371F2-DBA5-415A-82C8-651F587B857A}"/>
+              </a:ext>
+            </a:extLst>
+          </p:cNvPr>
+          <p:cNvSpPr>
+            <a:spLocks noGrp="1"/>
+          </p:cNvSpPr>
+          <p:nvPr>
+            <p:ph idx="1"/>
+          </p:nvPr>
+        </p:nvSpPr>
+        <p:spPr/>
+        <p:txBody>
+          <a:bodyPr vert="horz" lIns="91440" tIns="45720" rIns="91440" bIns="45720" rtlCol="0" anchor="t">
+            <a:normAutofit/>
+          </a:bodyPr>
+          <a:lstStyle/>
+          <a:p>
+            <a:pPr marL="457200" indent="-457200">
+              <a:lnSpc>
+                <a:spcPct val="150000"/>
+              </a:lnSpc>
+              <a:buFont typeface="Arial" panose="020B0604020202020204" pitchFamily="34" charset="0"/>
+              <a:buChar char="•"/>
+            </a:pPr>
+            <a:r>
+              <a:rPr lang="en-US" dirty="0">
+                <a:latin typeface="Baskerville Old Face" panose="02020602080505020303" pitchFamily="18" charset="0"/>
+              </a:rPr>
+              <a:t>Manual management of financial transactions in njangi houses</a:t>
+            </a:r>
+          </a:p>
+          <a:p>
+            <a:pPr marL="457200" indent="-457200">
+              <a:lnSpc>
+                <a:spcPct val="150000"/>
+              </a:lnSpc>
+              <a:buFont typeface="Arial" panose="020B0604020202020204" pitchFamily="34" charset="0"/>
+              <a:buChar char="•"/>
+            </a:pPr>
+            <a:r>
+              <a:rPr lang="en-US" dirty="0">
+                <a:latin typeface="Baskerville Old Face" panose="02020602080505020303" pitchFamily="18" charset="0"/>
+              </a:rPr>
+              <a:t>Lack of transparency in transactions</a:t>
+            </a:r>
+          </a:p>
+          <a:p>
+            <a:pPr marL="457200" indent="-457200">
+              <a:lnSpc>
+                <a:spcPct val="150000"/>
+              </a:lnSpc>
+              <a:buFont typeface="Arial" panose="020B0604020202020204" pitchFamily="34" charset="0"/>
+              <a:buChar char="•"/>
+            </a:pPr>
+            <a:r>
+              <a:rPr lang="en-US" dirty="0">
+                <a:latin typeface="Baskerville Old Face" panose="02020602080505020303" pitchFamily="18" charset="0"/>
+              </a:rPr>
+              <a:t>Lack of efficient payment and rotation schedules</a:t>
+            </a:r>
+          </a:p>
+          <a:p>
+            <a:pPr marL="457200" indent="-457200">
+              <a:lnSpc>
+                <a:spcPct val="150000"/>
+              </a:lnSpc>
+              <a:buFont typeface="Arial" panose="020B0604020202020204" pitchFamily="34" charset="0"/>
+              <a:buChar char="•"/>
+            </a:pPr>
+            <a:r>
+              <a:rPr lang="en-US" dirty="0">
+                <a:latin typeface="Baskerville Old Face" panose="02020602080505020303" pitchFamily="18" charset="0"/>
+              </a:rPr>
+              <a:t>Poor reporting and tracking systems </a:t>
+            </a:r>
+          </a:p>
+        </p:txBody>
+      </p:sp>
+      <p:sp>
+        <p:nvSpPr>
+          <p:cNvPr id="5" name="Footer Placeholder 4">
+            <a:extLst>
+              <a:ext uri="{FF2B5EF4-FFF2-40B4-BE49-F238E27FC236}">
+                <a16:creationId xmlns:a16="http://schemas.microsoft.com/office/drawing/2014/main" id="{D593FA18-50D6-0344-B477-1D7C91CF4029}"/>
+              </a:ext>
+            </a:extLst>
+          </p:cNvPr>
+          <p:cNvSpPr>
+            <a:spLocks noGrp="1"/>
+          </p:cNvSpPr>
+          <p:nvPr>
+            <p:ph type="ftr" sz="quarter" idx="3"/>
+          </p:nvPr>
+        </p:nvSpPr>
+        <p:spPr/>
+        <p:txBody>
+          <a:bodyPr/>
+          <a:lstStyle/>
+          <a:p>
+            <a:r>
+              <a:rPr lang="en-US" dirty="0"/>
+              <a:t>Njangi-Hub</a:t>
+            </a:r>
+          </a:p>
+        </p:txBody>
+      </p:sp>
+      <p:sp>
+        <p:nvSpPr>
+          <p:cNvPr id="6" name="Slide Number Placeholder 5">
+            <a:extLst>
+              <a:ext uri="{FF2B5EF4-FFF2-40B4-BE49-F238E27FC236}">
+                <a16:creationId xmlns:a16="http://schemas.microsoft.com/office/drawing/2014/main" id="{134C72D2-EFDF-844A-8472-CB49A59B127B}"/>
+              </a:ext>
+            </a:extLst>
+          </p:cNvPr>
+          <p:cNvSpPr>
+            <a:spLocks noGrp="1"/>
+          </p:cNvSpPr>
+          <p:nvPr>
+            <p:ph type="sldNum" sz="quarter" idx="4"/>
+          </p:nvPr>
+        </p:nvSpPr>
+        <p:spPr/>
+        <p:txBody>
+          <a:bodyPr/>
+          <a:lstStyle/>
+          <a:p>
+            <a:fld id="{294A09A9-5501-47C1-A89A-A340965A2BE2}" type="slidenum">
+              <a:rPr lang="en-US" smtClean="0"/>
+              <a:pPr/>
+              <a:t>4</a:t>
+            </a:fld>
+            <a:endParaRPr lang="en-US" dirty="0"/>
+          </a:p>
+        </p:txBody>
+      </p:sp>
+    </p:spTree>
+    <p:extLst>
+      <p:ext uri="{BB962C8B-B14F-4D97-AF65-F5344CB8AC3E}">
+        <p14:creationId xmlns:p14="http://schemas.microsoft.com/office/powerpoint/2010/main" val="1639799154"/>
+      </p:ext>
+    </p:extLst>
+  </p:cSld>
+  <p:clrMapOvr>
+    <a:masterClrMapping/>
+  </p:clrMapOvr>
+</p:sld>
+</file>
+
+<file path=ppt/slides/slide5.xml><?xml version="1.0" encoding="utf-8"?>
+<p:sld xmlns:a="http://schemas.openxmlformats.org/drawingml/2006/main" xmlns:r="http://schemas.openxmlformats.org/officeDocument/2006/relationships" xmlns:p="http://schemas.openxmlformats.org/presentationml/2006/main">
+  <p:cSld>
+    <p:spTree>
+      <p:nvGrpSpPr>
+        <p:cNvPr id="1" name=""/>
+        <p:cNvGrpSpPr/>
+        <p:nvPr/>
+      </p:nvGrpSpPr>
+      <p:grpSpPr>
+        <a:xfrm>
+          <a:off x="0" y="0"/>
+          <a:ext cx="0" cy="0"/>
+          <a:chOff x="0" y="0"/>
+          <a:chExt cx="0" cy="0"/>
+        </a:xfrm>
+      </p:grpSpPr>
+      <p:sp>
+        <p:nvSpPr>
+          <p:cNvPr id="2" name="Title 1">
+            <a:extLst>
+              <a:ext uri="{FF2B5EF4-FFF2-40B4-BE49-F238E27FC236}">
+                <a16:creationId xmlns:a16="http://schemas.microsoft.com/office/drawing/2014/main" id="{3DB2545F-34C3-B144-7D7C-89A74CE84BB9}"/>
+              </a:ext>
+            </a:extLst>
+          </p:cNvPr>
+          <p:cNvSpPr>
+            <a:spLocks noGrp="1"/>
+          </p:cNvSpPr>
+          <p:nvPr>
+            <p:ph type="title"/>
+          </p:nvPr>
+        </p:nvSpPr>
+        <p:spPr/>
+        <p:txBody>
+          <a:bodyPr/>
+          <a:lstStyle/>
+          <a:p>
+            <a:pPr algn="ctr"/>
+            <a:r>
+              <a:rPr lang="en-US" sz="6000" dirty="0">
+                <a:latin typeface="Baskerville Old Face" panose="02020602080505020303" pitchFamily="18" charset="0"/>
+              </a:rPr>
+              <a:t>Objectives</a:t>
+            </a:r>
+            <a:endParaRPr lang="en-CM" sz="5400" dirty="0">
+              <a:latin typeface="Baskerville Old Face" panose="02020602080505020303" pitchFamily="18" charset="0"/>
+            </a:endParaRPr>
+          </a:p>
+        </p:txBody>
+      </p:sp>
+      <p:sp>
+        <p:nvSpPr>
+          <p:cNvPr id="3" name="Content Placeholder 2">
+            <a:extLst>
+              <a:ext uri="{FF2B5EF4-FFF2-40B4-BE49-F238E27FC236}">
+                <a16:creationId xmlns:a16="http://schemas.microsoft.com/office/drawing/2014/main" id="{42266CD2-0AEE-67A8-9C8C-1034432AE0FA}"/>
+              </a:ext>
+            </a:extLst>
+          </p:cNvPr>
+          <p:cNvSpPr>
+            <a:spLocks noGrp="1"/>
+          </p:cNvSpPr>
+          <p:nvPr>
+            <p:ph type="body" idx="1"/>
+          </p:nvPr>
+        </p:nvSpPr>
+        <p:spPr/>
+        <p:txBody>
+          <a:bodyPr/>
+          <a:lstStyle/>
+          <a:p>
+            <a:pPr>
+              <a:lnSpc>
+                <a:spcPct val="150000"/>
+              </a:lnSpc>
+            </a:pPr>
+            <a:r>
+              <a:rPr lang="en-US" sz="3200" dirty="0">
+                <a:latin typeface="Baskerville Old Face" panose="02020602080505020303" pitchFamily="18" charset="0"/>
+              </a:rPr>
+              <a:t>The objectives for the design and implementation of a hybrid application to manage ‘njangi’ are defined as follows:</a:t>
+            </a:r>
+            <a:endParaRPr lang="en-CM" sz="3200" dirty="0">
+              <a:latin typeface="Baskerville Old Face" panose="02020602080505020303" pitchFamily="18" charset="0"/>
+            </a:endParaRPr>
+          </a:p>
+        </p:txBody>
+      </p:sp>
+      <p:sp>
+        <p:nvSpPr>
+          <p:cNvPr id="4" name="Footer Placeholder 3">
+            <a:extLst>
+              <a:ext uri="{FF2B5EF4-FFF2-40B4-BE49-F238E27FC236}">
+                <a16:creationId xmlns:a16="http://schemas.microsoft.com/office/drawing/2014/main" id="{79B751FE-DC4C-7FF4-7C46-FF1AF400D35A}"/>
+              </a:ext>
+            </a:extLst>
+          </p:cNvPr>
+          <p:cNvSpPr>
+            <a:spLocks noGrp="1"/>
+          </p:cNvSpPr>
+          <p:nvPr>
+            <p:ph type="ftr" sz="quarter" idx="11"/>
+          </p:nvPr>
+        </p:nvSpPr>
+        <p:spPr/>
+        <p:txBody>
+          <a:bodyPr/>
+          <a:lstStyle/>
+          <a:p>
+            <a:r>
+              <a:rPr lang="en-US" dirty="0"/>
+              <a:t>Njangi-Hub</a:t>
+            </a:r>
+          </a:p>
+        </p:txBody>
+      </p:sp>
+      <p:sp>
+        <p:nvSpPr>
+          <p:cNvPr id="5" name="Slide Number Placeholder 4">
+            <a:extLst>
+              <a:ext uri="{FF2B5EF4-FFF2-40B4-BE49-F238E27FC236}">
+                <a16:creationId xmlns:a16="http://schemas.microsoft.com/office/drawing/2014/main" id="{909DD73E-C699-BE5C-731E-59B0BA3E8446}"/>
+              </a:ext>
+            </a:extLst>
+          </p:cNvPr>
+          <p:cNvSpPr>
+            <a:spLocks noGrp="1"/>
+          </p:cNvSpPr>
+          <p:nvPr>
+            <p:ph type="sldNum" sz="quarter" idx="12"/>
+          </p:nvPr>
+        </p:nvSpPr>
+        <p:spPr/>
+        <p:txBody>
+          <a:bodyPr/>
+          <a:lstStyle/>
+          <a:p>
+            <a:fld id="{294A09A9-5501-47C1-A89A-A340965A2BE2}" type="slidenum">
+              <a:rPr lang="en-US" smtClean="0"/>
+              <a:pPr/>
+              <a:t>5</a:t>
+            </a:fld>
+            <a:endParaRPr lang="en-US" dirty="0"/>
+          </a:p>
+        </p:txBody>
+      </p:sp>
+    </p:spTree>
+    <p:extLst>
+      <p:ext uri="{BB962C8B-B14F-4D97-AF65-F5344CB8AC3E}">
+        <p14:creationId xmlns:p14="http://schemas.microsoft.com/office/powerpoint/2010/main" val="2409467627"/>
+      </p:ext>
+    </p:extLst>
+  </p:cSld>
+  <p:clrMapOvr>
+    <a:masterClrMapping/>
+  </p:clrMapOvr>
+</p:sld>
+</file>
+
+<file path=ppt/slides/slide6.xml><?xml version="1.0" encoding="utf-8"?>
+<p:sld xmlns:a="http://schemas.openxmlformats.org/drawingml/2006/main" xmlns:r="http://schemas.openxmlformats.org/officeDocument/2006/relationships" xmlns:p="http://schemas.openxmlformats.org/presentationml/2006/main">
+  <p:cSld>
+    <p:spTree>
+      <p:nvGrpSpPr>
+        <p:cNvPr id="1" name=""/>
+        <p:cNvGrpSpPr/>
+        <p:nvPr/>
+      </p:nvGrpSpPr>
+      <p:grpSpPr>
+        <a:xfrm>
+          <a:off x="0" y="0"/>
+          <a:ext cx="0" cy="0"/>
+          <a:chOff x="0" y="0"/>
+          <a:chExt cx="0" cy="0"/>
+        </a:xfrm>
+      </p:grpSpPr>
+      <p:sp>
+        <p:nvSpPr>
+          <p:cNvPr id="2" name="Title 1">
+            <a:extLst>
+              <a:ext uri="{FF2B5EF4-FFF2-40B4-BE49-F238E27FC236}">
+                <a16:creationId xmlns:a16="http://schemas.microsoft.com/office/drawing/2014/main" id="{8460295B-54B9-4937-90E3-BAB9CE69E30B}"/>
+              </a:ext>
+            </a:extLst>
+          </p:cNvPr>
+          <p:cNvSpPr>
+            <a:spLocks noGrp="1"/>
+          </p:cNvSpPr>
+          <p:nvPr>
+            <p:ph type="title"/>
+          </p:nvPr>
+        </p:nvSpPr>
+        <p:spPr/>
+        <p:txBody>
+          <a:bodyPr/>
+          <a:lstStyle/>
+          <a:p>
+            <a:pPr algn="ctr"/>
+            <a:r>
+              <a:rPr lang="en-US" sz="6000" dirty="0">
+                <a:latin typeface="Baskerville Old Face" panose="02020602080505020303" pitchFamily="18" charset="0"/>
+              </a:rPr>
+              <a:t>Objective 1</a:t>
+            </a:r>
+          </a:p>
+        </p:txBody>
+      </p:sp>
+      <p:sp>
+        <p:nvSpPr>
+          <p:cNvPr id="4" name="Text Placeholder 3">
+            <a:extLst>
+              <a:ext uri="{FF2B5EF4-FFF2-40B4-BE49-F238E27FC236}">
+                <a16:creationId xmlns:a16="http://schemas.microsoft.com/office/drawing/2014/main" id="{D51A6D85-3837-435F-A342-5A3F98172B12}"/>
+              </a:ext>
+            </a:extLst>
+          </p:cNvPr>
+          <p:cNvSpPr>
+            <a:spLocks noGrp="1"/>
+          </p:cNvSpPr>
+          <p:nvPr>
+            <p:ph idx="1"/>
+          </p:nvPr>
+        </p:nvSpPr>
+        <p:spPr/>
+        <p:txBody>
+          <a:bodyPr vert="horz" lIns="91440" tIns="45720" rIns="91440" bIns="45720" rtlCol="0" anchor="t">
+            <a:normAutofit fontScale="85000" lnSpcReduction="10000"/>
+          </a:bodyPr>
+          <a:lstStyle/>
+          <a:p>
+            <a:pPr marL="514350" indent="-514350">
+              <a:lnSpc>
+                <a:spcPct val="150000"/>
+              </a:lnSpc>
+              <a:buFont typeface="Arial" panose="020B0604020202020204" pitchFamily="34" charset="0"/>
+              <a:buChar char="•"/>
+            </a:pPr>
+            <a:r>
+              <a:rPr lang="en-US" sz="3200" dirty="0">
+                <a:latin typeface="Baskerville Old Face" panose="02020602080505020303" pitchFamily="18" charset="0"/>
+              </a:rPr>
+              <a:t>Develop a secure user management system, by implementing an efficient, effective and strict user verification process to be completed before a user can create, join or be added to any njangi, where they can view njangi rules and settings, including past announcements or create them</a:t>
+            </a:r>
+          </a:p>
+        </p:txBody>
+      </p:sp>
+    </p:spTree>
+    <p:extLst>
+      <p:ext uri="{BB962C8B-B14F-4D97-AF65-F5344CB8AC3E}">
+        <p14:creationId xmlns:p14="http://schemas.microsoft.com/office/powerpoint/2010/main" val="1397064680"/>
+      </p:ext>
+    </p:extLst>
+  </p:cSld>
+  <p:clrMapOvr>
+    <a:masterClrMapping/>
+  </p:clrMapOvr>
+</p:sld>
+</file>
+
+<file path=ppt/slides/slide7.xml><?xml version="1.0" encoding="utf-8"?>
+<p:sld xmlns:a="http://schemas.openxmlformats.org/drawingml/2006/main" xmlns:r="http://schemas.openxmlformats.org/officeDocument/2006/relationships" xmlns:p="http://schemas.openxmlformats.org/presentationml/2006/main">
+  <p:cSld>
+    <p:spTree>
+      <p:nvGrpSpPr>
+        <p:cNvPr id="1" name=""/>
+        <p:cNvGrpSpPr/>
+        <p:nvPr/>
+      </p:nvGrpSpPr>
+      <p:grpSpPr>
+        <a:xfrm>
+          <a:off x="0" y="0"/>
+          <a:ext cx="0" cy="0"/>
+          <a:chOff x="0" y="0"/>
+          <a:chExt cx="0" cy="0"/>
+        </a:xfrm>
+      </p:grpSpPr>
+      <p:sp>
+        <p:nvSpPr>
+          <p:cNvPr id="2" name="Title 1">
+            <a:extLst>
+              <a:ext uri="{FF2B5EF4-FFF2-40B4-BE49-F238E27FC236}">
+                <a16:creationId xmlns:a16="http://schemas.microsoft.com/office/drawing/2014/main" id="{8460295B-54B9-4937-90E3-BAB9CE69E30B}"/>
+              </a:ext>
+            </a:extLst>
+          </p:cNvPr>
+          <p:cNvSpPr>
+            <a:spLocks noGrp="1"/>
+          </p:cNvSpPr>
+          <p:nvPr>
+            <p:ph type="title"/>
+          </p:nvPr>
+        </p:nvSpPr>
+        <p:spPr/>
+        <p:txBody>
+          <a:bodyPr/>
+          <a:lstStyle/>
+          <a:p>
+            <a:pPr algn="ctr"/>
+            <a:r>
+              <a:rPr lang="en-US" sz="6000" dirty="0">
+                <a:latin typeface="Baskerville Old Face" panose="02020602080505020303" pitchFamily="18" charset="0"/>
+              </a:rPr>
+              <a:t>Objective 2</a:t>
+            </a:r>
+          </a:p>
+        </p:txBody>
+      </p:sp>
+      <p:sp>
+        <p:nvSpPr>
+          <p:cNvPr id="4" name="Text Placeholder 3">
+            <a:extLst>
+              <a:ext uri="{FF2B5EF4-FFF2-40B4-BE49-F238E27FC236}">
+                <a16:creationId xmlns:a16="http://schemas.microsoft.com/office/drawing/2014/main" id="{D51A6D85-3837-435F-A342-5A3F98172B12}"/>
+              </a:ext>
+            </a:extLst>
+          </p:cNvPr>
+          <p:cNvSpPr>
+            <a:spLocks noGrp="1"/>
+          </p:cNvSpPr>
+          <p:nvPr>
+            <p:ph idx="1"/>
+          </p:nvPr>
+        </p:nvSpPr>
+        <p:spPr/>
+        <p:txBody>
+          <a:bodyPr vert="horz" lIns="91440" tIns="45720" rIns="91440" bIns="45720" rtlCol="0" anchor="t">
+            <a:normAutofit/>
+          </a:bodyPr>
+          <a:lstStyle/>
+          <a:p>
+            <a:pPr marL="514350" indent="-514350">
+              <a:lnSpc>
+                <a:spcPct val="150000"/>
+              </a:lnSpc>
+              <a:buFont typeface="Arial" panose="020B0604020202020204" pitchFamily="34" charset="0"/>
+              <a:buChar char="•"/>
+            </a:pPr>
+            <a:r>
+              <a:rPr lang="en-US" dirty="0">
+                <a:latin typeface="Baskerville Old Face" panose="02020602080505020303" pitchFamily="18" charset="0"/>
+              </a:rPr>
+              <a:t>Implement a strict and effective contribution management system complete with reminders, which follows a contributions schedule and payment tracking for the management and implementing of fines based on the status of the payment</a:t>
+            </a:r>
+          </a:p>
+        </p:txBody>
+      </p:sp>
+    </p:spTree>
+    <p:extLst>
+      <p:ext uri="{BB962C8B-B14F-4D97-AF65-F5344CB8AC3E}">
+        <p14:creationId xmlns:p14="http://schemas.microsoft.com/office/powerpoint/2010/main" val="3446797337"/>
+      </p:ext>
+    </p:extLst>
+  </p:cSld>
+  <p:clrMapOvr>
+    <a:masterClrMapping/>
+  </p:clrMapOvr>
+</p:sld>
+</file>
+
+<file path=ppt/slides/slide8.xml><?xml version="1.0" encoding="utf-8"?>
+<p:sld xmlns:a="http://schemas.openxmlformats.org/drawingml/2006/main" xmlns:r="http://schemas.openxmlformats.org/officeDocument/2006/relationships" xmlns:p="http://schemas.openxmlformats.org/presentationml/2006/main">
+  <p:cSld>
+    <p:spTree>
+      <p:nvGrpSpPr>
+        <p:cNvPr id="1" name=""/>
+        <p:cNvGrpSpPr/>
+        <p:nvPr/>
+      </p:nvGrpSpPr>
+      <p:grpSpPr>
+        <a:xfrm>
+          <a:off x="0" y="0"/>
+          <a:ext cx="0" cy="0"/>
+          <a:chOff x="0" y="0"/>
+          <a:chExt cx="0" cy="0"/>
+        </a:xfrm>
+      </p:grpSpPr>
+      <p:sp>
+        <p:nvSpPr>
+          <p:cNvPr id="2" name="Title 1">
+            <a:extLst>
+              <a:ext uri="{FF2B5EF4-FFF2-40B4-BE49-F238E27FC236}">
+                <a16:creationId xmlns:a16="http://schemas.microsoft.com/office/drawing/2014/main" id="{8460295B-54B9-4937-90E3-BAB9CE69E30B}"/>
+              </a:ext>
+            </a:extLst>
+          </p:cNvPr>
+          <p:cNvSpPr>
+            <a:spLocks noGrp="1"/>
+          </p:cNvSpPr>
+          <p:nvPr>
+            <p:ph type="title"/>
+          </p:nvPr>
+        </p:nvSpPr>
+        <p:spPr/>
+        <p:txBody>
+          <a:bodyPr/>
+          <a:lstStyle/>
+          <a:p>
+            <a:pPr algn="ctr"/>
+            <a:r>
+              <a:rPr lang="en-US" sz="6000" dirty="0">
+                <a:latin typeface="Baskerville Old Face" panose="02020602080505020303" pitchFamily="18" charset="0"/>
+              </a:rPr>
+              <a:t>Objective 3</a:t>
+            </a:r>
+          </a:p>
+        </p:txBody>
+      </p:sp>
+      <p:sp>
+        <p:nvSpPr>
+          <p:cNvPr id="4" name="Text Placeholder 3">
+            <a:extLst>
+              <a:ext uri="{FF2B5EF4-FFF2-40B4-BE49-F238E27FC236}">
+                <a16:creationId xmlns:a16="http://schemas.microsoft.com/office/drawing/2014/main" id="{D51A6D85-3837-435F-A342-5A3F98172B12}"/>
+              </a:ext>
+            </a:extLst>
+          </p:cNvPr>
+          <p:cNvSpPr>
+            <a:spLocks noGrp="1"/>
+          </p:cNvSpPr>
+          <p:nvPr>
+            <p:ph idx="1"/>
+          </p:nvPr>
+        </p:nvSpPr>
+        <p:spPr/>
+        <p:txBody>
+          <a:bodyPr vert="horz" lIns="91440" tIns="45720" rIns="91440" bIns="45720" rtlCol="0" anchor="t">
+            <a:normAutofit/>
+          </a:bodyPr>
+          <a:lstStyle/>
+          <a:p>
+            <a:pPr marL="457200" indent="-457200">
+              <a:lnSpc>
+                <a:spcPct val="150000"/>
+              </a:lnSpc>
+              <a:buFont typeface="Arial" panose="020B0604020202020204" pitchFamily="34" charset="0"/>
+              <a:buChar char="•"/>
+            </a:pPr>
+            <a:r>
+              <a:rPr lang="en-US" dirty="0">
+                <a:latin typeface="Baskerville Old Face" panose="02020602080505020303" pitchFamily="18" charset="0"/>
+              </a:rPr>
+              <a:t>Enhance transparency and accountability in each njangi by incorporating a report generating system for every financial transaction (contributions, withdrawals), rotations and njangi rules</a:t>
+            </a:r>
+          </a:p>
+        </p:txBody>
+      </p:sp>
+    </p:spTree>
+    <p:extLst>
+      <p:ext uri="{BB962C8B-B14F-4D97-AF65-F5344CB8AC3E}">
+        <p14:creationId xmlns:p14="http://schemas.microsoft.com/office/powerpoint/2010/main" val="1704063655"/>
+      </p:ext>
+    </p:extLst>
+  </p:cSld>
+  <p:clrMapOvr>
+    <a:masterClrMapping/>
+  </p:clrMapOvr>
+</p:sld>
+</file>
+
+<file path=ppt/slides/slide9.xml><?xml version="1.0" encoding="utf-8"?>
+<p:sld xmlns:a="http://schemas.openxmlformats.org/drawingml/2006/main" xmlns:r="http://schemas.openxmlformats.org/officeDocument/2006/relationships" xmlns:p="http://schemas.openxmlformats.org/presentationml/2006/main">
+  <p:cSld>
+    <p:spTree>
+      <p:nvGrpSpPr>
+        <p:cNvPr id="1" name=""/>
+        <p:cNvGrpSpPr/>
+        <p:nvPr/>
+      </p:nvGrpSpPr>
+      <p:grpSpPr>
+        <a:xfrm>
+          <a:off x="0" y="0"/>
+          <a:ext cx="0" cy="0"/>
+          <a:chOff x="0" y="0"/>
+          <a:chExt cx="0" cy="0"/>
+        </a:xfrm>
+      </p:grpSpPr>
+      <p:sp>
+        <p:nvSpPr>
+          <p:cNvPr id="2" name="Title 1">
+            <a:extLst>
+              <a:ext uri="{FF2B5EF4-FFF2-40B4-BE49-F238E27FC236}">
+                <a16:creationId xmlns:a16="http://schemas.microsoft.com/office/drawing/2014/main" id="{8460295B-54B9-4937-90E3-BAB9CE69E30B}"/>
+              </a:ext>
+            </a:extLst>
+          </p:cNvPr>
+          <p:cNvSpPr>
+            <a:spLocks noGrp="1"/>
+          </p:cNvSpPr>
+          <p:nvPr>
+            <p:ph type="title"/>
+          </p:nvPr>
+        </p:nvSpPr>
+        <p:spPr/>
+        <p:txBody>
+          <a:bodyPr/>
+          <a:lstStyle/>
+          <a:p>
+            <a:pPr algn="ctr"/>
+            <a:r>
+              <a:rPr lang="en-US" sz="6000" dirty="0">
+                <a:latin typeface="Baskerville Old Face" panose="02020602080505020303" pitchFamily="18" charset="0"/>
+              </a:rPr>
+              <a:t>Objective 4</a:t>
+            </a:r>
+          </a:p>
+        </p:txBody>
+      </p:sp>
+      <p:sp>
+        <p:nvSpPr>
+          <p:cNvPr id="4" name="Text Placeholder 3">
+            <a:extLst>
+              <a:ext uri="{FF2B5EF4-FFF2-40B4-BE49-F238E27FC236}">
+                <a16:creationId xmlns:a16="http://schemas.microsoft.com/office/drawing/2014/main" id="{D51A6D85-3837-435F-A342-5A3F98172B12}"/>
+              </a:ext>
+            </a:extLst>
+          </p:cNvPr>
+          <p:cNvSpPr>
+            <a:spLocks noGrp="1"/>
+          </p:cNvSpPr>
+          <p:nvPr>
+            <p:ph idx="1"/>
+          </p:nvPr>
+        </p:nvSpPr>
+        <p:spPr/>
+        <p:txBody>
+          <a:bodyPr vert="horz" lIns="91440" tIns="45720" rIns="91440" bIns="45720" rtlCol="0" anchor="t">
+            <a:normAutofit/>
+          </a:bodyPr>
+          <a:lstStyle/>
+          <a:p>
+            <a:pPr marL="457200" indent="-457200">
+              <a:lnSpc>
+                <a:spcPct val="150000"/>
+              </a:lnSpc>
+              <a:buFont typeface="Arial" panose="020B0604020202020204" pitchFamily="34" charset="0"/>
+              <a:buChar char="•"/>
+            </a:pPr>
+            <a:r>
+              <a:rPr lang="en-US" dirty="0">
+                <a:latin typeface="Baskerville Old Face" panose="02020602080505020303" pitchFamily="18" charset="0"/>
+              </a:rPr>
+              <a:t>Implement a secure rotation management policy and system, by assigning unique codes to users both in automatic and manual rotations, and making the automatic rotation schedules private only for the njangi head and each member – their own schedule</a:t>
+            </a:r>
+            <a:endParaRPr lang="en-US" dirty="0"/>
+          </a:p>
+        </p:txBody>
+      </p:sp>
+    </p:spTree>
+    <p:extLst>
+      <p:ext uri="{BB962C8B-B14F-4D97-AF65-F5344CB8AC3E}">
+        <p14:creationId xmlns:p14="http://schemas.microsoft.com/office/powerpoint/2010/main" val="1399555558"/>
       </p:ext>
     </p:extLst>
   </p:cSld>
@@ -21147,6 +21672,26 @@
 </file>
 
 <file path=customXml/item1.xml><?xml version="1.0" encoding="utf-8"?>
+<p:properties xmlns:p="http://schemas.microsoft.com/office/2006/metadata/properties" xmlns:xsi="http://www.w3.org/2001/XMLSchema-instance" xmlns:pc="http://schemas.microsoft.com/office/infopath/2007/PartnerControls">
+  <documentManagement>
+    <_ip_UnifiedCompliancePolicyUIAction xmlns="http://schemas.microsoft.com/sharepoint/v3" xsi:nil="true"/>
+    <Image xmlns="71af3243-3dd4-4a8d-8c0d-dd76da1f02a5">
+      <Url xsi:nil="true"/>
+      <Description xsi:nil="true"/>
+    </Image>
+    <Status xmlns="71af3243-3dd4-4a8d-8c0d-dd76da1f02a5">Not started</Status>
+    <_ip_UnifiedCompliancePolicyProperties xmlns="http://schemas.microsoft.com/sharepoint/v3" xsi:nil="true"/>
+    <ImageTagsTaxHTField xmlns="71af3243-3dd4-4a8d-8c0d-dd76da1f02a5">
+      <Terms xmlns="http://schemas.microsoft.com/office/infopath/2007/PartnerControls"/>
+    </ImageTagsTaxHTField>
+    <TaxCatchAll xmlns="230e9df3-be65-4c73-a93b-d1236ebd677e" xsi:nil="true"/>
+    <MediaServiceKeyPoints xmlns="71af3243-3dd4-4a8d-8c0d-dd76da1f02a5" xsi:nil="true"/>
+    <Background xmlns="71af3243-3dd4-4a8d-8c0d-dd76da1f02a5">false</Background>
+  </documentManagement>
+</p:properties>
+</file>
+
+<file path=customXml/item2.xml><?xml version="1.0" encoding="utf-8"?>
 <ct:contentTypeSchema xmlns:ct="http://schemas.microsoft.com/office/2006/metadata/contentType" xmlns:ma="http://schemas.microsoft.com/office/2006/metadata/properties/metaAttributes" ct:_="" ma:_="" ma:contentTypeName="Document" ma:contentTypeID="0x01010079F111ED35F8CC479449609E8A0923A6" ma:contentTypeVersion="28" ma:contentTypeDescription="Create a new document." ma:contentTypeScope="" ma:versionID="60f5a4f2d2b0abadcf532d48ebf9cb71">
   <xsd:schema xmlns:xsd="http://www.w3.org/2001/XMLSchema" xmlns:xs="http://www.w3.org/2001/XMLSchema" xmlns:p="http://schemas.microsoft.com/office/2006/metadata/properties" xmlns:ns1="http://schemas.microsoft.com/sharepoint/v3" xmlns:ns2="71af3243-3dd4-4a8d-8c0d-dd76da1f02a5" xmlns:ns3="16c05727-aa75-4e4a-9b5f-8a80a1165891" xmlns:ns4="230e9df3-be65-4c73-a93b-d1236ebd677e" targetNamespace="http://schemas.microsoft.com/office/2006/metadata/properties" ma:root="true" ma:fieldsID="7dd78129e6a1811f84807ad11c651531" ns1:_="" ns2:_="" ns3:_="" ns4:_="">
     <xsd:import namespace="http://schemas.microsoft.com/sharepoint/v3"/>
@@ -21458,26 +22003,6 @@
 </ct:contentTypeSchema>
 </file>
 
-<file path=customXml/item2.xml><?xml version="1.0" encoding="utf-8"?>
-<p:properties xmlns:p="http://schemas.microsoft.com/office/2006/metadata/properties" xmlns:xsi="http://www.w3.org/2001/XMLSchema-instance" xmlns:pc="http://schemas.microsoft.com/office/infopath/2007/PartnerControls">
-  <documentManagement>
-    <_ip_UnifiedCompliancePolicyUIAction xmlns="http://schemas.microsoft.com/sharepoint/v3" xsi:nil="true"/>
-    <Image xmlns="71af3243-3dd4-4a8d-8c0d-dd76da1f02a5">
-      <Url xsi:nil="true"/>
-      <Description xsi:nil="true"/>
-    </Image>
-    <Status xmlns="71af3243-3dd4-4a8d-8c0d-dd76da1f02a5">Not started</Status>
-    <_ip_UnifiedCompliancePolicyProperties xmlns="http://schemas.microsoft.com/sharepoint/v3" xsi:nil="true"/>
-    <ImageTagsTaxHTField xmlns="71af3243-3dd4-4a8d-8c0d-dd76da1f02a5">
-      <Terms xmlns="http://schemas.microsoft.com/office/infopath/2007/PartnerControls"/>
-    </ImageTagsTaxHTField>
-    <TaxCatchAll xmlns="230e9df3-be65-4c73-a93b-d1236ebd677e" xsi:nil="true"/>
-    <MediaServiceKeyPoints xmlns="71af3243-3dd4-4a8d-8c0d-dd76da1f02a5" xsi:nil="true"/>
-    <Background xmlns="71af3243-3dd4-4a8d-8c0d-dd76da1f02a5">false</Background>
-  </documentManagement>
-</p:properties>
-</file>
-
 <file path=customXml/item3.xml><?xml version="1.0" encoding="utf-8"?>
 <?mso-contentType ?>
 <FormTemplates xmlns="http://schemas.microsoft.com/sharepoint/v3/contenttype/forms">
@@ -21488,6 +22013,18 @@
 </file>
 
 <file path=customXml/itemProps1.xml><?xml version="1.0" encoding="utf-8"?>
+<ds:datastoreItem xmlns:ds="http://schemas.openxmlformats.org/officeDocument/2006/customXml" ds:itemID="{1342FAFE-88B4-49B4-9588-86CB0E564E50}">
+  <ds:schemaRefs>
+    <ds:schemaRef ds:uri="http://schemas.microsoft.com/office/2006/metadata/properties"/>
+    <ds:schemaRef ds:uri="http://schemas.microsoft.com/office/infopath/2007/PartnerControls"/>
+    <ds:schemaRef ds:uri="http://schemas.microsoft.com/sharepoint/v3"/>
+    <ds:schemaRef ds:uri="71af3243-3dd4-4a8d-8c0d-dd76da1f02a5"/>
+    <ds:schemaRef ds:uri="230e9df3-be65-4c73-a93b-d1236ebd677e"/>
+  </ds:schemaRefs>
+</ds:datastoreItem>
+</file>
+
+<file path=customXml/itemProps2.xml><?xml version="1.0" encoding="utf-8"?>
 <ds:datastoreItem xmlns:ds="http://schemas.openxmlformats.org/officeDocument/2006/customXml" ds:itemID="{81C465B7-820B-4DEA-AB4B-5167C1BE9075}">
   <ds:schemaRefs>
     <ds:schemaRef ds:uri="http://schemas.microsoft.com/office/2006/metadata/contentType"/>
@@ -21508,18 +22045,6 @@
 </ds:datastoreItem>
 </file>
 
-<file path=customXml/itemProps2.xml><?xml version="1.0" encoding="utf-8"?>
-<ds:datastoreItem xmlns:ds="http://schemas.openxmlformats.org/officeDocument/2006/customXml" ds:itemID="{1342FAFE-88B4-49B4-9588-86CB0E564E50}">
-  <ds:schemaRefs>
-    <ds:schemaRef ds:uri="http://schemas.microsoft.com/office/2006/metadata/properties"/>
-    <ds:schemaRef ds:uri="http://schemas.microsoft.com/office/infopath/2007/PartnerControls"/>
-    <ds:schemaRef ds:uri="http://schemas.microsoft.com/sharepoint/v3"/>
-    <ds:schemaRef ds:uri="71af3243-3dd4-4a8d-8c0d-dd76da1f02a5"/>
-    <ds:schemaRef ds:uri="230e9df3-be65-4c73-a93b-d1236ebd677e"/>
-  </ds:schemaRefs>
-</ds:datastoreItem>
-</file>
-
 <file path=customXml/itemProps3.xml><?xml version="1.0" encoding="utf-8"?>
 <ds:datastoreItem xmlns:ds="http://schemas.openxmlformats.org/officeDocument/2006/customXml" ds:itemID="{42076B5C-85B0-4D30-852D-5E5312EEA93B}">
   <ds:schemaRefs>

</xml_diff>

<commit_message>
More edits on the presentation for requirements, added some of Emmanuel's work
</commit_message>
<xml_diff>
--- a/njangi.pptx
+++ b/njangi.pptx
@@ -5,7 +5,7 @@
     <p:sldMasterId id="2147483648" r:id="rId4"/>
   </p:sldMasterIdLst>
   <p:notesMasterIdLst>
-    <p:notesMasterId r:id="rId24"/>
+    <p:notesMasterId r:id="rId25"/>
   </p:notesMasterIdLst>
   <p:sldIdLst>
     <p:sldId id="256" r:id="rId5"/>
@@ -19,14 +19,15 @@
     <p:sldId id="286" r:id="rId13"/>
     <p:sldId id="288" r:id="rId14"/>
     <p:sldId id="280" r:id="rId15"/>
-    <p:sldId id="281" r:id="rId16"/>
-    <p:sldId id="260" r:id="rId17"/>
-    <p:sldId id="270" r:id="rId18"/>
-    <p:sldId id="283" r:id="rId19"/>
-    <p:sldId id="282" r:id="rId20"/>
-    <p:sldId id="276" r:id="rId21"/>
-    <p:sldId id="277" r:id="rId22"/>
-    <p:sldId id="275" r:id="rId23"/>
+    <p:sldId id="289" r:id="rId16"/>
+    <p:sldId id="281" r:id="rId17"/>
+    <p:sldId id="260" r:id="rId18"/>
+    <p:sldId id="270" r:id="rId19"/>
+    <p:sldId id="283" r:id="rId20"/>
+    <p:sldId id="282" r:id="rId21"/>
+    <p:sldId id="276" r:id="rId22"/>
+    <p:sldId id="277" r:id="rId23"/>
+    <p:sldId id="275" r:id="rId24"/>
   </p:sldIdLst>
   <p:sldSz cx="12192000" cy="6858000"/>
   <p:notesSz cx="6858000" cy="9144000"/>
@@ -18411,7 +18412,12 @@
             <p:ph type="title"/>
           </p:nvPr>
         </p:nvSpPr>
-        <p:spPr/>
+        <p:spPr>
+          <a:xfrm>
+            <a:off x="1167492" y="381001"/>
+            <a:ext cx="9779183" cy="1092718"/>
+          </a:xfrm>
+        </p:spPr>
         <p:txBody>
           <a:bodyPr/>
           <a:lstStyle/>
@@ -18442,10 +18448,15 @@
             <p:ph idx="1"/>
           </p:nvPr>
         </p:nvSpPr>
-        <p:spPr/>
+        <p:spPr>
+          <a:xfrm>
+            <a:off x="1167493" y="1645921"/>
+            <a:ext cx="9779182" cy="3738362"/>
+          </a:xfrm>
+        </p:spPr>
         <p:txBody>
           <a:bodyPr vert="horz" lIns="91440" tIns="45720" rIns="91440" bIns="45720" rtlCol="0" anchor="t">
-            <a:normAutofit fontScale="92500" lnSpcReduction="20000"/>
+            <a:normAutofit fontScale="85000" lnSpcReduction="20000"/>
           </a:bodyPr>
           <a:lstStyle/>
           <a:p>
@@ -18475,7 +18486,22 @@
               <a:rPr lang="en-US" dirty="0">
                 <a:latin typeface="Baskerville Old Face" panose="02020602080505020303" pitchFamily="18" charset="0"/>
               </a:rPr>
-              <a:t>System must be able to generate and manage reports and tracking</a:t>
+              <a:t>System must be able to generate reports(financial and schedules)</a:t>
+            </a:r>
+          </a:p>
+          <a:p>
+            <a:pPr marL="457200" indent="-457200">
+              <a:lnSpc>
+                <a:spcPct val="150000"/>
+              </a:lnSpc>
+              <a:buFont typeface="Arial" panose="020B0604020202020204" pitchFamily="34" charset="0"/>
+              <a:buChar char="•"/>
+            </a:pPr>
+            <a:r>
+              <a:rPr lang="en-US" dirty="0">
+                <a:latin typeface="Baskerville Old Face" panose="02020602080505020303" pitchFamily="18" charset="0"/>
+              </a:rPr>
+              <a:t>System must be able to manage contributions, and payment tracking</a:t>
             </a:r>
           </a:p>
           <a:p>
@@ -18574,7 +18600,12 @@
             <p:ph type="title"/>
           </p:nvPr>
         </p:nvSpPr>
-        <p:spPr/>
+        <p:spPr>
+          <a:xfrm>
+            <a:off x="1167492" y="381001"/>
+            <a:ext cx="9779183" cy="1092718"/>
+          </a:xfrm>
+        </p:spPr>
         <p:txBody>
           <a:bodyPr/>
           <a:lstStyle/>
@@ -18605,14 +18636,19 @@
             <p:ph idx="1"/>
           </p:nvPr>
         </p:nvSpPr>
-        <p:spPr/>
+        <p:spPr>
+          <a:xfrm>
+            <a:off x="1167493" y="1656080"/>
+            <a:ext cx="9779182" cy="3992879"/>
+          </a:xfrm>
+        </p:spPr>
         <p:txBody>
           <a:bodyPr vert="horz" lIns="91440" tIns="45720" rIns="91440" bIns="45720" rtlCol="0" anchor="t">
-            <a:normAutofit fontScale="92500" lnSpcReduction="20000"/>
+            <a:normAutofit lnSpcReduction="10000"/>
           </a:bodyPr>
           <a:lstStyle/>
           <a:p>
-            <a:pPr marL="457200" indent="-457200">
+            <a:pPr marL="342900" indent="-342900">
               <a:lnSpc>
                 <a:spcPct val="150000"/>
               </a:lnSpc>
@@ -18620,14 +18656,20 @@
               <a:buChar char="•"/>
             </a:pPr>
             <a:r>
+              <a:rPr lang="en-US" b="1" dirty="0">
+                <a:latin typeface="Baskerville Old Face" panose="02020602080505020303" pitchFamily="18" charset="0"/>
+              </a:rPr>
+              <a:t>Security: </a:t>
+            </a:r>
+            <a:r>
               <a:rPr lang="en-US" dirty="0">
                 <a:latin typeface="Baskerville Old Face" panose="02020602080505020303" pitchFamily="18" charset="0"/>
               </a:rPr>
-              <a:t>Security</a:t>
+              <a:t>The system, users and all transactions must be secured from unauthorized access</a:t>
             </a:r>
           </a:p>
           <a:p>
-            <a:pPr marL="457200" indent="-457200">
+            <a:pPr marL="342900" indent="-342900">
               <a:lnSpc>
                 <a:spcPct val="150000"/>
               </a:lnSpc>
@@ -18635,14 +18677,20 @@
               <a:buChar char="•"/>
             </a:pPr>
             <a:r>
+              <a:rPr lang="en-US" b="1" dirty="0">
+                <a:latin typeface="Baskerville Old Face" panose="02020602080505020303" pitchFamily="18" charset="0"/>
+              </a:rPr>
+              <a:t>Compliance</a:t>
+            </a:r>
+            <a:r>
               <a:rPr lang="en-US" dirty="0">
                 <a:latin typeface="Baskerville Old Face" panose="02020602080505020303" pitchFamily="18" charset="0"/>
               </a:rPr>
-              <a:t>Availability</a:t>
+              <a:t>: The system must comply with all applicable laws and regulations</a:t>
             </a:r>
           </a:p>
           <a:p>
-            <a:pPr marL="457200" indent="-457200">
+            <a:pPr marL="342900" indent="-342900">
               <a:lnSpc>
                 <a:spcPct val="150000"/>
               </a:lnSpc>
@@ -18650,14 +18698,127 @@
               <a:buChar char="•"/>
             </a:pPr>
             <a:r>
-              <a:rPr lang="en-US" dirty="0">
+              <a:rPr lang="en-US" b="1" kern="100" dirty="0">
+                <a:effectLst/>
+                <a:latin typeface="Baskerville Old Face" panose="02020602080505020303" pitchFamily="18" charset="0"/>
+                <a:ea typeface="Calibri" panose="020F0502020204030204" pitchFamily="34" charset="0"/>
+                <a:cs typeface="Times New Roman" panose="02020603050405020304" pitchFamily="18" charset="0"/>
+              </a:rPr>
+              <a:t>Reliability: </a:t>
+            </a:r>
+            <a:r>
+              <a:rPr lang="en-US" kern="100" dirty="0">
+                <a:effectLst/>
+                <a:latin typeface="Baskerville Old Face" panose="02020602080505020303" pitchFamily="18" charset="0"/>
+                <a:ea typeface="Calibri" panose="020F0502020204030204" pitchFamily="34" charset="0"/>
+                <a:cs typeface="Times New Roman" panose="02020603050405020304" pitchFamily="18" charset="0"/>
+              </a:rPr>
+              <a:t>must be trustworthy and reliable, and meet the user requirements</a:t>
+            </a:r>
+            <a:endParaRPr lang="en-CM" kern="100" dirty="0">
+              <a:effectLst/>
+              <a:latin typeface="Baskerville Old Face" panose="02020602080505020303" pitchFamily="18" charset="0"/>
+              <a:ea typeface="Calibri" panose="020F0502020204030204" pitchFamily="34" charset="0"/>
+              <a:cs typeface="Times New Roman" panose="02020603050405020304" pitchFamily="18" charset="0"/>
+            </a:endParaRPr>
+          </a:p>
+        </p:txBody>
+      </p:sp>
+    </p:spTree>
+    <p:extLst>
+      <p:ext uri="{BB962C8B-B14F-4D97-AF65-F5344CB8AC3E}">
+        <p14:creationId xmlns:p14="http://schemas.microsoft.com/office/powerpoint/2010/main" val="873012937"/>
+      </p:ext>
+    </p:extLst>
+  </p:cSld>
+  <p:clrMapOvr>
+    <a:masterClrMapping/>
+  </p:clrMapOvr>
+</p:sld>
+</file>
+
+<file path=ppt/slides/slide13.xml><?xml version="1.0" encoding="utf-8"?>
+<p:sld xmlns:a="http://schemas.openxmlformats.org/drawingml/2006/main" xmlns:r="http://schemas.openxmlformats.org/officeDocument/2006/relationships" xmlns:p="http://schemas.openxmlformats.org/presentationml/2006/main">
+  <p:cSld>
+    <p:spTree>
+      <p:nvGrpSpPr>
+        <p:cNvPr id="1" name=""/>
+        <p:cNvGrpSpPr/>
+        <p:nvPr/>
+      </p:nvGrpSpPr>
+      <p:grpSpPr>
+        <a:xfrm>
+          <a:off x="0" y="0"/>
+          <a:ext cx="0" cy="0"/>
+          <a:chOff x="0" y="0"/>
+          <a:chExt cx="0" cy="0"/>
+        </a:xfrm>
+      </p:grpSpPr>
+      <p:sp>
+        <p:nvSpPr>
+          <p:cNvPr id="2" name="Title 1">
+            <a:extLst>
+              <a:ext uri="{FF2B5EF4-FFF2-40B4-BE49-F238E27FC236}">
+                <a16:creationId xmlns:a16="http://schemas.microsoft.com/office/drawing/2014/main" id="{8460295B-54B9-4937-90E3-BAB9CE69E30B}"/>
+              </a:ext>
+            </a:extLst>
+          </p:cNvPr>
+          <p:cNvSpPr>
+            <a:spLocks noGrp="1"/>
+          </p:cNvSpPr>
+          <p:nvPr>
+            <p:ph type="title"/>
+          </p:nvPr>
+        </p:nvSpPr>
+        <p:spPr>
+          <a:xfrm>
+            <a:off x="1167492" y="381001"/>
+            <a:ext cx="9779183" cy="1092718"/>
+          </a:xfrm>
+        </p:spPr>
+        <p:txBody>
+          <a:bodyPr/>
+          <a:lstStyle/>
+          <a:p>
+            <a:pPr algn="ctr"/>
+            <a:r>
+              <a:rPr lang="en-US" sz="5400" dirty="0">
                 <a:latin typeface="Baskerville Old Face" panose="02020602080505020303" pitchFamily="18" charset="0"/>
               </a:rPr>
-              <a:t>Usability</a:t>
+              <a:t>Continued…</a:t>
             </a:r>
           </a:p>
-          <a:p>
-            <a:pPr marL="457200" indent="-457200">
+        </p:txBody>
+      </p:sp>
+      <p:sp>
+        <p:nvSpPr>
+          <p:cNvPr id="4" name="Text Placeholder 3">
+            <a:extLst>
+              <a:ext uri="{FF2B5EF4-FFF2-40B4-BE49-F238E27FC236}">
+                <a16:creationId xmlns:a16="http://schemas.microsoft.com/office/drawing/2014/main" id="{D51A6D85-3837-435F-A342-5A3F98172B12}"/>
+              </a:ext>
+            </a:extLst>
+          </p:cNvPr>
+          <p:cNvSpPr>
+            <a:spLocks noGrp="1"/>
+          </p:cNvSpPr>
+          <p:nvPr>
+            <p:ph idx="1"/>
+          </p:nvPr>
+        </p:nvSpPr>
+        <p:spPr>
+          <a:xfrm>
+            <a:off x="1167493" y="1656080"/>
+            <a:ext cx="9779182" cy="3992879"/>
+          </a:xfrm>
+        </p:spPr>
+        <p:txBody>
+          <a:bodyPr vert="horz" lIns="91440" tIns="45720" rIns="91440" bIns="45720" rtlCol="0" anchor="t">
+            <a:normAutofit/>
+          </a:bodyPr>
+          <a:lstStyle/>
+          <a:p>
+            <a:pPr marL="342900" indent="-342900">
               <a:lnSpc>
                 <a:spcPct val="150000"/>
               </a:lnSpc>
@@ -18665,14 +18826,41 @@
               <a:buChar char="•"/>
             </a:pPr>
             <a:r>
-              <a:rPr lang="en-US" dirty="0">
+              <a:rPr lang="en-US" b="1" kern="100" dirty="0">
+                <a:effectLst/>
                 <a:latin typeface="Baskerville Old Face" panose="02020602080505020303" pitchFamily="18" charset="0"/>
+                <a:ea typeface="Calibri" panose="020F0502020204030204" pitchFamily="34" charset="0"/>
+                <a:cs typeface="Times New Roman" panose="02020603050405020304" pitchFamily="18" charset="0"/>
               </a:rPr>
-              <a:t>Portability</a:t>
+              <a:t>Usability: </a:t>
             </a:r>
-          </a:p>
-          <a:p>
-            <a:pPr marL="457200" indent="-457200">
+            <a:r>
+              <a:rPr lang="en-US" kern="100" dirty="0">
+                <a:effectLst/>
+                <a:latin typeface="Baskerville Old Face" panose="02020602080505020303" pitchFamily="18" charset="0"/>
+                <a:ea typeface="Calibri" panose="020F0502020204030204" pitchFamily="34" charset="0"/>
+                <a:cs typeface="Times New Roman" panose="02020603050405020304" pitchFamily="18" charset="0"/>
+              </a:rPr>
+              <a:t>must be easy for the user to use and understand, </a:t>
+            </a:r>
+            <a:r>
+              <a:rPr lang="en-US" kern="100">
+                <a:effectLst/>
+                <a:latin typeface="Baskerville Old Face" panose="02020602080505020303" pitchFamily="18" charset="0"/>
+                <a:ea typeface="Calibri" panose="020F0502020204030204" pitchFamily="34" charset="0"/>
+                <a:cs typeface="Times New Roman" panose="02020603050405020304" pitchFamily="18" charset="0"/>
+              </a:rPr>
+              <a:t>with optimal UX</a:t>
+            </a:r>
+            <a:endParaRPr lang="en-CM" kern="100" dirty="0">
+              <a:effectLst/>
+              <a:latin typeface="Baskerville Old Face" panose="02020602080505020303" pitchFamily="18" charset="0"/>
+              <a:ea typeface="Calibri" panose="020F0502020204030204" pitchFamily="34" charset="0"/>
+              <a:cs typeface="Times New Roman" panose="02020603050405020304" pitchFamily="18" charset="0"/>
+            </a:endParaRPr>
+          </a:p>
+          <a:p>
+            <a:pPr marL="342900" indent="-342900">
               <a:lnSpc>
                 <a:spcPct val="150000"/>
               </a:lnSpc>
@@ -18680,14 +18868,54 @@
               <a:buChar char="•"/>
             </a:pPr>
             <a:r>
+              <a:rPr lang="en-US" b="1" dirty="0">
+                <a:effectLst/>
+                <a:latin typeface="Baskerville Old Face" panose="02020602080505020303" pitchFamily="18" charset="0"/>
+                <a:ea typeface="Calibri" panose="020F0502020204030204" pitchFamily="34" charset="0"/>
+              </a:rPr>
+              <a:t>Availability: </a:t>
+            </a:r>
+            <a:r>
               <a:rPr lang="en-US" dirty="0">
+                <a:effectLst/>
                 <a:latin typeface="Baskerville Old Face" panose="02020602080505020303" pitchFamily="18" charset="0"/>
+                <a:ea typeface="Calibri" panose="020F0502020204030204" pitchFamily="34" charset="0"/>
               </a:rPr>
-              <a:t>Compliance</a:t>
+              <a:t>must always be available at any time t when needed</a:t>
             </a:r>
           </a:p>
           <a:p>
-            <a:endParaRPr lang="en-US" dirty="0"/>
+            <a:pPr marL="342900" indent="-342900">
+              <a:lnSpc>
+                <a:spcPct val="150000"/>
+              </a:lnSpc>
+              <a:buFont typeface="Arial" panose="020B0604020202020204" pitchFamily="34" charset="0"/>
+              <a:buChar char="•"/>
+            </a:pPr>
+            <a:r>
+              <a:rPr lang="en-US" b="1" kern="100" dirty="0">
+                <a:effectLst/>
+                <a:latin typeface="Baskerville Old Face" panose="02020602080505020303" pitchFamily="18" charset="0"/>
+                <a:ea typeface="Calibri" panose="020F0502020204030204" pitchFamily="34" charset="0"/>
+                <a:cs typeface="Times New Roman" panose="02020603050405020304" pitchFamily="18" charset="0"/>
+              </a:rPr>
+              <a:t>Performance: </a:t>
+            </a:r>
+            <a:r>
+              <a:rPr lang="en-US" kern="100" dirty="0">
+                <a:effectLst/>
+                <a:latin typeface="Baskerville Old Face" panose="02020602080505020303" pitchFamily="18" charset="0"/>
+                <a:ea typeface="Calibri" panose="020F0502020204030204" pitchFamily="34" charset="0"/>
+                <a:cs typeface="Times New Roman" panose="02020603050405020304" pitchFamily="18" charset="0"/>
+              </a:rPr>
+              <a:t>System must be able to handle a required number of users without a degradation in the performance</a:t>
+            </a:r>
+            <a:endParaRPr lang="en-CM" kern="100" dirty="0">
+              <a:effectLst/>
+              <a:latin typeface="Baskerville Old Face" panose="02020602080505020303" pitchFamily="18" charset="0"/>
+              <a:ea typeface="Calibri" panose="020F0502020204030204" pitchFamily="34" charset="0"/>
+              <a:cs typeface="Times New Roman" panose="02020603050405020304" pitchFamily="18" charset="0"/>
+            </a:endParaRPr>
           </a:p>
         </p:txBody>
       </p:sp>
@@ -18704,7 +18932,7 @@
 </p:sld>
 </file>
 
-<file path=ppt/slides/slide13.xml><?xml version="1.0" encoding="utf-8"?>
+<file path=ppt/slides/slide14.xml><?xml version="1.0" encoding="utf-8"?>
 <p:sld xmlns:a="http://schemas.openxmlformats.org/drawingml/2006/main" xmlns:r="http://schemas.openxmlformats.org/officeDocument/2006/relationships" xmlns:p="http://schemas.openxmlformats.org/presentationml/2006/main">
   <p:cSld>
     <p:spTree>
@@ -18804,7 +19032,7 @@
             <a:fld id="{294A09A9-5501-47C1-A89A-A340965A2BE2}" type="slidenum">
               <a:rPr lang="en-US" smtClean="0"/>
               <a:pPr/>
-              <a:t>13</a:t>
+              <a:t>14</a:t>
             </a:fld>
             <a:endParaRPr lang="en-US" dirty="0"/>
           </a:p>
@@ -18855,7 +19083,7 @@
 </p:sld>
 </file>
 
-<file path=ppt/slides/slide14.xml><?xml version="1.0" encoding="utf-8"?>
+<file path=ppt/slides/slide15.xml><?xml version="1.0" encoding="utf-8"?>
 <p:sld xmlns:a="http://schemas.openxmlformats.org/drawingml/2006/main" xmlns:r="http://schemas.openxmlformats.org/officeDocument/2006/relationships" xmlns:p="http://schemas.openxmlformats.org/presentationml/2006/main">
   <p:cSld>
     <p:spTree>
@@ -18982,7 +19210,7 @@
           <a:p>
             <a:fld id="{294A09A9-5501-47C1-A89A-A340965A2BE2}" type="slidenum">
               <a:rPr lang="en-US" smtClean="0"/>
-              <a:t>14</a:t>
+              <a:t>15</a:t>
             </a:fld>
             <a:endParaRPr lang="en-US" dirty="0"/>
           </a:p>
@@ -19001,7 +19229,7 @@
 </p:sld>
 </file>
 
-<file path=ppt/slides/slide15.xml><?xml version="1.0" encoding="utf-8"?>
+<file path=ppt/slides/slide16.xml><?xml version="1.0" encoding="utf-8"?>
 <p:sld xmlns:a="http://schemas.openxmlformats.org/drawingml/2006/main" xmlns:r="http://schemas.openxmlformats.org/officeDocument/2006/relationships" xmlns:p="http://schemas.openxmlformats.org/presentationml/2006/main">
   <p:cSld>
     <p:spTree>
@@ -19159,7 +19387,7 @@
             <a:fld id="{294A09A9-5501-47C1-A89A-A340965A2BE2}" type="slidenum">
               <a:rPr lang="en-US" smtClean="0"/>
               <a:pPr/>
-              <a:t>15</a:t>
+              <a:t>16</a:t>
             </a:fld>
             <a:endParaRPr lang="en-US" dirty="0"/>
           </a:p>
@@ -19178,7 +19406,7 @@
 </p:sld>
 </file>
 
-<file path=ppt/slides/slide16.xml><?xml version="1.0" encoding="utf-8"?>
+<file path=ppt/slides/slide17.xml><?xml version="1.0" encoding="utf-8"?>
 <p:sld xmlns:a="http://schemas.openxmlformats.org/drawingml/2006/main" xmlns:r="http://schemas.openxmlformats.org/officeDocument/2006/relationships" xmlns:p="http://schemas.openxmlformats.org/presentationml/2006/main">
   <p:cSld>
     <p:spTree>
@@ -19251,7 +19479,7 @@
 </p:sld>
 </file>
 
-<file path=ppt/slides/slide17.xml><?xml version="1.0" encoding="utf-8"?>
+<file path=ppt/slides/slide18.xml><?xml version="1.0" encoding="utf-8"?>
 <p:sld xmlns:a="http://schemas.openxmlformats.org/drawingml/2006/main" xmlns:r="http://schemas.openxmlformats.org/officeDocument/2006/relationships" xmlns:p="http://schemas.openxmlformats.org/presentationml/2006/main">
   <p:cSld>
     <p:spTree>
@@ -19383,7 +19611,7 @@
             <a:fld id="{294A09A9-5501-47C1-A89A-A340965A2BE2}" type="slidenum">
               <a:rPr lang="en-US" smtClean="0"/>
               <a:pPr/>
-              <a:t>17</a:t>
+              <a:t>18</a:t>
             </a:fld>
             <a:endParaRPr lang="en-US" dirty="0"/>
           </a:p>
@@ -19402,7 +19630,7 @@
 </p:sld>
 </file>
 
-<file path=ppt/slides/slide18.xml><?xml version="1.0" encoding="utf-8"?>
+<file path=ppt/slides/slide19.xml><?xml version="1.0" encoding="utf-8"?>
 <p:sld xmlns:a="http://schemas.openxmlformats.org/drawingml/2006/main" xmlns:r="http://schemas.openxmlformats.org/officeDocument/2006/relationships" xmlns:p="http://schemas.openxmlformats.org/presentationml/2006/main">
   <p:cSld>
     <p:spTree>
@@ -19534,7 +19762,7 @@
             <a:fld id="{294A09A9-5501-47C1-A89A-A340965A2BE2}" type="slidenum">
               <a:rPr lang="en-US" smtClean="0"/>
               <a:pPr/>
-              <a:t>18</a:t>
+              <a:t>19</a:t>
             </a:fld>
             <a:endParaRPr lang="en-US" dirty="0"/>
           </a:p>
@@ -19544,71 +19772,6 @@
     <p:extLst>
       <p:ext uri="{BB962C8B-B14F-4D97-AF65-F5344CB8AC3E}">
         <p14:creationId xmlns:p14="http://schemas.microsoft.com/office/powerpoint/2010/main" val="1674946439"/>
-      </p:ext>
-    </p:extLst>
-  </p:cSld>
-  <p:clrMapOvr>
-    <a:masterClrMapping/>
-  </p:clrMapOvr>
-</p:sld>
-</file>
-
-<file path=ppt/slides/slide19.xml><?xml version="1.0" encoding="utf-8"?>
-<p:sld xmlns:a="http://schemas.openxmlformats.org/drawingml/2006/main" xmlns:r="http://schemas.openxmlformats.org/officeDocument/2006/relationships" xmlns:p="http://schemas.openxmlformats.org/presentationml/2006/main">
-  <p:cSld>
-    <p:spTree>
-      <p:nvGrpSpPr>
-        <p:cNvPr id="1" name=""/>
-        <p:cNvGrpSpPr/>
-        <p:nvPr/>
-      </p:nvGrpSpPr>
-      <p:grpSpPr>
-        <a:xfrm>
-          <a:off x="0" y="0"/>
-          <a:ext cx="0" cy="0"/>
-          <a:chOff x="0" y="0"/>
-          <a:chExt cx="0" cy="0"/>
-        </a:xfrm>
-      </p:grpSpPr>
-      <p:sp>
-        <p:nvSpPr>
-          <p:cNvPr id="2" name="Title 1">
-            <a:extLst>
-              <a:ext uri="{FF2B5EF4-FFF2-40B4-BE49-F238E27FC236}">
-                <a16:creationId xmlns:a16="http://schemas.microsoft.com/office/drawing/2014/main" id="{69FAE308-3076-43DB-B834-DA0B0AE19AF9}"/>
-              </a:ext>
-            </a:extLst>
-          </p:cNvPr>
-          <p:cNvSpPr>
-            <a:spLocks noGrp="1"/>
-          </p:cNvSpPr>
-          <p:nvPr>
-            <p:ph type="ctrTitle"/>
-          </p:nvPr>
-        </p:nvSpPr>
-        <p:spPr>
-          <a:xfrm>
-            <a:off x="926194" y="2734200"/>
-            <a:ext cx="6245912" cy="1389600"/>
-          </a:xfrm>
-        </p:spPr>
-        <p:txBody>
-          <a:bodyPr/>
-          <a:lstStyle/>
-          <a:p>
-            <a:r>
-              <a:rPr lang="en-US" sz="6600" dirty="0">
-                <a:latin typeface="Baskerville Old Face" panose="02020602080505020303" pitchFamily="18" charset="0"/>
-              </a:rPr>
-              <a:t>Thank you</a:t>
-            </a:r>
-          </a:p>
-        </p:txBody>
-      </p:sp>
-    </p:spTree>
-    <p:extLst>
-      <p:ext uri="{BB962C8B-B14F-4D97-AF65-F5344CB8AC3E}">
-        <p14:creationId xmlns:p14="http://schemas.microsoft.com/office/powerpoint/2010/main" val="926184573"/>
       </p:ext>
     </p:extLst>
   </p:cSld>
@@ -20147,6 +20310,71 @@
 </p:sld>
 </file>
 
+<file path=ppt/slides/slide20.xml><?xml version="1.0" encoding="utf-8"?>
+<p:sld xmlns:a="http://schemas.openxmlformats.org/drawingml/2006/main" xmlns:r="http://schemas.openxmlformats.org/officeDocument/2006/relationships" xmlns:p="http://schemas.openxmlformats.org/presentationml/2006/main">
+  <p:cSld>
+    <p:spTree>
+      <p:nvGrpSpPr>
+        <p:cNvPr id="1" name=""/>
+        <p:cNvGrpSpPr/>
+        <p:nvPr/>
+      </p:nvGrpSpPr>
+      <p:grpSpPr>
+        <a:xfrm>
+          <a:off x="0" y="0"/>
+          <a:ext cx="0" cy="0"/>
+          <a:chOff x="0" y="0"/>
+          <a:chExt cx="0" cy="0"/>
+        </a:xfrm>
+      </p:grpSpPr>
+      <p:sp>
+        <p:nvSpPr>
+          <p:cNvPr id="2" name="Title 1">
+            <a:extLst>
+              <a:ext uri="{FF2B5EF4-FFF2-40B4-BE49-F238E27FC236}">
+                <a16:creationId xmlns:a16="http://schemas.microsoft.com/office/drawing/2014/main" id="{69FAE308-3076-43DB-B834-DA0B0AE19AF9}"/>
+              </a:ext>
+            </a:extLst>
+          </p:cNvPr>
+          <p:cNvSpPr>
+            <a:spLocks noGrp="1"/>
+          </p:cNvSpPr>
+          <p:nvPr>
+            <p:ph type="ctrTitle"/>
+          </p:nvPr>
+        </p:nvSpPr>
+        <p:spPr>
+          <a:xfrm>
+            <a:off x="926194" y="2734200"/>
+            <a:ext cx="6245912" cy="1389600"/>
+          </a:xfrm>
+        </p:spPr>
+        <p:txBody>
+          <a:bodyPr/>
+          <a:lstStyle/>
+          <a:p>
+            <a:r>
+              <a:rPr lang="en-US" sz="6600" dirty="0">
+                <a:latin typeface="Baskerville Old Face" panose="02020602080505020303" pitchFamily="18" charset="0"/>
+              </a:rPr>
+              <a:t>Thank you</a:t>
+            </a:r>
+          </a:p>
+        </p:txBody>
+      </p:sp>
+    </p:spTree>
+    <p:extLst>
+      <p:ext uri="{BB962C8B-B14F-4D97-AF65-F5344CB8AC3E}">
+        <p14:creationId xmlns:p14="http://schemas.microsoft.com/office/powerpoint/2010/main" val="926184573"/>
+      </p:ext>
+    </p:extLst>
+  </p:cSld>
+  <p:clrMapOvr>
+    <a:masterClrMapping/>
+  </p:clrMapOvr>
+</p:sld>
+</file>
+
 <file path=ppt/slides/slide3.xml><?xml version="1.0" encoding="utf-8"?>
 <p:sld xmlns:a="http://schemas.openxmlformats.org/drawingml/2006/main" xmlns:r="http://schemas.openxmlformats.org/officeDocument/2006/relationships" xmlns:p="http://schemas.openxmlformats.org/presentationml/2006/main">
   <p:cSld>
@@ -20190,7 +20418,7 @@
           <a:bodyPr/>
           <a:lstStyle/>
           <a:p>
-            <a:pPr>
+            <a:pPr algn="ctr">
               <a:lnSpc>
                 <a:spcPct val="150000"/>
               </a:lnSpc>
@@ -20273,7 +20501,7 @@
               <a:rPr lang="en-US" dirty="0">
                 <a:latin typeface="Baskerville Old Face" panose="02020602080505020303" pitchFamily="18" charset="0"/>
               </a:rPr>
-              <a:t>Project life cycle</a:t>
+              <a:t>Requirements</a:t>
             </a:r>
           </a:p>
           <a:p>
@@ -20288,7 +20516,7 @@
               <a:rPr lang="en-US" dirty="0">
                 <a:latin typeface="Baskerville Old Face" panose="02020602080505020303" pitchFamily="18" charset="0"/>
               </a:rPr>
-              <a:t>Use case diagram</a:t>
+              <a:t>Project life cycle</a:t>
             </a:r>
           </a:p>
           <a:p>
@@ -20303,7 +20531,7 @@
               <a:rPr lang="en-US" dirty="0">
                 <a:latin typeface="Baskerville Old Face" panose="02020602080505020303" pitchFamily="18" charset="0"/>
               </a:rPr>
-              <a:t>Sequence diagrams</a:t>
+              <a:t>Existing system(s)</a:t>
             </a:r>
           </a:p>
           <a:p>
@@ -20318,11 +20546,8 @@
               <a:rPr lang="en-US" dirty="0">
                 <a:latin typeface="Baskerville Old Face" panose="02020602080505020303" pitchFamily="18" charset="0"/>
               </a:rPr>
-              <a:t>Class diagram</a:t>
+              <a:t>Diagrams</a:t>
             </a:r>
-          </a:p>
-          <a:p>
-            <a:endParaRPr lang="en-US" sz="2000" dirty="0"/>
           </a:p>
         </p:txBody>
       </p:sp>

</xml_diff>

<commit_message>
Added final final touches to ppt
</commit_message>
<xml_diff>
--- a/njangi.pptx
+++ b/njangi.pptx
@@ -5,7 +5,7 @@
     <p:sldMasterId id="2147483648" r:id="rId4"/>
   </p:sldMasterIdLst>
   <p:notesMasterIdLst>
-    <p:notesMasterId r:id="rId25"/>
+    <p:notesMasterId r:id="rId23"/>
   </p:notesMasterIdLst>
   <p:sldIdLst>
     <p:sldId id="256" r:id="rId5"/>
@@ -25,9 +25,7 @@
     <p:sldId id="270" r:id="rId19"/>
     <p:sldId id="283" r:id="rId20"/>
     <p:sldId id="282" r:id="rId21"/>
-    <p:sldId id="276" r:id="rId22"/>
-    <p:sldId id="277" r:id="rId23"/>
-    <p:sldId id="275" r:id="rId24"/>
+    <p:sldId id="275" r:id="rId22"/>
   </p:sldIdLst>
   <p:sldSz cx="12192000" cy="6858000"/>
   <p:notesSz cx="6858000" cy="9144000"/>
@@ -5570,7 +5568,7 @@
           <a:p>
             <a:fld id="{7487ADD9-2083-264C-A652-8D52D02F7E72}" type="datetimeFigureOut">
               <a:rPr lang="en-US" smtClean="0"/>
-              <a:t>1/18/2024</a:t>
+              <a:t>1/19/2024</a:t>
             </a:fld>
             <a:endParaRPr lang="en-US" dirty="0"/>
           </a:p>
@@ -7226,7 +7224,7 @@
           <a:p>
             <a:fld id="{AE46C21D-EBB5-4F3D-B06D-166777189317}" type="datetime1">
               <a:rPr lang="en-US" smtClean="0"/>
-              <a:t>1/18/2024</a:t>
+              <a:t>1/19/2024</a:t>
             </a:fld>
             <a:endParaRPr lang="en-US" dirty="0"/>
           </a:p>
@@ -8110,7 +8108,7 @@
           <a:p>
             <a:fld id="{1DFFEA26-EB1D-498C-95CD-1ECE586790AA}" type="datetime1">
               <a:rPr lang="en-US" smtClean="0"/>
-              <a:t>1/18/2024</a:t>
+              <a:t>1/19/2024</a:t>
             </a:fld>
             <a:endParaRPr lang="en-US" dirty="0"/>
           </a:p>
@@ -9286,7 +9284,7 @@
           <a:p>
             <a:fld id="{539842EE-D56F-4F18-94E7-094CEF23F906}" type="datetime1">
               <a:rPr lang="en-US" smtClean="0"/>
-              <a:t>1/18/2024</a:t>
+              <a:t>1/19/2024</a:t>
             </a:fld>
             <a:endParaRPr lang="en-US" dirty="0"/>
           </a:p>
@@ -11365,7 +11363,7 @@
           <a:p>
             <a:fld id="{45B08281-154C-4FEF-A6DF-18BA3AC0F374}" type="datetime1">
               <a:rPr lang="en-US" smtClean="0"/>
-              <a:t>1/18/2024</a:t>
+              <a:t>1/19/2024</a:t>
             </a:fld>
             <a:endParaRPr lang="en-US" dirty="0"/>
           </a:p>
@@ -12082,7 +12080,7 @@
           <a:p>
             <a:fld id="{04D857D4-BD7E-4A06-844B-AAD504F1114F}" type="datetime1">
               <a:rPr lang="en-US" smtClean="0"/>
-              <a:t>1/18/2024</a:t>
+              <a:t>1/19/2024</a:t>
             </a:fld>
             <a:endParaRPr lang="en-US" dirty="0"/>
           </a:p>
@@ -13309,7 +13307,7 @@
           <a:p>
             <a:fld id="{916AFA50-87A4-4E99-B112-8C6B1DFB84B2}" type="datetime1">
               <a:rPr lang="en-US" smtClean="0"/>
-              <a:t>1/18/2024</a:t>
+              <a:t>1/19/2024</a:t>
             </a:fld>
             <a:endParaRPr lang="en-US" dirty="0"/>
           </a:p>
@@ -13900,7 +13898,7 @@
           <a:p>
             <a:fld id="{6B3905CA-BF0F-4A1B-AA0D-85E42F5D5A85}" type="datetime1">
               <a:rPr lang="en-US" smtClean="0"/>
-              <a:t>1/18/2024</a:t>
+              <a:t>1/19/2024</a:t>
             </a:fld>
             <a:endParaRPr lang="en-US" dirty="0"/>
           </a:p>
@@ -14372,7 +14370,7 @@
           <a:p>
             <a:fld id="{D3DA9A77-60C0-4BB8-898D-2828EE4073AD}" type="datetime1">
               <a:rPr lang="en-US" smtClean="0"/>
-              <a:t>1/18/2024</a:t>
+              <a:t>1/19/2024</a:t>
             </a:fld>
             <a:endParaRPr lang="en-US" dirty="0"/>
           </a:p>
@@ -15221,7 +15219,7 @@
           <a:p>
             <a:fld id="{C1F30CD5-42B1-4614-9F46-5D29928CC2DB}" type="datetime1">
               <a:rPr lang="en-US" smtClean="0"/>
-              <a:t>1/18/2024</a:t>
+              <a:t>1/19/2024</a:t>
             </a:fld>
             <a:endParaRPr lang="en-US" dirty="0"/>
           </a:p>
@@ -17445,7 +17443,7 @@
           <a:p>
             <a:fld id="{EE6020E3-D95B-4E55-964F-4B1A98BDAA6F}" type="datetime1">
               <a:rPr lang="en-US" smtClean="0"/>
-              <a:t>1/18/2024</a:t>
+              <a:t>1/19/2024</a:t>
             </a:fld>
             <a:endParaRPr lang="en-US" dirty="0"/>
           </a:p>
@@ -17713,7 +17711,7 @@
           <a:p>
             <a:fld id="{FC9A72C8-1C87-42EF-8A11-BF6DFA19ED8B}" type="datetime1">
               <a:rPr lang="en-US" smtClean="0"/>
-              <a:t>1/18/2024</a:t>
+              <a:t>1/19/2024</a:t>
             </a:fld>
             <a:endParaRPr lang="en-US" dirty="0"/>
           </a:p>
@@ -18814,7 +18812,7 @@
         </p:spPr>
         <p:txBody>
           <a:bodyPr vert="horz" lIns="91440" tIns="45720" rIns="91440" bIns="45720" rtlCol="0" anchor="t">
-            <a:normAutofit/>
+            <a:normAutofit lnSpcReduction="10000"/>
           </a:bodyPr>
           <a:lstStyle/>
           <a:p>
@@ -18841,16 +18839,7 @@
                 <a:ea typeface="Calibri" panose="020F0502020204030204" pitchFamily="34" charset="0"/>
                 <a:cs typeface="Times New Roman" panose="02020603050405020304" pitchFamily="18" charset="0"/>
               </a:rPr>
-              <a:t>must be easy for the user to use and understand, </a:t>
-            </a:r>
-            <a:r>
-              <a:rPr lang="en-US" kern="100">
-                <a:effectLst/>
-                <a:latin typeface="Baskerville Old Face" panose="02020602080505020303" pitchFamily="18" charset="0"/>
-                <a:ea typeface="Calibri" panose="020F0502020204030204" pitchFamily="34" charset="0"/>
-                <a:cs typeface="Times New Roman" panose="02020603050405020304" pitchFamily="18" charset="0"/>
-              </a:rPr>
-              <a:t>with optimal UX</a:t>
+              <a:t>must be easy for the user to use and understand, with optimal UX</a:t>
             </a:r>
             <a:endParaRPr lang="en-CM" kern="100" dirty="0">
               <a:effectLst/>
@@ -18881,7 +18870,7 @@
                 <a:latin typeface="Baskerville Old Face" panose="02020602080505020303" pitchFamily="18" charset="0"/>
                 <a:ea typeface="Calibri" panose="020F0502020204030204" pitchFamily="34" charset="0"/>
               </a:rPr>
-              <a:t>must always be available at any time t when needed</a:t>
+              <a:t>must always be available for use at any time t when needed</a:t>
             </a:r>
           </a:p>
           <a:p>
@@ -19500,7 +19489,7 @@
           <p:cNvPr id="2" name="Title 1">
             <a:extLst>
               <a:ext uri="{FF2B5EF4-FFF2-40B4-BE49-F238E27FC236}">
-                <a16:creationId xmlns:a16="http://schemas.microsoft.com/office/drawing/2014/main" id="{45AEDAD5-1401-046B-A790-C095D98C531B}"/>
+                <a16:creationId xmlns:a16="http://schemas.microsoft.com/office/drawing/2014/main" id="{69FAE308-3076-43DB-B834-DA0B0AE19AF9}"/>
               </a:ext>
             </a:extLst>
           </p:cNvPr>
@@ -19508,269 +19497,32 @@
             <a:spLocks noGrp="1"/>
           </p:cNvSpPr>
           <p:nvPr>
-            <p:ph type="title"/>
+            <p:ph type="ctrTitle"/>
           </p:nvPr>
         </p:nvSpPr>
-        <p:spPr/>
+        <p:spPr>
+          <a:xfrm>
+            <a:off x="926194" y="2734200"/>
+            <a:ext cx="6245912" cy="1389600"/>
+          </a:xfrm>
+        </p:spPr>
         <p:txBody>
           <a:bodyPr/>
           <a:lstStyle/>
           <a:p>
-            <a:pPr algn="ctr"/>
             <a:r>
-              <a:rPr lang="en-US" dirty="0">
+              <a:rPr lang="en-US" sz="6600" dirty="0">
                 <a:latin typeface="Baskerville Old Face" panose="02020602080505020303" pitchFamily="18" charset="0"/>
               </a:rPr>
-              <a:t>Use case: User’s Module</a:t>
+              <a:t>Thank you</a:t>
             </a:r>
-            <a:endParaRPr lang="en-CM" dirty="0">
-              <a:latin typeface="Baskerville Old Face" panose="02020602080505020303" pitchFamily="18" charset="0"/>
-            </a:endParaRPr>
-          </a:p>
-        </p:txBody>
-      </p:sp>
-      <p:pic>
-        <p:nvPicPr>
-          <p:cNvPr id="7" name="Content Placeholder 6">
-            <a:extLst>
-              <a:ext uri="{FF2B5EF4-FFF2-40B4-BE49-F238E27FC236}">
-                <a16:creationId xmlns:a16="http://schemas.microsoft.com/office/drawing/2014/main" id="{1CCD097E-AE9A-153C-A72B-00A90D5E4860}"/>
-              </a:ext>
-            </a:extLst>
-          </p:cNvPr>
-          <p:cNvPicPr>
-            <a:picLocks noGrp="1" noChangeAspect="1"/>
-          </p:cNvPicPr>
-          <p:nvPr>
-            <p:ph idx="1"/>
-          </p:nvPr>
-        </p:nvPicPr>
-        <p:blipFill>
-          <a:blip r:embed="rId2"/>
-          <a:stretch>
-            <a:fillRect/>
-          </a:stretch>
-        </p:blipFill>
-        <p:spPr>
-          <a:xfrm>
-            <a:off x="2755900" y="2017713"/>
-            <a:ext cx="6034635" cy="3367087"/>
-          </a:xfrm>
-        </p:spPr>
-      </p:pic>
-      <p:sp>
-        <p:nvSpPr>
-          <p:cNvPr id="4" name="Footer Placeholder 3">
-            <a:extLst>
-              <a:ext uri="{FF2B5EF4-FFF2-40B4-BE49-F238E27FC236}">
-                <a16:creationId xmlns:a16="http://schemas.microsoft.com/office/drawing/2014/main" id="{9E6D0BFE-3CB0-BD1B-9E94-89E4AFB9BFA8}"/>
-              </a:ext>
-            </a:extLst>
-          </p:cNvPr>
-          <p:cNvSpPr>
-            <a:spLocks noGrp="1"/>
-          </p:cNvSpPr>
-          <p:nvPr>
-            <p:ph type="ftr" sz="quarter" idx="3"/>
-          </p:nvPr>
-        </p:nvSpPr>
-        <p:spPr/>
-        <p:txBody>
-          <a:bodyPr/>
-          <a:lstStyle/>
-          <a:p>
-            <a:r>
-              <a:rPr lang="en-US" dirty="0"/>
-              <a:t>Njangi-Hub</a:t>
-            </a:r>
-          </a:p>
-        </p:txBody>
-      </p:sp>
-      <p:sp>
-        <p:nvSpPr>
-          <p:cNvPr id="5" name="Slide Number Placeholder 4">
-            <a:extLst>
-              <a:ext uri="{FF2B5EF4-FFF2-40B4-BE49-F238E27FC236}">
-                <a16:creationId xmlns:a16="http://schemas.microsoft.com/office/drawing/2014/main" id="{55473CC1-4CB4-CAD6-B1F0-6BE8449D086F}"/>
-              </a:ext>
-            </a:extLst>
-          </p:cNvPr>
-          <p:cNvSpPr>
-            <a:spLocks noGrp="1"/>
-          </p:cNvSpPr>
-          <p:nvPr>
-            <p:ph type="sldNum" sz="quarter" idx="4"/>
-          </p:nvPr>
-        </p:nvSpPr>
-        <p:spPr/>
-        <p:txBody>
-          <a:bodyPr/>
-          <a:lstStyle/>
-          <a:p>
-            <a:fld id="{294A09A9-5501-47C1-A89A-A340965A2BE2}" type="slidenum">
-              <a:rPr lang="en-US" smtClean="0"/>
-              <a:pPr/>
-              <a:t>18</a:t>
-            </a:fld>
-            <a:endParaRPr lang="en-US" dirty="0"/>
           </a:p>
         </p:txBody>
       </p:sp>
     </p:spTree>
     <p:extLst>
       <p:ext uri="{BB962C8B-B14F-4D97-AF65-F5344CB8AC3E}">
-        <p14:creationId xmlns:p14="http://schemas.microsoft.com/office/powerpoint/2010/main" val="2010260770"/>
-      </p:ext>
-    </p:extLst>
-  </p:cSld>
-  <p:clrMapOvr>
-    <a:masterClrMapping/>
-  </p:clrMapOvr>
-</p:sld>
-</file>
-
-<file path=ppt/slides/slide19.xml><?xml version="1.0" encoding="utf-8"?>
-<p:sld xmlns:a="http://schemas.openxmlformats.org/drawingml/2006/main" xmlns:r="http://schemas.openxmlformats.org/officeDocument/2006/relationships" xmlns:p="http://schemas.openxmlformats.org/presentationml/2006/main">
-  <p:cSld>
-    <p:spTree>
-      <p:nvGrpSpPr>
-        <p:cNvPr id="1" name=""/>
-        <p:cNvGrpSpPr/>
-        <p:nvPr/>
-      </p:nvGrpSpPr>
-      <p:grpSpPr>
-        <a:xfrm>
-          <a:off x="0" y="0"/>
-          <a:ext cx="0" cy="0"/>
-          <a:chOff x="0" y="0"/>
-          <a:chExt cx="0" cy="0"/>
-        </a:xfrm>
-      </p:grpSpPr>
-      <p:sp>
-        <p:nvSpPr>
-          <p:cNvPr id="2" name="Title 1">
-            <a:extLst>
-              <a:ext uri="{FF2B5EF4-FFF2-40B4-BE49-F238E27FC236}">
-                <a16:creationId xmlns:a16="http://schemas.microsoft.com/office/drawing/2014/main" id="{45AEDAD5-1401-046B-A790-C095D98C531B}"/>
-              </a:ext>
-            </a:extLst>
-          </p:cNvPr>
-          <p:cNvSpPr>
-            <a:spLocks noGrp="1"/>
-          </p:cNvSpPr>
-          <p:nvPr>
-            <p:ph type="title"/>
-          </p:nvPr>
-        </p:nvSpPr>
-        <p:spPr/>
-        <p:txBody>
-          <a:bodyPr/>
-          <a:lstStyle/>
-          <a:p>
-            <a:pPr algn="ctr"/>
-            <a:r>
-              <a:rPr lang="en-US" sz="5400" dirty="0">
-                <a:latin typeface="Baskerville Old Face" panose="02020602080505020303" pitchFamily="18" charset="0"/>
-              </a:rPr>
-              <a:t>Use case: Njangi head’s Module</a:t>
-            </a:r>
-            <a:endParaRPr lang="en-CM" sz="5400" dirty="0">
-              <a:latin typeface="Baskerville Old Face" panose="02020602080505020303" pitchFamily="18" charset="0"/>
-            </a:endParaRPr>
-          </a:p>
-        </p:txBody>
-      </p:sp>
-      <p:pic>
-        <p:nvPicPr>
-          <p:cNvPr id="7" name="Content Placeholder 6">
-            <a:extLst>
-              <a:ext uri="{FF2B5EF4-FFF2-40B4-BE49-F238E27FC236}">
-                <a16:creationId xmlns:a16="http://schemas.microsoft.com/office/drawing/2014/main" id="{BD991CF0-5E2B-4FF1-162C-0BFC843BACFC}"/>
-              </a:ext>
-            </a:extLst>
-          </p:cNvPr>
-          <p:cNvPicPr>
-            <a:picLocks noGrp="1" noChangeAspect="1"/>
-          </p:cNvPicPr>
-          <p:nvPr>
-            <p:ph idx="1"/>
-          </p:nvPr>
-        </p:nvPicPr>
-        <p:blipFill>
-          <a:blip r:embed="rId2"/>
-          <a:stretch>
-            <a:fillRect/>
-          </a:stretch>
-        </p:blipFill>
-        <p:spPr>
-          <a:xfrm>
-            <a:off x="3454400" y="2017713"/>
-            <a:ext cx="4313816" cy="3367087"/>
-          </a:xfrm>
-        </p:spPr>
-      </p:pic>
-      <p:sp>
-        <p:nvSpPr>
-          <p:cNvPr id="4" name="Footer Placeholder 3">
-            <a:extLst>
-              <a:ext uri="{FF2B5EF4-FFF2-40B4-BE49-F238E27FC236}">
-                <a16:creationId xmlns:a16="http://schemas.microsoft.com/office/drawing/2014/main" id="{9E6D0BFE-3CB0-BD1B-9E94-89E4AFB9BFA8}"/>
-              </a:ext>
-            </a:extLst>
-          </p:cNvPr>
-          <p:cNvSpPr>
-            <a:spLocks noGrp="1"/>
-          </p:cNvSpPr>
-          <p:nvPr>
-            <p:ph type="ftr" sz="quarter" idx="3"/>
-          </p:nvPr>
-        </p:nvSpPr>
-        <p:spPr/>
-        <p:txBody>
-          <a:bodyPr/>
-          <a:lstStyle/>
-          <a:p>
-            <a:r>
-              <a:rPr lang="en-US" dirty="0"/>
-              <a:t>Njangi-Hub</a:t>
-            </a:r>
-          </a:p>
-        </p:txBody>
-      </p:sp>
-      <p:sp>
-        <p:nvSpPr>
-          <p:cNvPr id="5" name="Slide Number Placeholder 4">
-            <a:extLst>
-              <a:ext uri="{FF2B5EF4-FFF2-40B4-BE49-F238E27FC236}">
-                <a16:creationId xmlns:a16="http://schemas.microsoft.com/office/drawing/2014/main" id="{55473CC1-4CB4-CAD6-B1F0-6BE8449D086F}"/>
-              </a:ext>
-            </a:extLst>
-          </p:cNvPr>
-          <p:cNvSpPr>
-            <a:spLocks noGrp="1"/>
-          </p:cNvSpPr>
-          <p:nvPr>
-            <p:ph type="sldNum" sz="quarter" idx="4"/>
-          </p:nvPr>
-        </p:nvSpPr>
-        <p:spPr/>
-        <p:txBody>
-          <a:bodyPr/>
-          <a:lstStyle/>
-          <a:p>
-            <a:fld id="{294A09A9-5501-47C1-A89A-A340965A2BE2}" type="slidenum">
-              <a:rPr lang="en-US" smtClean="0"/>
-              <a:pPr/>
-              <a:t>19</a:t>
-            </a:fld>
-            <a:endParaRPr lang="en-US" dirty="0"/>
-          </a:p>
-        </p:txBody>
-      </p:sp>
-    </p:spTree>
-    <p:extLst>
-      <p:ext uri="{BB962C8B-B14F-4D97-AF65-F5344CB8AC3E}">
-        <p14:creationId xmlns:p14="http://schemas.microsoft.com/office/powerpoint/2010/main" val="1674946439"/>
+        <p14:creationId xmlns:p14="http://schemas.microsoft.com/office/powerpoint/2010/main" val="926184573"/>
       </p:ext>
     </p:extLst>
   </p:cSld>
@@ -20300,71 +20052,6 @@
     <p:extLst>
       <p:ext uri="{BB962C8B-B14F-4D97-AF65-F5344CB8AC3E}">
         <p14:creationId xmlns:p14="http://schemas.microsoft.com/office/powerpoint/2010/main" val="3335690284"/>
-      </p:ext>
-    </p:extLst>
-  </p:cSld>
-  <p:clrMapOvr>
-    <a:masterClrMapping/>
-  </p:clrMapOvr>
-</p:sld>
-</file>
-
-<file path=ppt/slides/slide20.xml><?xml version="1.0" encoding="utf-8"?>
-<p:sld xmlns:a="http://schemas.openxmlformats.org/drawingml/2006/main" xmlns:r="http://schemas.openxmlformats.org/officeDocument/2006/relationships" xmlns:p="http://schemas.openxmlformats.org/presentationml/2006/main">
-  <p:cSld>
-    <p:spTree>
-      <p:nvGrpSpPr>
-        <p:cNvPr id="1" name=""/>
-        <p:cNvGrpSpPr/>
-        <p:nvPr/>
-      </p:nvGrpSpPr>
-      <p:grpSpPr>
-        <a:xfrm>
-          <a:off x="0" y="0"/>
-          <a:ext cx="0" cy="0"/>
-          <a:chOff x="0" y="0"/>
-          <a:chExt cx="0" cy="0"/>
-        </a:xfrm>
-      </p:grpSpPr>
-      <p:sp>
-        <p:nvSpPr>
-          <p:cNvPr id="2" name="Title 1">
-            <a:extLst>
-              <a:ext uri="{FF2B5EF4-FFF2-40B4-BE49-F238E27FC236}">
-                <a16:creationId xmlns:a16="http://schemas.microsoft.com/office/drawing/2014/main" id="{69FAE308-3076-43DB-B834-DA0B0AE19AF9}"/>
-              </a:ext>
-            </a:extLst>
-          </p:cNvPr>
-          <p:cNvSpPr>
-            <a:spLocks noGrp="1"/>
-          </p:cNvSpPr>
-          <p:nvPr>
-            <p:ph type="ctrTitle"/>
-          </p:nvPr>
-        </p:nvSpPr>
-        <p:spPr>
-          <a:xfrm>
-            <a:off x="926194" y="2734200"/>
-            <a:ext cx="6245912" cy="1389600"/>
-          </a:xfrm>
-        </p:spPr>
-        <p:txBody>
-          <a:bodyPr/>
-          <a:lstStyle/>
-          <a:p>
-            <a:r>
-              <a:rPr lang="en-US" sz="6600" dirty="0">
-                <a:latin typeface="Baskerville Old Face" panose="02020602080505020303" pitchFamily="18" charset="0"/>
-              </a:rPr>
-              <a:t>Thank you</a:t>
-            </a:r>
-          </a:p>
-        </p:txBody>
-      </p:sp>
-    </p:spTree>
-    <p:extLst>
-      <p:ext uri="{BB962C8B-B14F-4D97-AF65-F5344CB8AC3E}">
-        <p14:creationId xmlns:p14="http://schemas.microsoft.com/office/powerpoint/2010/main" val="926184573"/>
       </p:ext>
     </p:extLst>
   </p:cSld>
@@ -21896,26 +21583,6 @@
 </file>
 
 <file path=customXml/item1.xml><?xml version="1.0" encoding="utf-8"?>
-<p:properties xmlns:p="http://schemas.microsoft.com/office/2006/metadata/properties" xmlns:xsi="http://www.w3.org/2001/XMLSchema-instance" xmlns:pc="http://schemas.microsoft.com/office/infopath/2007/PartnerControls">
-  <documentManagement>
-    <_ip_UnifiedCompliancePolicyUIAction xmlns="http://schemas.microsoft.com/sharepoint/v3" xsi:nil="true"/>
-    <Image xmlns="71af3243-3dd4-4a8d-8c0d-dd76da1f02a5">
-      <Url xsi:nil="true"/>
-      <Description xsi:nil="true"/>
-    </Image>
-    <Status xmlns="71af3243-3dd4-4a8d-8c0d-dd76da1f02a5">Not started</Status>
-    <_ip_UnifiedCompliancePolicyProperties xmlns="http://schemas.microsoft.com/sharepoint/v3" xsi:nil="true"/>
-    <ImageTagsTaxHTField xmlns="71af3243-3dd4-4a8d-8c0d-dd76da1f02a5">
-      <Terms xmlns="http://schemas.microsoft.com/office/infopath/2007/PartnerControls"/>
-    </ImageTagsTaxHTField>
-    <TaxCatchAll xmlns="230e9df3-be65-4c73-a93b-d1236ebd677e" xsi:nil="true"/>
-    <MediaServiceKeyPoints xmlns="71af3243-3dd4-4a8d-8c0d-dd76da1f02a5" xsi:nil="true"/>
-    <Background xmlns="71af3243-3dd4-4a8d-8c0d-dd76da1f02a5">false</Background>
-  </documentManagement>
-</p:properties>
-</file>
-
-<file path=customXml/item2.xml><?xml version="1.0" encoding="utf-8"?>
 <ct:contentTypeSchema xmlns:ct="http://schemas.microsoft.com/office/2006/metadata/contentType" xmlns:ma="http://schemas.microsoft.com/office/2006/metadata/properties/metaAttributes" ct:_="" ma:_="" ma:contentTypeName="Document" ma:contentTypeID="0x01010079F111ED35F8CC479449609E8A0923A6" ma:contentTypeVersion="28" ma:contentTypeDescription="Create a new document." ma:contentTypeScope="" ma:versionID="60f5a4f2d2b0abadcf532d48ebf9cb71">
   <xsd:schema xmlns:xsd="http://www.w3.org/2001/XMLSchema" xmlns:xs="http://www.w3.org/2001/XMLSchema" xmlns:p="http://schemas.microsoft.com/office/2006/metadata/properties" xmlns:ns1="http://schemas.microsoft.com/sharepoint/v3" xmlns:ns2="71af3243-3dd4-4a8d-8c0d-dd76da1f02a5" xmlns:ns3="16c05727-aa75-4e4a-9b5f-8a80a1165891" xmlns:ns4="230e9df3-be65-4c73-a93b-d1236ebd677e" targetNamespace="http://schemas.microsoft.com/office/2006/metadata/properties" ma:root="true" ma:fieldsID="7dd78129e6a1811f84807ad11c651531" ns1:_="" ns2:_="" ns3:_="" ns4:_="">
     <xsd:import namespace="http://schemas.microsoft.com/sharepoint/v3"/>
@@ -22227,6 +21894,26 @@
 </ct:contentTypeSchema>
 </file>
 
+<file path=customXml/item2.xml><?xml version="1.0" encoding="utf-8"?>
+<p:properties xmlns:p="http://schemas.microsoft.com/office/2006/metadata/properties" xmlns:xsi="http://www.w3.org/2001/XMLSchema-instance" xmlns:pc="http://schemas.microsoft.com/office/infopath/2007/PartnerControls">
+  <documentManagement>
+    <_ip_UnifiedCompliancePolicyUIAction xmlns="http://schemas.microsoft.com/sharepoint/v3" xsi:nil="true"/>
+    <Image xmlns="71af3243-3dd4-4a8d-8c0d-dd76da1f02a5">
+      <Url xsi:nil="true"/>
+      <Description xsi:nil="true"/>
+    </Image>
+    <Status xmlns="71af3243-3dd4-4a8d-8c0d-dd76da1f02a5">Not started</Status>
+    <_ip_UnifiedCompliancePolicyProperties xmlns="http://schemas.microsoft.com/sharepoint/v3" xsi:nil="true"/>
+    <ImageTagsTaxHTField xmlns="71af3243-3dd4-4a8d-8c0d-dd76da1f02a5">
+      <Terms xmlns="http://schemas.microsoft.com/office/infopath/2007/PartnerControls"/>
+    </ImageTagsTaxHTField>
+    <TaxCatchAll xmlns="230e9df3-be65-4c73-a93b-d1236ebd677e" xsi:nil="true"/>
+    <MediaServiceKeyPoints xmlns="71af3243-3dd4-4a8d-8c0d-dd76da1f02a5" xsi:nil="true"/>
+    <Background xmlns="71af3243-3dd4-4a8d-8c0d-dd76da1f02a5">false</Background>
+  </documentManagement>
+</p:properties>
+</file>
+
 <file path=customXml/item3.xml><?xml version="1.0" encoding="utf-8"?>
 <?mso-contentType ?>
 <FormTemplates xmlns="http://schemas.microsoft.com/sharepoint/v3/contenttype/forms">
@@ -22237,18 +21924,6 @@
 </file>
 
 <file path=customXml/itemProps1.xml><?xml version="1.0" encoding="utf-8"?>
-<ds:datastoreItem xmlns:ds="http://schemas.openxmlformats.org/officeDocument/2006/customXml" ds:itemID="{1342FAFE-88B4-49B4-9588-86CB0E564E50}">
-  <ds:schemaRefs>
-    <ds:schemaRef ds:uri="http://schemas.microsoft.com/office/2006/metadata/properties"/>
-    <ds:schemaRef ds:uri="http://schemas.microsoft.com/office/infopath/2007/PartnerControls"/>
-    <ds:schemaRef ds:uri="http://schemas.microsoft.com/sharepoint/v3"/>
-    <ds:schemaRef ds:uri="71af3243-3dd4-4a8d-8c0d-dd76da1f02a5"/>
-    <ds:schemaRef ds:uri="230e9df3-be65-4c73-a93b-d1236ebd677e"/>
-  </ds:schemaRefs>
-</ds:datastoreItem>
-</file>
-
-<file path=customXml/itemProps2.xml><?xml version="1.0" encoding="utf-8"?>
 <ds:datastoreItem xmlns:ds="http://schemas.openxmlformats.org/officeDocument/2006/customXml" ds:itemID="{81C465B7-820B-4DEA-AB4B-5167C1BE9075}">
   <ds:schemaRefs>
     <ds:schemaRef ds:uri="http://schemas.microsoft.com/office/2006/metadata/contentType"/>
@@ -22269,6 +21944,18 @@
 </ds:datastoreItem>
 </file>
 
+<file path=customXml/itemProps2.xml><?xml version="1.0" encoding="utf-8"?>
+<ds:datastoreItem xmlns:ds="http://schemas.openxmlformats.org/officeDocument/2006/customXml" ds:itemID="{1342FAFE-88B4-49B4-9588-86CB0E564E50}">
+  <ds:schemaRefs>
+    <ds:schemaRef ds:uri="http://schemas.microsoft.com/office/2006/metadata/properties"/>
+    <ds:schemaRef ds:uri="http://schemas.microsoft.com/office/infopath/2007/PartnerControls"/>
+    <ds:schemaRef ds:uri="http://schemas.microsoft.com/sharepoint/v3"/>
+    <ds:schemaRef ds:uri="71af3243-3dd4-4a8d-8c0d-dd76da1f02a5"/>
+    <ds:schemaRef ds:uri="230e9df3-be65-4c73-a93b-d1236ebd677e"/>
+  </ds:schemaRefs>
+</ds:datastoreItem>
+</file>
+
 <file path=customXml/itemProps3.xml><?xml version="1.0" encoding="utf-8"?>
 <ds:datastoreItem xmlns:ds="http://schemas.openxmlformats.org/officeDocument/2006/customXml" ds:itemID="{42076B5C-85B0-4D30-852D-5E5312EEA93B}">
   <ds:schemaRefs>

</xml_diff>